<commit_message>
Added the experiments and results of the greedy algorithm for the presentation
</commit_message>
<xml_diff>
--- a/Report, presentation and related stuff/Knapsack_problem.pptx
+++ b/Report, presentation and related stuff/Knapsack_problem.pptx
@@ -11,17 +11,19 @@
     <p:sldId id="258" r:id="rId5"/>
     <p:sldId id="259" r:id="rId6"/>
     <p:sldId id="262" r:id="rId7"/>
-    <p:sldId id="261" r:id="rId8"/>
-    <p:sldId id="263" r:id="rId9"/>
-    <p:sldId id="264" r:id="rId10"/>
-    <p:sldId id="265" r:id="rId11"/>
-    <p:sldId id="271" r:id="rId12"/>
-    <p:sldId id="273" r:id="rId13"/>
-    <p:sldId id="266" r:id="rId14"/>
-    <p:sldId id="267" r:id="rId15"/>
-    <p:sldId id="268" r:id="rId16"/>
-    <p:sldId id="269" r:id="rId17"/>
-    <p:sldId id="270" r:id="rId18"/>
+    <p:sldId id="274" r:id="rId8"/>
+    <p:sldId id="275" r:id="rId9"/>
+    <p:sldId id="276" r:id="rId10"/>
+    <p:sldId id="261" r:id="rId11"/>
+    <p:sldId id="263" r:id="rId12"/>
+    <p:sldId id="264" r:id="rId13"/>
+    <p:sldId id="265" r:id="rId14"/>
+    <p:sldId id="271" r:id="rId15"/>
+    <p:sldId id="273" r:id="rId16"/>
+    <p:sldId id="267" r:id="rId17"/>
+    <p:sldId id="268" r:id="rId18"/>
+    <p:sldId id="269" r:id="rId19"/>
+    <p:sldId id="270" r:id="rId20"/>
   </p:sldIdLst>
   <p:sldSz cx="12192000" cy="6858000"/>
   <p:notesSz cx="6858000" cy="9144000"/>
@@ -850,7 +852,7 @@
           <a:p>
             <a:fld id="{1838F80B-A628-425D-B3A1-2B0695012D5D}" type="datetimeFigureOut">
               <a:rPr lang="et-EE" smtClean="0"/>
-              <a:t>14.01.2016</a:t>
+              <a:t>15.01.2016</a:t>
             </a:fld>
             <a:endParaRPr lang="et-EE"/>
           </a:p>
@@ -1101,7 +1103,7 @@
           <a:p>
             <a:fld id="{1838F80B-A628-425D-B3A1-2B0695012D5D}" type="datetimeFigureOut">
               <a:rPr lang="et-EE" smtClean="0"/>
-              <a:t>14.01.2016</a:t>
+              <a:t>15.01.2016</a:t>
             </a:fld>
             <a:endParaRPr lang="et-EE"/>
           </a:p>
@@ -1415,7 +1417,7 @@
           <a:p>
             <a:fld id="{1838F80B-A628-425D-B3A1-2B0695012D5D}" type="datetimeFigureOut">
               <a:rPr lang="et-EE" smtClean="0"/>
-              <a:t>14.01.2016</a:t>
+              <a:t>15.01.2016</a:t>
             </a:fld>
             <a:endParaRPr lang="et-EE"/>
           </a:p>
@@ -1756,7 +1758,7 @@
           <a:p>
             <a:fld id="{1838F80B-A628-425D-B3A1-2B0695012D5D}" type="datetimeFigureOut">
               <a:rPr lang="et-EE" smtClean="0"/>
-              <a:t>14.01.2016</a:t>
+              <a:t>15.01.2016</a:t>
             </a:fld>
             <a:endParaRPr lang="et-EE"/>
           </a:p>
@@ -2070,7 +2072,7 @@
           <a:p>
             <a:fld id="{1838F80B-A628-425D-B3A1-2B0695012D5D}" type="datetimeFigureOut">
               <a:rPr lang="et-EE" smtClean="0"/>
-              <a:t>14.01.2016</a:t>
+              <a:t>15.01.2016</a:t>
             </a:fld>
             <a:endParaRPr lang="et-EE"/>
           </a:p>
@@ -2463,7 +2465,7 @@
           <a:p>
             <a:fld id="{1838F80B-A628-425D-B3A1-2B0695012D5D}" type="datetimeFigureOut">
               <a:rPr lang="et-EE" smtClean="0"/>
-              <a:t>14.01.2016</a:t>
+              <a:t>15.01.2016</a:t>
             </a:fld>
             <a:endParaRPr lang="et-EE"/>
           </a:p>
@@ -2633,7 +2635,7 @@
           <a:p>
             <a:fld id="{1838F80B-A628-425D-B3A1-2B0695012D5D}" type="datetimeFigureOut">
               <a:rPr lang="et-EE" smtClean="0"/>
-              <a:t>14.01.2016</a:t>
+              <a:t>15.01.2016</a:t>
             </a:fld>
             <a:endParaRPr lang="et-EE"/>
           </a:p>
@@ -2813,7 +2815,7 @@
           <a:p>
             <a:fld id="{1838F80B-A628-425D-B3A1-2B0695012D5D}" type="datetimeFigureOut">
               <a:rPr lang="et-EE" smtClean="0"/>
-              <a:t>14.01.2016</a:t>
+              <a:t>15.01.2016</a:t>
             </a:fld>
             <a:endParaRPr lang="et-EE"/>
           </a:p>
@@ -2989,7 +2991,7 @@
           <a:p>
             <a:fld id="{1838F80B-A628-425D-B3A1-2B0695012D5D}" type="datetimeFigureOut">
               <a:rPr lang="et-EE" smtClean="0"/>
-              <a:t>14.01.2016</a:t>
+              <a:t>15.01.2016</a:t>
             </a:fld>
             <a:endParaRPr lang="et-EE"/>
           </a:p>
@@ -3236,7 +3238,7 @@
           <a:p>
             <a:fld id="{1838F80B-A628-425D-B3A1-2B0695012D5D}" type="datetimeFigureOut">
               <a:rPr lang="et-EE" smtClean="0"/>
-              <a:t>14.01.2016</a:t>
+              <a:t>15.01.2016</a:t>
             </a:fld>
             <a:endParaRPr lang="et-EE"/>
           </a:p>
@@ -3468,7 +3470,7 @@
           <a:p>
             <a:fld id="{1838F80B-A628-425D-B3A1-2B0695012D5D}" type="datetimeFigureOut">
               <a:rPr lang="et-EE" smtClean="0"/>
-              <a:t>14.01.2016</a:t>
+              <a:t>15.01.2016</a:t>
             </a:fld>
             <a:endParaRPr lang="et-EE"/>
           </a:p>
@@ -3842,7 +3844,7 @@
           <a:p>
             <a:fld id="{1838F80B-A628-425D-B3A1-2B0695012D5D}" type="datetimeFigureOut">
               <a:rPr lang="et-EE" smtClean="0"/>
-              <a:t>14.01.2016</a:t>
+              <a:t>15.01.2016</a:t>
             </a:fld>
             <a:endParaRPr lang="et-EE"/>
           </a:p>
@@ -3965,7 +3967,7 @@
           <a:p>
             <a:fld id="{1838F80B-A628-425D-B3A1-2B0695012D5D}" type="datetimeFigureOut">
               <a:rPr lang="et-EE" smtClean="0"/>
-              <a:t>14.01.2016</a:t>
+              <a:t>15.01.2016</a:t>
             </a:fld>
             <a:endParaRPr lang="et-EE"/>
           </a:p>
@@ -4060,7 +4062,7 @@
           <a:p>
             <a:fld id="{1838F80B-A628-425D-B3A1-2B0695012D5D}" type="datetimeFigureOut">
               <a:rPr lang="et-EE" smtClean="0"/>
-              <a:t>14.01.2016</a:t>
+              <a:t>15.01.2016</a:t>
             </a:fld>
             <a:endParaRPr lang="et-EE"/>
           </a:p>
@@ -4315,7 +4317,7 @@
           <a:p>
             <a:fld id="{1838F80B-A628-425D-B3A1-2B0695012D5D}" type="datetimeFigureOut">
               <a:rPr lang="et-EE" smtClean="0"/>
-              <a:t>14.01.2016</a:t>
+              <a:t>15.01.2016</a:t>
             </a:fld>
             <a:endParaRPr lang="et-EE"/>
           </a:p>
@@ -4578,7 +4580,7 @@
           <a:p>
             <a:fld id="{1838F80B-A628-425D-B3A1-2B0695012D5D}" type="datetimeFigureOut">
               <a:rPr lang="et-EE" smtClean="0"/>
-              <a:t>14.01.2016</a:t>
+              <a:t>15.01.2016</a:t>
             </a:fld>
             <a:endParaRPr lang="et-EE"/>
           </a:p>
@@ -5321,7 +5323,7 @@
           <a:p>
             <a:fld id="{1838F80B-A628-425D-B3A1-2B0695012D5D}" type="datetimeFigureOut">
               <a:rPr lang="et-EE" smtClean="0"/>
-              <a:t>14.01.2016</a:t>
+              <a:t>15.01.2016</a:t>
             </a:fld>
             <a:endParaRPr lang="et-EE"/>
           </a:p>
@@ -5871,14 +5873,7 @@
                 <a:latin typeface="Arial" panose="020B0604020202020204" pitchFamily="34" charset="0"/>
                 <a:cs typeface="Arial" panose="020B0604020202020204" pitchFamily="34" charset="0"/>
               </a:rPr>
-              <a:t>The k</a:t>
-            </a:r>
-            <a:r>
-              <a:rPr lang="en-US" dirty="0" smtClean="0">
-                <a:latin typeface="Arial" panose="020B0604020202020204" pitchFamily="34" charset="0"/>
-                <a:cs typeface="Arial" panose="020B0604020202020204" pitchFamily="34" charset="0"/>
-              </a:rPr>
-              <a:t>napsack problem</a:t>
+              <a:t>The knapsack problem</a:t>
             </a:r>
             <a:br>
               <a:rPr lang="en-US" dirty="0" smtClean="0">
@@ -6093,7 +6088,7 @@
         </p:nvSpPr>
         <p:spPr>
           <a:xfrm>
-            <a:off x="3024749" y="3011606"/>
+            <a:off x="2942862" y="3120788"/>
             <a:ext cx="8596668" cy="1320800"/>
           </a:xfrm>
         </p:spPr>
@@ -6102,23 +6097,17 @@
           <a:lstStyle/>
           <a:p>
             <a:r>
-              <a:rPr lang="en-US" dirty="0" smtClean="0">
-                <a:latin typeface="Arial" panose="020B0604020202020204" pitchFamily="34" charset="0"/>
-                <a:cs typeface="Arial" panose="020B0604020202020204" pitchFamily="34" charset="0"/>
-              </a:rPr>
-              <a:t>GENETIC ALGORITHM</a:t>
-            </a:r>
-            <a:endParaRPr lang="et-EE" dirty="0">
-              <a:latin typeface="Arial" panose="020B0604020202020204" pitchFamily="34" charset="0"/>
-              <a:cs typeface="Arial" panose="020B0604020202020204" pitchFamily="34" charset="0"/>
-            </a:endParaRPr>
+              <a:rPr lang="en-US" dirty="0" smtClean="0"/>
+              <a:t>HILL CLIMBING ALGORITHM</a:t>
+            </a:r>
+            <a:endParaRPr lang="et-EE" dirty="0"/>
           </a:p>
         </p:txBody>
       </p:sp>
     </p:spTree>
     <p:extLst>
       <p:ext uri="{BB962C8B-B14F-4D97-AF65-F5344CB8AC3E}">
-        <p14:creationId xmlns:p14="http://schemas.microsoft.com/office/powerpoint/2010/main" val="4268301284"/>
+        <p14:creationId xmlns:p14="http://schemas.microsoft.com/office/powerpoint/2010/main" val="1141711639"/>
       </p:ext>
     </p:extLst>
   </p:cSld>
@@ -6164,7 +6153,9 @@
         </p:nvSpPr>
         <p:spPr/>
         <p:txBody>
-          <a:bodyPr/>
+          <a:bodyPr>
+            <a:normAutofit/>
+          </a:bodyPr>
           <a:lstStyle/>
           <a:p>
             <a:r>
@@ -6181,100 +6172,111 @@
           </a:p>
         </p:txBody>
       </p:sp>
-      <p:sp>
-        <p:nvSpPr>
-          <p:cNvPr id="3" name="Content Placeholder 2"/>
-          <p:cNvSpPr>
-            <a:spLocks noGrp="1"/>
-          </p:cNvSpPr>
+      <p:pic>
+        <p:nvPicPr>
+          <p:cNvPr id="4" name="Content Placeholder 3"/>
+          <p:cNvPicPr>
+            <a:picLocks noGrp="1" noChangeAspect="1"/>
+          </p:cNvPicPr>
           <p:nvPr>
             <p:ph idx="1"/>
           </p:nvPr>
-        </p:nvSpPr>
-        <p:spPr/>
-        <p:txBody>
-          <a:bodyPr/>
-          <a:lstStyle/>
-          <a:p>
-            <a:pPr>
-              <a:buClr>
-                <a:schemeClr val="tx1"/>
-              </a:buClr>
+        </p:nvPicPr>
+        <p:blipFill>
+          <a:blip r:embed="rId2">
+            <a:extLst>
+              <a:ext uri="{28A0092B-C50C-407E-A947-70E740481C1C}">
+                <a14:useLocalDpi xmlns:a14="http://schemas.microsoft.com/office/drawing/2010/main" val="0"/>
+              </a:ext>
+            </a:extLst>
+          </a:blip>
+          <a:stretch>
+            <a:fillRect/>
+          </a:stretch>
+        </p:blipFill>
+        <p:spPr>
+          <a:xfrm>
+            <a:off x="1973500" y="3597760"/>
+            <a:ext cx="6233354" cy="2673386"/>
+          </a:xfrm>
+        </p:spPr>
+      </p:pic>
+      <p:sp>
+        <p:nvSpPr>
+          <p:cNvPr id="6" name="TextBox 5"/>
+          <p:cNvSpPr txBox="1"/>
+          <p:nvPr/>
+        </p:nvSpPr>
+        <p:spPr>
+          <a:xfrm>
+            <a:off x="677334" y="1930400"/>
+            <a:ext cx="10745842" cy="1200329"/>
+          </a:xfrm>
+          <a:prstGeom prst="rect">
+            <a:avLst/>
+          </a:prstGeom>
+          <a:noFill/>
+        </p:spPr>
+        <p:txBody>
+          <a:bodyPr wrap="square" rtlCol="0">
+            <a:spAutoFit/>
+          </a:bodyPr>
+          <a:lstStyle/>
+          <a:p>
+            <a:pPr marL="285750" indent="-285750">
               <a:buFont typeface="Arial" panose="020B0604020202020204" pitchFamily="34" charset="0"/>
               <a:buChar char="•"/>
             </a:pPr>
             <a:r>
-              <a:rPr lang="en-US" dirty="0" smtClean="0">
-                <a:solidFill>
-                  <a:schemeClr val="tx1"/>
-                </a:solidFill>
-                <a:latin typeface="Arial" panose="020B0604020202020204" pitchFamily="34" charset="0"/>
-                <a:cs typeface="Arial" panose="020B0604020202020204" pitchFamily="34" charset="0"/>
-              </a:rPr>
-              <a:t>Chromosomes</a:t>
-            </a:r>
-            <a:r>
-              <a:rPr lang="en-US" dirty="0">
-                <a:solidFill>
-                  <a:schemeClr val="tx1"/>
-                </a:solidFill>
-                <a:latin typeface="Arial" panose="020B0604020202020204" pitchFamily="34" charset="0"/>
-                <a:cs typeface="Arial" panose="020B0604020202020204" pitchFamily="34" charset="0"/>
-              </a:rPr>
-              <a:t> (an array consisting of 0’s and 1’s</a:t>
-            </a:r>
-            <a:r>
-              <a:rPr lang="en-US" dirty="0" smtClean="0">
-                <a:solidFill>
-                  <a:schemeClr val="tx1"/>
-                </a:solidFill>
-                <a:latin typeface="Arial" panose="020B0604020202020204" pitchFamily="34" charset="0"/>
-                <a:cs typeface="Arial" panose="020B0604020202020204" pitchFamily="34" charset="0"/>
-              </a:rPr>
-              <a:t>)  of each individual are generated randomly for the initial population.</a:t>
-            </a:r>
-          </a:p>
-          <a:p>
-            <a:pPr>
-              <a:buClr>
-                <a:schemeClr val="tx1"/>
-              </a:buClr>
+              <a:rPr lang="en-US" dirty="0" smtClean="0"/>
+              <a:t>Start with an arbitrary solution</a:t>
+            </a:r>
+          </a:p>
+          <a:p>
+            <a:pPr marL="285750" indent="-285750">
               <a:buFont typeface="Arial" panose="020B0604020202020204" pitchFamily="34" charset="0"/>
               <a:buChar char="•"/>
             </a:pPr>
             <a:r>
-              <a:rPr lang="en-US" dirty="0" smtClean="0">
-                <a:solidFill>
-                  <a:schemeClr val="tx1"/>
-                </a:solidFill>
-                <a:latin typeface="Arial" panose="020B0604020202020204" pitchFamily="34" charset="0"/>
-                <a:cs typeface="Arial" panose="020B0604020202020204" pitchFamily="34" charset="0"/>
-              </a:rPr>
-              <a:t>These “genes” decide if a certain package in a certain state is included in the solution.</a:t>
-            </a:r>
-          </a:p>
-          <a:p>
-            <a:pPr>
-              <a:buClr>
-                <a:schemeClr val="tx1"/>
-              </a:buClr>
+              <a:rPr lang="en-US" dirty="0" smtClean="0"/>
+              <a:t>Create </a:t>
+            </a:r>
+            <a:r>
+              <a:rPr lang="en-US" dirty="0" err="1" smtClean="0"/>
+              <a:t>neighbouring</a:t>
+            </a:r>
+            <a:r>
+              <a:rPr lang="en-US" dirty="0" smtClean="0"/>
+              <a:t> solutions(change random package and fill the remaining empty space)</a:t>
+            </a:r>
+          </a:p>
+          <a:p>
+            <a:pPr marL="285750" indent="-285750">
               <a:buFont typeface="Arial" panose="020B0604020202020204" pitchFamily="34" charset="0"/>
               <a:buChar char="•"/>
             </a:pPr>
-            <a:endParaRPr lang="et-EE" dirty="0">
-              <a:solidFill>
-                <a:schemeClr val="tx1"/>
-              </a:solidFill>
-              <a:latin typeface="Arial" panose="020B0604020202020204" pitchFamily="34" charset="0"/>
-              <a:cs typeface="Arial" panose="020B0604020202020204" pitchFamily="34" charset="0"/>
-            </a:endParaRPr>
+            <a:r>
+              <a:rPr lang="en-US" dirty="0" smtClean="0"/>
+              <a:t>Choose the best next solution based on an objective function (maximizing the value of a packing)</a:t>
+            </a:r>
+          </a:p>
+          <a:p>
+            <a:pPr marL="285750" indent="-285750">
+              <a:buFont typeface="Arial" panose="020B0604020202020204" pitchFamily="34" charset="0"/>
+              <a:buChar char="•"/>
+            </a:pPr>
+            <a:r>
+              <a:rPr lang="en-US" dirty="0" smtClean="0"/>
+              <a:t>Repeat until no further improvements can be made</a:t>
+            </a:r>
+            <a:endParaRPr lang="et-EE" dirty="0"/>
           </a:p>
         </p:txBody>
       </p:sp>
     </p:spTree>
     <p:extLst>
       <p:ext uri="{BB962C8B-B14F-4D97-AF65-F5344CB8AC3E}">
-        <p14:creationId xmlns:p14="http://schemas.microsoft.com/office/powerpoint/2010/main" val="614935636"/>
+        <p14:creationId xmlns:p14="http://schemas.microsoft.com/office/powerpoint/2010/main" val="2958339159"/>
       </p:ext>
     </p:extLst>
   </p:cSld>
@@ -6324,16 +6326,10 @@
           <a:lstStyle/>
           <a:p>
             <a:r>
-              <a:rPr lang="en-US" dirty="0" smtClean="0">
-                <a:latin typeface="Arial" panose="020B0604020202020204" pitchFamily="34" charset="0"/>
-                <a:cs typeface="Arial" panose="020B0604020202020204" pitchFamily="34" charset="0"/>
-              </a:rPr>
+              <a:rPr lang="en-US" dirty="0" smtClean="0"/>
               <a:t>Experiments and results</a:t>
             </a:r>
-            <a:endParaRPr lang="et-EE" dirty="0">
-              <a:latin typeface="Arial" panose="020B0604020202020204" pitchFamily="34" charset="0"/>
-              <a:cs typeface="Arial" panose="020B0604020202020204" pitchFamily="34" charset="0"/>
-            </a:endParaRPr>
+            <a:endParaRPr lang="et-EE" dirty="0"/>
           </a:p>
         </p:txBody>
       </p:sp>
@@ -6352,14 +6348,14 @@
           <a:bodyPr/>
           <a:lstStyle/>
           <a:p>
-            <a:endParaRPr lang="et-EE"/>
+            <a:endParaRPr lang="et-EE" dirty="0"/>
           </a:p>
         </p:txBody>
       </p:sp>
     </p:spTree>
     <p:extLst>
       <p:ext uri="{BB962C8B-B14F-4D97-AF65-F5344CB8AC3E}">
-        <p14:creationId xmlns:p14="http://schemas.microsoft.com/office/powerpoint/2010/main" val="2405103384"/>
+        <p14:creationId xmlns:p14="http://schemas.microsoft.com/office/powerpoint/2010/main" val="3675406741"/>
       </p:ext>
     </p:extLst>
   </p:cSld>
@@ -6403,7 +6399,12 @@
             <p:ph type="title"/>
           </p:nvPr>
         </p:nvSpPr>
-        <p:spPr/>
+        <p:spPr>
+          <a:xfrm>
+            <a:off x="3024749" y="3011606"/>
+            <a:ext cx="8596668" cy="1320800"/>
+          </a:xfrm>
+        </p:spPr>
         <p:txBody>
           <a:bodyPr/>
           <a:lstStyle/>
@@ -6413,14 +6414,7 @@
                 <a:latin typeface="Arial" panose="020B0604020202020204" pitchFamily="34" charset="0"/>
                 <a:cs typeface="Arial" panose="020B0604020202020204" pitchFamily="34" charset="0"/>
               </a:rPr>
-              <a:t>3D </a:t>
-            </a:r>
-            <a:r>
-              <a:rPr lang="en-US" dirty="0" smtClean="0">
-                <a:latin typeface="Arial" panose="020B0604020202020204" pitchFamily="34" charset="0"/>
-                <a:cs typeface="Arial" panose="020B0604020202020204" pitchFamily="34" charset="0"/>
-              </a:rPr>
-              <a:t>representation</a:t>
+              <a:t>GENETIC ALGORITHM</a:t>
             </a:r>
             <a:endParaRPr lang="et-EE" dirty="0">
               <a:latin typeface="Arial" panose="020B0604020202020204" pitchFamily="34" charset="0"/>
@@ -6429,29 +6423,10 @@
           </a:p>
         </p:txBody>
       </p:sp>
-      <p:sp>
-        <p:nvSpPr>
-          <p:cNvPr id="3" name="Content Placeholder 2"/>
-          <p:cNvSpPr>
-            <a:spLocks noGrp="1"/>
-          </p:cNvSpPr>
-          <p:nvPr>
-            <p:ph idx="1"/>
-          </p:nvPr>
-        </p:nvSpPr>
-        <p:spPr/>
-        <p:txBody>
-          <a:bodyPr/>
-          <a:lstStyle/>
-          <a:p>
-            <a:endParaRPr lang="et-EE"/>
-          </a:p>
-        </p:txBody>
-      </p:sp>
     </p:spTree>
     <p:extLst>
       <p:ext uri="{BB962C8B-B14F-4D97-AF65-F5344CB8AC3E}">
-        <p14:creationId xmlns:p14="http://schemas.microsoft.com/office/powerpoint/2010/main" val="2013306306"/>
+        <p14:creationId xmlns:p14="http://schemas.microsoft.com/office/powerpoint/2010/main" val="4268301284"/>
       </p:ext>
     </p:extLst>
   </p:cSld>
@@ -6505,7 +6480,7 @@
                 <a:latin typeface="Arial" panose="020B0604020202020204" pitchFamily="34" charset="0"/>
                 <a:cs typeface="Arial" panose="020B0604020202020204" pitchFamily="34" charset="0"/>
               </a:rPr>
-              <a:t>Comparison between algorithms</a:t>
+              <a:t>Implementation</a:t>
             </a:r>
             <a:endParaRPr lang="et-EE" dirty="0">
               <a:latin typeface="Arial" panose="020B0604020202020204" pitchFamily="34" charset="0"/>
@@ -6530,7 +6505,9 @@
           <a:lstStyle/>
           <a:p>
             <a:pPr>
-              <a:buClrTx/>
+              <a:buClr>
+                <a:schemeClr val="tx1"/>
+              </a:buClr>
               <a:buFont typeface="Arial" panose="020B0604020202020204" pitchFamily="34" charset="0"/>
               <a:buChar char="•"/>
             </a:pPr>
@@ -6542,12 +6519,34 @@
                 <a:latin typeface="Arial" panose="020B0604020202020204" pitchFamily="34" charset="0"/>
                 <a:cs typeface="Arial" panose="020B0604020202020204" pitchFamily="34" charset="0"/>
               </a:rPr>
-              <a:t>Greedy algorithm is the fastest but does not perform as well as other algorithms in finding an optimal solution</a:t>
+              <a:t>Chromosomes</a:t>
+            </a:r>
+            <a:r>
+              <a:rPr lang="en-US" dirty="0">
+                <a:solidFill>
+                  <a:schemeClr val="tx1"/>
+                </a:solidFill>
+                <a:latin typeface="Arial" panose="020B0604020202020204" pitchFamily="34" charset="0"/>
+                <a:cs typeface="Arial" panose="020B0604020202020204" pitchFamily="34" charset="0"/>
+              </a:rPr>
+              <a:t> (an array consisting of 0’s and 1’s</a:t>
+            </a:r>
+            <a:r>
+              <a:rPr lang="en-US" dirty="0" smtClean="0">
+                <a:solidFill>
+                  <a:schemeClr val="tx1"/>
+                </a:solidFill>
+                <a:latin typeface="Arial" panose="020B0604020202020204" pitchFamily="34" charset="0"/>
+                <a:cs typeface="Arial" panose="020B0604020202020204" pitchFamily="34" charset="0"/>
+              </a:rPr>
+              <a:t>)  of each individual are generated randomly for the initial population.</a:t>
             </a:r>
           </a:p>
           <a:p>
             <a:pPr>
-              <a:buClrTx/>
+              <a:buClr>
+                <a:schemeClr val="tx1"/>
+              </a:buClr>
               <a:buFont typeface="Arial" panose="020B0604020202020204" pitchFamily="34" charset="0"/>
               <a:buChar char="•"/>
             </a:pPr>
@@ -6559,12 +6558,14 @@
                 <a:latin typeface="Arial" panose="020B0604020202020204" pitchFamily="34" charset="0"/>
                 <a:cs typeface="Arial" panose="020B0604020202020204" pitchFamily="34" charset="0"/>
               </a:rPr>
-              <a:t>Hill climbing algorithm might get stuck</a:t>
+              <a:t>These “genes” decide if a certain package in a certain state is included in the solution.</a:t>
             </a:r>
           </a:p>
           <a:p>
             <a:pPr>
-              <a:buClrTx/>
+              <a:buClr>
+                <a:schemeClr val="tx1"/>
+              </a:buClr>
               <a:buFont typeface="Arial" panose="020B0604020202020204" pitchFamily="34" charset="0"/>
               <a:buChar char="•"/>
             </a:pPr>
@@ -6576,35 +6577,33 @@
                 <a:latin typeface="Arial" panose="020B0604020202020204" pitchFamily="34" charset="0"/>
                 <a:cs typeface="Arial" panose="020B0604020202020204" pitchFamily="34" charset="0"/>
               </a:rPr>
-              <a:t>Genetic algorithm is time consuming and has a lot of parameters that need to be taken into account </a:t>
-            </a:r>
-            <a:r>
-              <a:rPr lang="en-US" dirty="0" smtClean="0">
-                <a:solidFill>
-                  <a:schemeClr val="tx1"/>
-                </a:solidFill>
-                <a:latin typeface="Arial" panose="020B0604020202020204" pitchFamily="34" charset="0"/>
-                <a:cs typeface="Arial" panose="020B0604020202020204" pitchFamily="34" charset="0"/>
-              </a:rPr>
-              <a:t>(difficult to implement)</a:t>
+              <a:t>The binary string is converted into a packing to evaluate the fitness of an individual</a:t>
             </a:r>
           </a:p>
           <a:p>
             <a:pPr>
-              <a:buClrTx/>
+              <a:buClr>
+                <a:schemeClr val="tx1"/>
+              </a:buClr>
               <a:buFont typeface="Arial" panose="020B0604020202020204" pitchFamily="34" charset="0"/>
               <a:buChar char="•"/>
             </a:pPr>
-            <a:r>
-              <a:rPr lang="en-US" dirty="0" smtClean="0">
-                <a:solidFill>
-                  <a:schemeClr val="tx1"/>
-                </a:solidFill>
-                <a:latin typeface="Arial" panose="020B0604020202020204" pitchFamily="34" charset="0"/>
-                <a:cs typeface="Arial" panose="020B0604020202020204" pitchFamily="34" charset="0"/>
-              </a:rPr>
-              <a:t>Which one has the best result using the same number of packages?</a:t>
-            </a:r>
+            <a:endParaRPr lang="en-US" dirty="0" smtClean="0">
+              <a:solidFill>
+                <a:schemeClr val="tx1"/>
+              </a:solidFill>
+              <a:latin typeface="Arial" panose="020B0604020202020204" pitchFamily="34" charset="0"/>
+              <a:cs typeface="Arial" panose="020B0604020202020204" pitchFamily="34" charset="0"/>
+            </a:endParaRPr>
+          </a:p>
+          <a:p>
+            <a:pPr>
+              <a:buClr>
+                <a:schemeClr val="tx1"/>
+              </a:buClr>
+              <a:buFont typeface="Arial" panose="020B0604020202020204" pitchFamily="34" charset="0"/>
+              <a:buChar char="•"/>
+            </a:pPr>
             <a:endParaRPr lang="et-EE" dirty="0">
               <a:solidFill>
                 <a:schemeClr val="tx1"/>
@@ -6618,7 +6617,7 @@
     </p:spTree>
     <p:extLst>
       <p:ext uri="{BB962C8B-B14F-4D97-AF65-F5344CB8AC3E}">
-        <p14:creationId xmlns:p14="http://schemas.microsoft.com/office/powerpoint/2010/main" val="1840586329"/>
+        <p14:creationId xmlns:p14="http://schemas.microsoft.com/office/powerpoint/2010/main" val="614935636"/>
       </p:ext>
     </p:extLst>
   </p:cSld>
@@ -6662,28 +6661,48 @@
             <p:ph type="title"/>
           </p:nvPr>
         </p:nvSpPr>
-        <p:spPr>
-          <a:xfrm>
-            <a:off x="3229466" y="2997958"/>
-            <a:ext cx="8596668" cy="1320800"/>
-          </a:xfrm>
-        </p:spPr>
+        <p:spPr/>
         <p:txBody>
           <a:bodyPr/>
           <a:lstStyle/>
           <a:p>
             <a:r>
-              <a:rPr lang="en-US" dirty="0" smtClean="0"/>
-              <a:t>ASSIGNMENT RESULTS</a:t>
-            </a:r>
-            <a:endParaRPr lang="et-EE" dirty="0"/>
+              <a:rPr lang="en-US" dirty="0" smtClean="0">
+                <a:latin typeface="Arial" panose="020B0604020202020204" pitchFamily="34" charset="0"/>
+                <a:cs typeface="Arial" panose="020B0604020202020204" pitchFamily="34" charset="0"/>
+              </a:rPr>
+              <a:t>Experiments and results</a:t>
+            </a:r>
+            <a:endParaRPr lang="et-EE" dirty="0">
+              <a:latin typeface="Arial" panose="020B0604020202020204" pitchFamily="34" charset="0"/>
+              <a:cs typeface="Arial" panose="020B0604020202020204" pitchFamily="34" charset="0"/>
+            </a:endParaRPr>
+          </a:p>
+        </p:txBody>
+      </p:sp>
+      <p:sp>
+        <p:nvSpPr>
+          <p:cNvPr id="3" name="Content Placeholder 2"/>
+          <p:cNvSpPr>
+            <a:spLocks noGrp="1"/>
+          </p:cNvSpPr>
+          <p:nvPr>
+            <p:ph idx="1"/>
+          </p:nvPr>
+        </p:nvSpPr>
+        <p:spPr/>
+        <p:txBody>
+          <a:bodyPr/>
+          <a:lstStyle/>
+          <a:p>
+            <a:endParaRPr lang="et-EE"/>
           </a:p>
         </p:txBody>
       </p:sp>
     </p:spTree>
     <p:extLst>
       <p:ext uri="{BB962C8B-B14F-4D97-AF65-F5344CB8AC3E}">
-        <p14:creationId xmlns:p14="http://schemas.microsoft.com/office/powerpoint/2010/main" val="3788528713"/>
+        <p14:creationId xmlns:p14="http://schemas.microsoft.com/office/powerpoint/2010/main" val="2405103384"/>
       </p:ext>
     </p:extLst>
   </p:cSld>
@@ -6737,7 +6756,7 @@
                 <a:latin typeface="Arial" panose="020B0604020202020204" pitchFamily="34" charset="0"/>
                 <a:cs typeface="Arial" panose="020B0604020202020204" pitchFamily="34" charset="0"/>
               </a:rPr>
-              <a:t>Using rectangular packages</a:t>
+              <a:t>Comparison between algorithms</a:t>
             </a:r>
             <a:endParaRPr lang="et-EE" dirty="0">
               <a:latin typeface="Arial" panose="020B0604020202020204" pitchFamily="34" charset="0"/>
@@ -6761,51 +6780,86 @@
           <a:bodyPr/>
           <a:lstStyle/>
           <a:p>
-            <a:r>
-              <a:rPr lang="en-US" dirty="0"/>
-              <a:t>N</a:t>
-            </a:r>
-            <a:r>
-              <a:rPr lang="en-US" dirty="0" smtClean="0"/>
-              <a:t>o solution </a:t>
-            </a:r>
-            <a:r>
-              <a:rPr lang="en-US" dirty="0" smtClean="0"/>
-              <a:t>to filling the entire </a:t>
-            </a:r>
-            <a:r>
-              <a:rPr lang="en-US" dirty="0" err="1" smtClean="0"/>
-              <a:t>cargospace</a:t>
-            </a:r>
-            <a:r>
-              <a:rPr lang="en-US" dirty="0" smtClean="0"/>
-              <a:t> with A,B and/or C packages </a:t>
-            </a:r>
-            <a:r>
-              <a:rPr lang="en-US" dirty="0" smtClean="0"/>
-              <a:t>has been found yet</a:t>
-            </a:r>
-            <a:r>
-              <a:rPr lang="en-US" dirty="0" smtClean="0"/>
-              <a:t>.</a:t>
-            </a:r>
-            <a:endParaRPr lang="en-US" dirty="0" smtClean="0"/>
-          </a:p>
-          <a:p>
-            <a:r>
-              <a:rPr lang="en-US" dirty="0" smtClean="0"/>
-              <a:t>Best result found so far for maximizing a single packing: XXX</a:t>
-            </a:r>
-          </a:p>
-          <a:p>
-            <a:endParaRPr lang="et-EE" dirty="0"/>
+            <a:pPr>
+              <a:buClrTx/>
+              <a:buFont typeface="Arial" panose="020B0604020202020204" pitchFamily="34" charset="0"/>
+              <a:buChar char="•"/>
+            </a:pPr>
+            <a:r>
+              <a:rPr lang="en-US" dirty="0" smtClean="0">
+                <a:solidFill>
+                  <a:schemeClr val="tx1"/>
+                </a:solidFill>
+                <a:latin typeface="Arial" panose="020B0604020202020204" pitchFamily="34" charset="0"/>
+                <a:cs typeface="Arial" panose="020B0604020202020204" pitchFamily="34" charset="0"/>
+              </a:rPr>
+              <a:t>Greedy algorithm is the fastest but does not perform as well as other algorithms </a:t>
+            </a:r>
+          </a:p>
+          <a:p>
+            <a:pPr>
+              <a:buClrTx/>
+              <a:buFont typeface="Arial" panose="020B0604020202020204" pitchFamily="34" charset="0"/>
+              <a:buChar char="•"/>
+            </a:pPr>
+            <a:r>
+              <a:rPr lang="en-US" dirty="0" smtClean="0">
+                <a:solidFill>
+                  <a:schemeClr val="tx1"/>
+                </a:solidFill>
+                <a:latin typeface="Arial" panose="020B0604020202020204" pitchFamily="34" charset="0"/>
+                <a:cs typeface="Arial" panose="020B0604020202020204" pitchFamily="34" charset="0"/>
+              </a:rPr>
+              <a:t>Hill climbing algorithm might get stuck</a:t>
+            </a:r>
+          </a:p>
+          <a:p>
+            <a:pPr>
+              <a:buClrTx/>
+              <a:buFont typeface="Arial" panose="020B0604020202020204" pitchFamily="34" charset="0"/>
+              <a:buChar char="•"/>
+            </a:pPr>
+            <a:r>
+              <a:rPr lang="en-US" dirty="0" smtClean="0">
+                <a:solidFill>
+                  <a:schemeClr val="tx1"/>
+                </a:solidFill>
+                <a:latin typeface="Arial" panose="020B0604020202020204" pitchFamily="34" charset="0"/>
+                <a:cs typeface="Arial" panose="020B0604020202020204" pitchFamily="34" charset="0"/>
+              </a:rPr>
+              <a:t>Genetic algorithm is time consuming and has a lot of parameters that need to be taken into account (difficult to implement) but it is the most likely to find the optimal solution.</a:t>
+            </a:r>
+          </a:p>
+          <a:p>
+            <a:pPr>
+              <a:buClrTx/>
+              <a:buFont typeface="Arial" panose="020B0604020202020204" pitchFamily="34" charset="0"/>
+              <a:buChar char="•"/>
+            </a:pPr>
+            <a:r>
+              <a:rPr lang="en-US" dirty="0" smtClean="0">
+                <a:solidFill>
+                  <a:schemeClr val="tx1"/>
+                </a:solidFill>
+                <a:latin typeface="Arial" panose="020B0604020202020204" pitchFamily="34" charset="0"/>
+                <a:cs typeface="Arial" panose="020B0604020202020204" pitchFamily="34" charset="0"/>
+              </a:rPr>
+              <a:t>Which one has the best result using the same number of packages?</a:t>
+            </a:r>
+            <a:endParaRPr lang="et-EE" dirty="0">
+              <a:solidFill>
+                <a:schemeClr val="tx1"/>
+              </a:solidFill>
+              <a:latin typeface="Arial" panose="020B0604020202020204" pitchFamily="34" charset="0"/>
+              <a:cs typeface="Arial" panose="020B0604020202020204" pitchFamily="34" charset="0"/>
+            </a:endParaRPr>
           </a:p>
         </p:txBody>
       </p:sp>
     </p:spTree>
     <p:extLst>
       <p:ext uri="{BB962C8B-B14F-4D97-AF65-F5344CB8AC3E}">
-        <p14:creationId xmlns:p14="http://schemas.microsoft.com/office/powerpoint/2010/main" val="2928455462"/>
+        <p14:creationId xmlns:p14="http://schemas.microsoft.com/office/powerpoint/2010/main" val="1840586329"/>
       </p:ext>
     </p:extLst>
   </p:cSld>
@@ -6849,6 +6903,224 @@
             <p:ph type="title"/>
           </p:nvPr>
         </p:nvSpPr>
+        <p:spPr>
+          <a:xfrm>
+            <a:off x="3229466" y="2997958"/>
+            <a:ext cx="8596668" cy="1320800"/>
+          </a:xfrm>
+        </p:spPr>
+        <p:txBody>
+          <a:bodyPr/>
+          <a:lstStyle/>
+          <a:p>
+            <a:r>
+              <a:rPr lang="en-US" dirty="0" smtClean="0"/>
+              <a:t>ASSIGNMENT RESULTS</a:t>
+            </a:r>
+            <a:endParaRPr lang="et-EE" dirty="0"/>
+          </a:p>
+        </p:txBody>
+      </p:sp>
+    </p:spTree>
+    <p:extLst>
+      <p:ext uri="{BB962C8B-B14F-4D97-AF65-F5344CB8AC3E}">
+        <p14:creationId xmlns:p14="http://schemas.microsoft.com/office/powerpoint/2010/main" val="3788528713"/>
+      </p:ext>
+    </p:extLst>
+  </p:cSld>
+  <p:clrMapOvr>
+    <a:masterClrMapping/>
+  </p:clrMapOvr>
+  <p:timing>
+    <p:tnLst>
+      <p:par>
+        <p:cTn id="1" dur="indefinite" restart="never" nodeType="tmRoot"/>
+      </p:par>
+    </p:tnLst>
+  </p:timing>
+</p:sld>
+</file>
+
+<file path=ppt/slides/slide18.xml><?xml version="1.0" encoding="utf-8"?>
+<p:sld xmlns:a="http://schemas.openxmlformats.org/drawingml/2006/main" xmlns:r="http://schemas.openxmlformats.org/officeDocument/2006/relationships" xmlns:p="http://schemas.openxmlformats.org/presentationml/2006/main">
+  <p:cSld>
+    <p:spTree>
+      <p:nvGrpSpPr>
+        <p:cNvPr id="1" name=""/>
+        <p:cNvGrpSpPr/>
+        <p:nvPr/>
+      </p:nvGrpSpPr>
+      <p:grpSpPr>
+        <a:xfrm>
+          <a:off x="0" y="0"/>
+          <a:ext cx="0" cy="0"/>
+          <a:chOff x="0" y="0"/>
+          <a:chExt cx="0" cy="0"/>
+        </a:xfrm>
+      </p:grpSpPr>
+      <p:sp>
+        <p:nvSpPr>
+          <p:cNvPr id="2" name="Title 1"/>
+          <p:cNvSpPr>
+            <a:spLocks noGrp="1"/>
+          </p:cNvSpPr>
+          <p:nvPr>
+            <p:ph type="title"/>
+          </p:nvPr>
+        </p:nvSpPr>
+        <p:spPr/>
+        <p:txBody>
+          <a:bodyPr/>
+          <a:lstStyle/>
+          <a:p>
+            <a:r>
+              <a:rPr lang="en-US" dirty="0" smtClean="0">
+                <a:latin typeface="Arial" panose="020B0604020202020204" pitchFamily="34" charset="0"/>
+                <a:cs typeface="Arial" panose="020B0604020202020204" pitchFamily="34" charset="0"/>
+              </a:rPr>
+              <a:t>Using rectangular packages</a:t>
+            </a:r>
+            <a:endParaRPr lang="et-EE" dirty="0">
+              <a:latin typeface="Arial" panose="020B0604020202020204" pitchFamily="34" charset="0"/>
+              <a:cs typeface="Arial" panose="020B0604020202020204" pitchFamily="34" charset="0"/>
+            </a:endParaRPr>
+          </a:p>
+        </p:txBody>
+      </p:sp>
+      <p:sp>
+        <p:nvSpPr>
+          <p:cNvPr id="3" name="Content Placeholder 2"/>
+          <p:cNvSpPr>
+            <a:spLocks noGrp="1"/>
+          </p:cNvSpPr>
+          <p:nvPr>
+            <p:ph idx="1"/>
+          </p:nvPr>
+        </p:nvSpPr>
+        <p:spPr/>
+        <p:txBody>
+          <a:bodyPr/>
+          <a:lstStyle/>
+          <a:p>
+            <a:pPr>
+              <a:buClr>
+                <a:schemeClr val="tx1"/>
+              </a:buClr>
+              <a:buFont typeface="Arial" panose="020B0604020202020204" pitchFamily="34" charset="0"/>
+              <a:buChar char="•"/>
+            </a:pPr>
+            <a:r>
+              <a:rPr lang="en-US" dirty="0">
+                <a:solidFill>
+                  <a:schemeClr val="tx1"/>
+                </a:solidFill>
+                <a:latin typeface="Arial" panose="020B0604020202020204" pitchFamily="34" charset="0"/>
+                <a:cs typeface="Arial" panose="020B0604020202020204" pitchFamily="34" charset="0"/>
+              </a:rPr>
+              <a:t>N</a:t>
+            </a:r>
+            <a:r>
+              <a:rPr lang="en-US" dirty="0" smtClean="0">
+                <a:solidFill>
+                  <a:schemeClr val="tx1"/>
+                </a:solidFill>
+                <a:latin typeface="Arial" panose="020B0604020202020204" pitchFamily="34" charset="0"/>
+                <a:cs typeface="Arial" panose="020B0604020202020204" pitchFamily="34" charset="0"/>
+              </a:rPr>
+              <a:t>o solution to filling the entire </a:t>
+            </a:r>
+            <a:r>
+              <a:rPr lang="en-US" dirty="0" err="1" smtClean="0">
+                <a:solidFill>
+                  <a:schemeClr val="tx1"/>
+                </a:solidFill>
+                <a:latin typeface="Arial" panose="020B0604020202020204" pitchFamily="34" charset="0"/>
+                <a:cs typeface="Arial" panose="020B0604020202020204" pitchFamily="34" charset="0"/>
+              </a:rPr>
+              <a:t>cargospace</a:t>
+            </a:r>
+            <a:r>
+              <a:rPr lang="en-US" dirty="0" smtClean="0">
+                <a:solidFill>
+                  <a:schemeClr val="tx1"/>
+                </a:solidFill>
+                <a:latin typeface="Arial" panose="020B0604020202020204" pitchFamily="34" charset="0"/>
+                <a:cs typeface="Arial" panose="020B0604020202020204" pitchFamily="34" charset="0"/>
+              </a:rPr>
+              <a:t> with A,B and/or C packages has been found yet.</a:t>
+            </a:r>
+          </a:p>
+          <a:p>
+            <a:pPr>
+              <a:buClr>
+                <a:schemeClr val="tx1"/>
+              </a:buClr>
+              <a:buFont typeface="Arial" panose="020B0604020202020204" pitchFamily="34" charset="0"/>
+              <a:buChar char="•"/>
+            </a:pPr>
+            <a:r>
+              <a:rPr lang="en-US" dirty="0" smtClean="0">
+                <a:solidFill>
+                  <a:schemeClr val="tx1"/>
+                </a:solidFill>
+                <a:latin typeface="Arial" panose="020B0604020202020204" pitchFamily="34" charset="0"/>
+                <a:cs typeface="Arial" panose="020B0604020202020204" pitchFamily="34" charset="0"/>
+              </a:rPr>
+              <a:t>Best result found so far for maximizing a single packing: XXX</a:t>
+            </a:r>
+          </a:p>
+          <a:p>
+            <a:endParaRPr lang="et-EE" dirty="0"/>
+          </a:p>
+        </p:txBody>
+      </p:sp>
+    </p:spTree>
+    <p:extLst>
+      <p:ext uri="{BB962C8B-B14F-4D97-AF65-F5344CB8AC3E}">
+        <p14:creationId xmlns:p14="http://schemas.microsoft.com/office/powerpoint/2010/main" val="2928455462"/>
+      </p:ext>
+    </p:extLst>
+  </p:cSld>
+  <p:clrMapOvr>
+    <a:masterClrMapping/>
+  </p:clrMapOvr>
+  <p:timing>
+    <p:tnLst>
+      <p:par>
+        <p:cTn id="1" dur="indefinite" restart="never" nodeType="tmRoot"/>
+      </p:par>
+    </p:tnLst>
+  </p:timing>
+</p:sld>
+</file>
+
+<file path=ppt/slides/slide19.xml><?xml version="1.0" encoding="utf-8"?>
+<p:sld xmlns:a="http://schemas.openxmlformats.org/drawingml/2006/main" xmlns:r="http://schemas.openxmlformats.org/officeDocument/2006/relationships" xmlns:p="http://schemas.openxmlformats.org/presentationml/2006/main">
+  <p:cSld>
+    <p:spTree>
+      <p:nvGrpSpPr>
+        <p:cNvPr id="1" name=""/>
+        <p:cNvGrpSpPr/>
+        <p:nvPr/>
+      </p:nvGrpSpPr>
+      <p:grpSpPr>
+        <a:xfrm>
+          <a:off x="0" y="0"/>
+          <a:ext cx="0" cy="0"/>
+          <a:chOff x="0" y="0"/>
+          <a:chExt cx="0" cy="0"/>
+        </a:xfrm>
+      </p:grpSpPr>
+      <p:sp>
+        <p:nvSpPr>
+          <p:cNvPr id="2" name="Title 1"/>
+          <p:cNvSpPr>
+            <a:spLocks noGrp="1"/>
+          </p:cNvSpPr>
+          <p:nvPr>
+            <p:ph type="title"/>
+          </p:nvPr>
+        </p:nvSpPr>
         <p:spPr/>
         <p:txBody>
           <a:bodyPr/>
@@ -6897,56 +7169,137 @@
           <a:bodyPr/>
           <a:lstStyle/>
           <a:p>
-            <a:r>
-              <a:rPr lang="en-US" dirty="0" smtClean="0"/>
+            <a:pPr>
+              <a:buClr>
+                <a:schemeClr val="tx1"/>
+              </a:buClr>
+              <a:buFont typeface="Arial" panose="020B0604020202020204" pitchFamily="34" charset="0"/>
+              <a:buChar char="•"/>
+            </a:pPr>
+            <a:r>
+              <a:rPr lang="en-US" dirty="0" smtClean="0">
+                <a:solidFill>
+                  <a:schemeClr val="tx1"/>
+                </a:solidFill>
+                <a:latin typeface="Arial" panose="020B0604020202020204" pitchFamily="34" charset="0"/>
+                <a:cs typeface="Arial" panose="020B0604020202020204" pitchFamily="34" charset="0"/>
+              </a:rPr>
               <a:t>It is possible to fill the entire </a:t>
             </a:r>
             <a:r>
-              <a:rPr lang="en-US" dirty="0" err="1" smtClean="0"/>
+              <a:rPr lang="en-US" dirty="0" err="1" smtClean="0">
+                <a:solidFill>
+                  <a:schemeClr val="tx1"/>
+                </a:solidFill>
+                <a:latin typeface="Arial" panose="020B0604020202020204" pitchFamily="34" charset="0"/>
+                <a:cs typeface="Arial" panose="020B0604020202020204" pitchFamily="34" charset="0"/>
+              </a:rPr>
               <a:t>cargospace</a:t>
             </a:r>
             <a:r>
-              <a:rPr lang="en-US" dirty="0" smtClean="0"/>
+              <a:rPr lang="en-US" dirty="0" smtClean="0">
+                <a:solidFill>
+                  <a:schemeClr val="tx1"/>
+                </a:solidFill>
+                <a:latin typeface="Arial" panose="020B0604020202020204" pitchFamily="34" charset="0"/>
+                <a:cs typeface="Arial" panose="020B0604020202020204" pitchFamily="34" charset="0"/>
+              </a:rPr>
               <a:t> with L,P and/or T packages.</a:t>
             </a:r>
           </a:p>
           <a:p>
-            <a:endParaRPr lang="en-US" dirty="0" smtClean="0"/>
-          </a:p>
-          <a:p>
-            <a:endParaRPr lang="en-US" dirty="0"/>
-          </a:p>
-          <a:p>
-            <a:endParaRPr lang="en-US" dirty="0" smtClean="0"/>
-          </a:p>
-          <a:p>
-            <a:endParaRPr lang="en-US" dirty="0"/>
-          </a:p>
-          <a:p>
-            <a:endParaRPr lang="en-US" dirty="0" smtClean="0"/>
+            <a:endParaRPr lang="en-US" dirty="0" smtClean="0">
+              <a:latin typeface="Arial" panose="020B0604020202020204" pitchFamily="34" charset="0"/>
+              <a:cs typeface="Arial" panose="020B0604020202020204" pitchFamily="34" charset="0"/>
+            </a:endParaRPr>
+          </a:p>
+          <a:p>
+            <a:endParaRPr lang="en-US" dirty="0">
+              <a:latin typeface="Arial" panose="020B0604020202020204" pitchFamily="34" charset="0"/>
+              <a:cs typeface="Arial" panose="020B0604020202020204" pitchFamily="34" charset="0"/>
+            </a:endParaRPr>
+          </a:p>
+          <a:p>
+            <a:endParaRPr lang="en-US" dirty="0" smtClean="0">
+              <a:latin typeface="Arial" panose="020B0604020202020204" pitchFamily="34" charset="0"/>
+              <a:cs typeface="Arial" panose="020B0604020202020204" pitchFamily="34" charset="0"/>
+            </a:endParaRPr>
+          </a:p>
+          <a:p>
+            <a:endParaRPr lang="en-US" dirty="0">
+              <a:latin typeface="Arial" panose="020B0604020202020204" pitchFamily="34" charset="0"/>
+              <a:cs typeface="Arial" panose="020B0604020202020204" pitchFamily="34" charset="0"/>
+            </a:endParaRPr>
+          </a:p>
+          <a:p>
+            <a:endParaRPr lang="en-US" dirty="0" smtClean="0">
+              <a:latin typeface="Arial" panose="020B0604020202020204" pitchFamily="34" charset="0"/>
+              <a:cs typeface="Arial" panose="020B0604020202020204" pitchFamily="34" charset="0"/>
+            </a:endParaRPr>
           </a:p>
           <a:p>
             <a:pPr marL="0" indent="0">
               <a:buNone/>
             </a:pPr>
-            <a:endParaRPr lang="en-US" dirty="0" smtClean="0"/>
+            <a:endParaRPr lang="en-US" dirty="0" smtClean="0">
+              <a:latin typeface="Arial" panose="020B0604020202020204" pitchFamily="34" charset="0"/>
+              <a:cs typeface="Arial" panose="020B0604020202020204" pitchFamily="34" charset="0"/>
+            </a:endParaRPr>
           </a:p>
           <a:p>
             <a:pPr marL="0" indent="0">
               <a:buNone/>
             </a:pPr>
-            <a:endParaRPr lang="en-US" dirty="0"/>
-          </a:p>
-          <a:p>
-            <a:r>
-              <a:rPr lang="en-US" dirty="0" smtClean="0"/>
-              <a:t>Best </a:t>
-            </a:r>
-            <a:r>
-              <a:rPr lang="en-US" dirty="0" smtClean="0"/>
-              <a:t>result found so far for maximizing a single packing: 960 </a:t>
-            </a:r>
-            <a:endParaRPr lang="et-EE" dirty="0"/>
+            <a:endParaRPr lang="en-US" dirty="0">
+              <a:latin typeface="Arial" panose="020B0604020202020204" pitchFamily="34" charset="0"/>
+              <a:cs typeface="Arial" panose="020B0604020202020204" pitchFamily="34" charset="0"/>
+            </a:endParaRPr>
+          </a:p>
+          <a:p>
+            <a:pPr>
+              <a:buClr>
+                <a:schemeClr val="tx1"/>
+              </a:buClr>
+              <a:buFont typeface="Arial" panose="020B0604020202020204" pitchFamily="34" charset="0"/>
+              <a:buChar char="•"/>
+            </a:pPr>
+            <a:r>
+              <a:rPr lang="en-US" dirty="0" smtClean="0">
+                <a:solidFill>
+                  <a:schemeClr val="tx1"/>
+                </a:solidFill>
+                <a:latin typeface="Arial" panose="020B0604020202020204" pitchFamily="34" charset="0"/>
+                <a:cs typeface="Arial" panose="020B0604020202020204" pitchFamily="34" charset="0"/>
+              </a:rPr>
+              <a:t>Best result found so far for maximizing a single packing: </a:t>
+            </a:r>
+            <a:r>
+              <a:rPr lang="en-US" b="1" dirty="0" smtClean="0">
+                <a:solidFill>
+                  <a:schemeClr val="tx1"/>
+                </a:solidFill>
+                <a:latin typeface="Arial" panose="020B0604020202020204" pitchFamily="34" charset="0"/>
+                <a:cs typeface="Arial" panose="020B0604020202020204" pitchFamily="34" charset="0"/>
+              </a:rPr>
+              <a:t>960</a:t>
+            </a:r>
+            <a:r>
+              <a:rPr lang="en-US" dirty="0" smtClean="0">
+                <a:solidFill>
+                  <a:schemeClr val="tx1"/>
+                </a:solidFill>
+                <a:latin typeface="Arial" panose="020B0604020202020204" pitchFamily="34" charset="0"/>
+                <a:cs typeface="Arial" panose="020B0604020202020204" pitchFamily="34" charset="0"/>
+              </a:rPr>
+              <a:t> </a:t>
+            </a:r>
+            <a:endParaRPr lang="et-EE" dirty="0">
+              <a:solidFill>
+                <a:schemeClr val="tx1"/>
+              </a:solidFill>
+              <a:latin typeface="Arial" panose="020B0604020202020204" pitchFamily="34" charset="0"/>
+              <a:cs typeface="Arial" panose="020B0604020202020204" pitchFamily="34" charset="0"/>
+            </a:endParaRPr>
           </a:p>
         </p:txBody>
       </p:sp>
@@ -7092,29 +7445,64 @@
               <a:buNone/>
             </a:pPr>
             <a:r>
-              <a:rPr lang="en-US" sz="1500" dirty="0" smtClean="0">
+              <a:rPr lang="en-US" dirty="0" smtClean="0">
                 <a:solidFill>
                   <a:schemeClr val="tx1"/>
                 </a:solidFill>
                 <a:latin typeface="Arial" panose="020B0604020202020204" pitchFamily="34" charset="0"/>
                 <a:cs typeface="Arial" panose="020B0604020202020204" pitchFamily="34" charset="0"/>
               </a:rPr>
-              <a:t>	1.1 The placement method</a:t>
-            </a:r>
-          </a:p>
-          <a:p>
-            <a:pPr marL="0" indent="0">
-              <a:buNone/>
-            </a:pPr>
-            <a:r>
-              <a:rPr lang="en-US" sz="1500" dirty="0" smtClean="0">
+              <a:t>	</a:t>
+            </a:r>
+            <a:r>
+              <a:rPr lang="en-US" sz="1400" dirty="0" smtClean="0">
                 <a:solidFill>
                   <a:schemeClr val="tx1"/>
                 </a:solidFill>
                 <a:latin typeface="Arial" panose="020B0604020202020204" pitchFamily="34" charset="0"/>
                 <a:cs typeface="Arial" panose="020B0604020202020204" pitchFamily="34" charset="0"/>
               </a:rPr>
-              <a:t>	1.2 Experiments and results</a:t>
+              <a:t>1.1 </a:t>
+            </a:r>
+            <a:r>
+              <a:rPr lang="en-US" sz="1500" dirty="0" smtClean="0">
+                <a:solidFill>
+                  <a:schemeClr val="tx1"/>
+                </a:solidFill>
+                <a:latin typeface="Arial" panose="020B0604020202020204" pitchFamily="34" charset="0"/>
+                <a:cs typeface="Arial" panose="020B0604020202020204" pitchFamily="34" charset="0"/>
+              </a:rPr>
+              <a:t>Implementation</a:t>
+            </a:r>
+          </a:p>
+          <a:p>
+            <a:pPr marL="0" indent="0">
+              <a:buNone/>
+            </a:pPr>
+            <a:r>
+              <a:rPr lang="en-US" sz="1500" dirty="0" smtClean="0">
+                <a:solidFill>
+                  <a:schemeClr val="tx1"/>
+                </a:solidFill>
+                <a:latin typeface="Arial" panose="020B0604020202020204" pitchFamily="34" charset="0"/>
+                <a:cs typeface="Arial" panose="020B0604020202020204" pitchFamily="34" charset="0"/>
+              </a:rPr>
+              <a:t>	1.2 The placement method</a:t>
+            </a:r>
+          </a:p>
+          <a:p>
+            <a:pPr marL="0" indent="0">
+              <a:buNone/>
+            </a:pPr>
+            <a:r>
+              <a:rPr lang="en-US" sz="1500" dirty="0" smtClean="0">
+                <a:solidFill>
+                  <a:schemeClr val="tx1"/>
+                </a:solidFill>
+                <a:latin typeface="Arial" panose="020B0604020202020204" pitchFamily="34" charset="0"/>
+                <a:cs typeface="Arial" panose="020B0604020202020204" pitchFamily="34" charset="0"/>
+              </a:rPr>
+              <a:t>	1.3 Experiments and results</a:t>
             </a:r>
           </a:p>
           <a:p>
@@ -7199,25 +7587,8 @@
                 <a:latin typeface="Arial" panose="020B0604020202020204" pitchFamily="34" charset="0"/>
                 <a:cs typeface="Arial" panose="020B0604020202020204" pitchFamily="34" charset="0"/>
               </a:rPr>
-              <a:t>3.1 </a:t>
-            </a:r>
-            <a:r>
-              <a:rPr lang="en-US" sz="1500" dirty="0" smtClean="0">
-                <a:solidFill>
-                  <a:schemeClr val="tx1"/>
-                </a:solidFill>
-                <a:latin typeface="Arial" panose="020B0604020202020204" pitchFamily="34" charset="0"/>
-                <a:cs typeface="Arial" panose="020B0604020202020204" pitchFamily="34" charset="0"/>
-              </a:rPr>
-              <a:t>Implementation</a:t>
-            </a:r>
-            <a:endParaRPr lang="en-US" sz="1500" dirty="0" smtClean="0">
-              <a:solidFill>
-                <a:schemeClr val="tx1"/>
-              </a:solidFill>
-              <a:latin typeface="Arial" panose="020B0604020202020204" pitchFamily="34" charset="0"/>
-              <a:cs typeface="Arial" panose="020B0604020202020204" pitchFamily="34" charset="0"/>
-            </a:endParaRPr>
+              <a:t>3.1 Implementation</a:t>
+            </a:r>
           </a:p>
           <a:p>
             <a:pPr marL="0" indent="0">
@@ -7258,31 +7629,6 @@
               </a:rPr>
               <a:t>4. Comparison between algorithms</a:t>
             </a:r>
-          </a:p>
-          <a:p>
-            <a:pPr marL="0" indent="0">
-              <a:buNone/>
-            </a:pPr>
-            <a:r>
-              <a:rPr lang="en-US" dirty="0" smtClean="0">
-                <a:solidFill>
-                  <a:schemeClr val="tx1"/>
-                </a:solidFill>
-                <a:latin typeface="Arial" panose="020B0604020202020204" pitchFamily="34" charset="0"/>
-                <a:cs typeface="Arial" panose="020B0604020202020204" pitchFamily="34" charset="0"/>
-              </a:rPr>
-              <a:t>5. 3D </a:t>
-            </a:r>
-            <a:r>
-              <a:rPr lang="en-US" dirty="0" smtClean="0">
-                <a:solidFill>
-                  <a:schemeClr val="tx1"/>
-                </a:solidFill>
-                <a:latin typeface="Arial" panose="020B0604020202020204" pitchFamily="34" charset="0"/>
-                <a:cs typeface="Arial" panose="020B0604020202020204" pitchFamily="34" charset="0"/>
-              </a:rPr>
-              <a:t>representation</a:t>
-            </a:r>
             <a:r>
               <a:rPr lang="en-US" sz="1500" dirty="0" smtClean="0">
                 <a:solidFill>
@@ -7299,64 +7645,74 @@
               <a:buNone/>
             </a:pPr>
             <a:r>
-              <a:rPr lang="en-US" dirty="0" smtClean="0">
+              <a:rPr lang="en-US" dirty="0">
                 <a:solidFill>
                   <a:schemeClr val="tx1"/>
                 </a:solidFill>
                 <a:latin typeface="Arial" panose="020B0604020202020204" pitchFamily="34" charset="0"/>
                 <a:cs typeface="Arial" panose="020B0604020202020204" pitchFamily="34" charset="0"/>
               </a:rPr>
-              <a:t>6. Assignment results</a:t>
-            </a:r>
-          </a:p>
-          <a:p>
-            <a:pPr marL="0" indent="0">
-              <a:buNone/>
-            </a:pPr>
-            <a:r>
-              <a:rPr lang="en-US" sz="1500" dirty="0">
+              <a:t>5</a:t>
+            </a:r>
+            <a:r>
+              <a:rPr lang="en-US" dirty="0" smtClean="0">
                 <a:solidFill>
                   <a:schemeClr val="tx1"/>
                 </a:solidFill>
                 <a:latin typeface="Arial" panose="020B0604020202020204" pitchFamily="34" charset="0"/>
                 <a:cs typeface="Arial" panose="020B0604020202020204" pitchFamily="34" charset="0"/>
               </a:rPr>
-              <a:t>	</a:t>
-            </a:r>
-            <a:r>
-              <a:rPr lang="en-US" sz="1500" dirty="0" smtClean="0">
+              <a:t>. Assignment results</a:t>
+            </a:r>
+          </a:p>
+          <a:p>
+            <a:pPr marL="0" indent="0">
+              <a:buNone/>
+            </a:pPr>
+            <a:r>
+              <a:rPr lang="en-US" sz="1500" dirty="0">
                 <a:solidFill>
                   <a:schemeClr val="tx1"/>
                 </a:solidFill>
                 <a:latin typeface="Arial" panose="020B0604020202020204" pitchFamily="34" charset="0"/>
                 <a:cs typeface="Arial" panose="020B0604020202020204" pitchFamily="34" charset="0"/>
               </a:rPr>
-              <a:t>6.1 Using rectangular packages</a:t>
-            </a:r>
-          </a:p>
-          <a:p>
-            <a:pPr marL="0" indent="0">
-              <a:buNone/>
-            </a:pPr>
-            <a:r>
-              <a:rPr lang="en-US" sz="1500" dirty="0">
+              <a:t>	5</a:t>
+            </a:r>
+            <a:r>
+              <a:rPr lang="en-US" sz="1500" dirty="0" smtClean="0">
                 <a:solidFill>
                   <a:schemeClr val="tx1"/>
                 </a:solidFill>
                 <a:latin typeface="Arial" panose="020B0604020202020204" pitchFamily="34" charset="0"/>
                 <a:cs typeface="Arial" panose="020B0604020202020204" pitchFamily="34" charset="0"/>
               </a:rPr>
-              <a:t>	</a:t>
-            </a:r>
-            <a:r>
-              <a:rPr lang="en-US" sz="1500" dirty="0" smtClean="0">
+              <a:t>.1 Using rectangular packages</a:t>
+            </a:r>
+          </a:p>
+          <a:p>
+            <a:pPr marL="0" indent="0">
+              <a:buNone/>
+            </a:pPr>
+            <a:r>
+              <a:rPr lang="en-US" sz="1500" dirty="0">
                 <a:solidFill>
                   <a:schemeClr val="tx1"/>
                 </a:solidFill>
                 <a:latin typeface="Arial" panose="020B0604020202020204" pitchFamily="34" charset="0"/>
                 <a:cs typeface="Arial" panose="020B0604020202020204" pitchFamily="34" charset="0"/>
               </a:rPr>
-              <a:t>6.2 Using </a:t>
+              <a:t>	5</a:t>
+            </a:r>
+            <a:r>
+              <a:rPr lang="en-US" sz="1500" dirty="0" smtClean="0">
+                <a:solidFill>
+                  <a:schemeClr val="tx1"/>
+                </a:solidFill>
+                <a:latin typeface="Arial" panose="020B0604020202020204" pitchFamily="34" charset="0"/>
+                <a:cs typeface="Arial" panose="020B0604020202020204" pitchFamily="34" charset="0"/>
+              </a:rPr>
+              <a:t>.2 Using </a:t>
             </a:r>
             <a:r>
               <a:rPr lang="en-US" sz="1500" dirty="0" err="1" smtClean="0">
@@ -7399,7 +7755,10 @@
           </a:p>
           <a:p>
             <a:pPr lvl="1"/>
-            <a:endParaRPr lang="en-US" dirty="0" smtClean="0"/>
+            <a:endParaRPr lang="en-US" dirty="0" smtClean="0">
+              <a:latin typeface="Arial" panose="020B0604020202020204" pitchFamily="34" charset="0"/>
+              <a:cs typeface="Arial" panose="020B0604020202020204" pitchFamily="34" charset="0"/>
+            </a:endParaRPr>
           </a:p>
         </p:txBody>
       </p:sp>
@@ -7564,14 +7923,52 @@
         </p:blipFill>
         <p:spPr>
           <a:xfrm>
-            <a:off x="2270884" y="-22601"/>
-            <a:ext cx="5409567" cy="6880601"/>
+            <a:off x="4072388" y="60076"/>
+            <a:ext cx="5344567" cy="6654624"/>
           </a:xfrm>
           <a:prstGeom prst="rect">
             <a:avLst/>
           </a:prstGeom>
         </p:spPr>
       </p:pic>
+      <p:sp>
+        <p:nvSpPr>
+          <p:cNvPr id="2" name="TextBox 1"/>
+          <p:cNvSpPr txBox="1"/>
+          <p:nvPr/>
+        </p:nvSpPr>
+        <p:spPr>
+          <a:xfrm>
+            <a:off x="280839" y="787167"/>
+            <a:ext cx="4694829" cy="646331"/>
+          </a:xfrm>
+          <a:prstGeom prst="rect">
+            <a:avLst/>
+          </a:prstGeom>
+          <a:noFill/>
+        </p:spPr>
+        <p:txBody>
+          <a:bodyPr wrap="square" rtlCol="0">
+            <a:spAutoFit/>
+          </a:bodyPr>
+          <a:lstStyle/>
+          <a:p>
+            <a:r>
+              <a:rPr lang="en-US" sz="3600" dirty="0" smtClean="0">
+                <a:solidFill>
+                  <a:srgbClr val="92D050"/>
+                </a:solidFill>
+              </a:rPr>
+              <a:t>Implementation</a:t>
+            </a:r>
+            <a:endParaRPr lang="et-EE" sz="3600" dirty="0">
+              <a:solidFill>
+                <a:srgbClr val="92D050"/>
+              </a:solidFill>
+            </a:endParaRPr>
+          </a:p>
+        </p:txBody>
+      </p:sp>
     </p:spTree>
     <p:extLst>
       <p:ext uri="{BB962C8B-B14F-4D97-AF65-F5344CB8AC3E}">
@@ -7670,7 +8067,7 @@
         <p:spPr>
           <a:xfrm>
             <a:off x="464024" y="1842448"/>
-            <a:ext cx="11423176" cy="1200329"/>
+            <a:ext cx="11423176" cy="923330"/>
           </a:xfrm>
           <a:prstGeom prst="rect">
             <a:avLst/>
@@ -7692,7 +8089,7 @@
                 <a:latin typeface="Arial" panose="020B0604020202020204" pitchFamily="34" charset="0"/>
                 <a:cs typeface="Arial" panose="020B0604020202020204" pitchFamily="34" charset="0"/>
               </a:rPr>
-              <a:t>Initial position is at the top right front corner of the cargo space</a:t>
+              <a:t>Initial position </a:t>
             </a:r>
           </a:p>
           <a:p>
@@ -7705,7 +8102,7 @@
                 <a:latin typeface="Arial" panose="020B0604020202020204" pitchFamily="34" charset="0"/>
                 <a:cs typeface="Arial" panose="020B0604020202020204" pitchFamily="34" charset="0"/>
               </a:rPr>
-              <a:t>If there exists an overlap at the initial position, take the next package </a:t>
+              <a:t>Is there an overlap at the initial position?</a:t>
             </a:r>
           </a:p>
           <a:p>
@@ -7718,7 +8115,7 @@
                 <a:latin typeface="Arial" panose="020B0604020202020204" pitchFamily="34" charset="0"/>
                 <a:cs typeface="Arial" panose="020B0604020202020204" pitchFamily="34" charset="0"/>
               </a:rPr>
-              <a:t>Move package as far to the back (y-axis), then as far to left (x-axis) and finally as far down (z-axis) as possible</a:t>
+              <a:t>Move package as far to the back (y-axis), then as far to left (x-axis) and as far down (z-axis) as possible</a:t>
             </a:r>
           </a:p>
         </p:txBody>
@@ -7793,7 +8190,12 @@
             <p:ph idx="1"/>
           </p:nvPr>
         </p:nvSpPr>
-        <p:spPr/>
+        <p:spPr>
+          <a:xfrm>
+            <a:off x="677334" y="2283419"/>
+            <a:ext cx="8596668" cy="3880773"/>
+          </a:xfrm>
+        </p:spPr>
         <p:txBody>
           <a:bodyPr>
             <a:normAutofit/>
@@ -7826,6 +8228,117 @@
               <a:solidFill>
                 <a:schemeClr val="tx1"/>
               </a:solidFill>
+              <a:latin typeface="Arial" panose="020B0604020202020204" pitchFamily="34" charset="0"/>
+              <a:cs typeface="Arial" panose="020B0604020202020204" pitchFamily="34" charset="0"/>
+            </a:endParaRPr>
+          </a:p>
+        </p:txBody>
+      </p:sp>
+      <p:pic>
+        <p:nvPicPr>
+          <p:cNvPr id="4" name="Picture 3"/>
+          <p:cNvPicPr>
+            <a:picLocks noChangeAspect="1"/>
+          </p:cNvPicPr>
+          <p:nvPr/>
+        </p:nvPicPr>
+        <p:blipFill>
+          <a:blip r:embed="rId2">
+            <a:extLst>
+              <a:ext uri="{28A0092B-C50C-407E-A947-70E740481C1C}">
+                <a14:useLocalDpi xmlns:a14="http://schemas.microsoft.com/office/drawing/2010/main" val="0"/>
+              </a:ext>
+            </a:extLst>
+          </a:blip>
+          <a:stretch>
+            <a:fillRect/>
+          </a:stretch>
+        </p:blipFill>
+        <p:spPr>
+          <a:xfrm>
+            <a:off x="1123415" y="1270000"/>
+            <a:ext cx="7484028" cy="5502962"/>
+          </a:xfrm>
+          <a:prstGeom prst="rect">
+            <a:avLst/>
+          </a:prstGeom>
+        </p:spPr>
+      </p:pic>
+      <p:sp>
+        <p:nvSpPr>
+          <p:cNvPr id="5" name="TextBox 4"/>
+          <p:cNvSpPr txBox="1"/>
+          <p:nvPr/>
+        </p:nvSpPr>
+        <p:spPr>
+          <a:xfrm>
+            <a:off x="8669205" y="3143138"/>
+            <a:ext cx="2101755" cy="646331"/>
+          </a:xfrm>
+          <a:prstGeom prst="rect">
+            <a:avLst/>
+          </a:prstGeom>
+          <a:noFill/>
+        </p:spPr>
+        <p:txBody>
+          <a:bodyPr wrap="square" rtlCol="0">
+            <a:spAutoFit/>
+          </a:bodyPr>
+          <a:lstStyle/>
+          <a:p>
+            <a:r>
+              <a:rPr lang="en-US" dirty="0" smtClean="0">
+                <a:latin typeface="Arial" panose="020B0604020202020204" pitchFamily="34" charset="0"/>
+                <a:cs typeface="Arial" panose="020B0604020202020204" pitchFamily="34" charset="0"/>
+              </a:rPr>
+              <a:t>10 packages</a:t>
+            </a:r>
+          </a:p>
+          <a:p>
+            <a:r>
+              <a:rPr lang="en-US" dirty="0" smtClean="0">
+                <a:latin typeface="Arial" panose="020B0604020202020204" pitchFamily="34" charset="0"/>
+                <a:cs typeface="Arial" panose="020B0604020202020204" pitchFamily="34" charset="0"/>
+              </a:rPr>
+              <a:t>100000 runs</a:t>
+            </a:r>
+            <a:endParaRPr lang="et-EE" dirty="0">
+              <a:latin typeface="Arial" panose="020B0604020202020204" pitchFamily="34" charset="0"/>
+              <a:cs typeface="Arial" panose="020B0604020202020204" pitchFamily="34" charset="0"/>
+            </a:endParaRPr>
+          </a:p>
+        </p:txBody>
+      </p:sp>
+      <p:sp>
+        <p:nvSpPr>
+          <p:cNvPr id="6" name="TextBox 5"/>
+          <p:cNvSpPr txBox="1"/>
+          <p:nvPr/>
+        </p:nvSpPr>
+        <p:spPr>
+          <a:xfrm>
+            <a:off x="3767841" y="1927007"/>
+            <a:ext cx="2715904" cy="307777"/>
+          </a:xfrm>
+          <a:prstGeom prst="rect">
+            <a:avLst/>
+          </a:prstGeom>
+          <a:noFill/>
+        </p:spPr>
+        <p:txBody>
+          <a:bodyPr wrap="square" rtlCol="0">
+            <a:spAutoFit/>
+          </a:bodyPr>
+          <a:lstStyle/>
+          <a:p>
+            <a:r>
+              <a:rPr lang="en-US" sz="1400" b="1" dirty="0" smtClean="0">
+                <a:latin typeface="Arial" panose="020B0604020202020204" pitchFamily="34" charset="0"/>
+                <a:cs typeface="Arial" panose="020B0604020202020204" pitchFamily="34" charset="0"/>
+              </a:rPr>
+              <a:t>Finding the best total value</a:t>
+            </a:r>
+            <a:endParaRPr lang="et-EE" sz="1400" b="1" dirty="0">
               <a:latin typeface="Arial" panose="020B0604020202020204" pitchFamily="34" charset="0"/>
               <a:cs typeface="Arial" panose="020B0604020202020204" pitchFamily="34" charset="0"/>
             </a:endParaRPr>
@@ -7869,38 +8382,126 @@
           <a:chExt cx="0" cy="0"/>
         </a:xfrm>
       </p:grpSpPr>
-      <p:sp>
-        <p:nvSpPr>
-          <p:cNvPr id="2" name="Title 1"/>
-          <p:cNvSpPr>
-            <a:spLocks noGrp="1"/>
-          </p:cNvSpPr>
-          <p:nvPr>
-            <p:ph type="title"/>
-          </p:nvPr>
-        </p:nvSpPr>
+      <p:pic>
+        <p:nvPicPr>
+          <p:cNvPr id="4" name="Content Placeholder 3"/>
+          <p:cNvPicPr>
+            <a:picLocks noGrp="1" noChangeAspect="1"/>
+          </p:cNvPicPr>
+          <p:nvPr>
+            <p:ph idx="1"/>
+          </p:nvPr>
+        </p:nvPicPr>
+        <p:blipFill>
+          <a:blip r:embed="rId2">
+            <a:extLst>
+              <a:ext uri="{28A0092B-C50C-407E-A947-70E740481C1C}">
+                <a14:useLocalDpi xmlns:a14="http://schemas.microsoft.com/office/drawing/2010/main" val="0"/>
+              </a:ext>
+            </a:extLst>
+          </a:blip>
+          <a:stretch>
+            <a:fillRect/>
+          </a:stretch>
+        </p:blipFill>
         <p:spPr>
           <a:xfrm>
-            <a:off x="2942862" y="3120788"/>
-            <a:ext cx="8596668" cy="1320800"/>
+            <a:off x="948038" y="1187355"/>
+            <a:ext cx="7712078" cy="5670645"/>
           </a:xfrm>
         </p:spPr>
-        <p:txBody>
-          <a:bodyPr/>
-          <a:lstStyle/>
-          <a:p>
-            <a:r>
-              <a:rPr lang="en-US" dirty="0" smtClean="0"/>
-              <a:t>HILL CLIMBING ALGORITHM</a:t>
-            </a:r>
+      </p:pic>
+      <p:sp>
+        <p:nvSpPr>
+          <p:cNvPr id="5" name="TextBox 4"/>
+          <p:cNvSpPr txBox="1"/>
+          <p:nvPr/>
+        </p:nvSpPr>
+        <p:spPr>
+          <a:xfrm>
+            <a:off x="8660116" y="3293449"/>
+            <a:ext cx="1937982" cy="923330"/>
+          </a:xfrm>
+          <a:prstGeom prst="rect">
+            <a:avLst/>
+          </a:prstGeom>
+          <a:noFill/>
+        </p:spPr>
+        <p:txBody>
+          <a:bodyPr wrap="square" rtlCol="0">
+            <a:spAutoFit/>
+          </a:bodyPr>
+          <a:lstStyle/>
+          <a:p>
+            <a:r>
+              <a:rPr lang="en-US" dirty="0">
+                <a:latin typeface="Arial" panose="020B0604020202020204" pitchFamily="34" charset="0"/>
+                <a:cs typeface="Arial" panose="020B0604020202020204" pitchFamily="34" charset="0"/>
+              </a:rPr>
+              <a:t>1</a:t>
+            </a:r>
+            <a:r>
+              <a:rPr lang="en-US" dirty="0" smtClean="0">
+                <a:latin typeface="Arial" panose="020B0604020202020204" pitchFamily="34" charset="0"/>
+                <a:cs typeface="Arial" panose="020B0604020202020204" pitchFamily="34" charset="0"/>
+              </a:rPr>
+              <a:t>0 packages</a:t>
+            </a:r>
+          </a:p>
+          <a:p>
+            <a:r>
+              <a:rPr lang="en-US" dirty="0" smtClean="0">
+                <a:latin typeface="Arial" panose="020B0604020202020204" pitchFamily="34" charset="0"/>
+                <a:cs typeface="Arial" panose="020B0604020202020204" pitchFamily="34" charset="0"/>
+              </a:rPr>
+              <a:t>100000 runs</a:t>
+            </a:r>
+          </a:p>
+          <a:p>
             <a:endParaRPr lang="et-EE" dirty="0"/>
+          </a:p>
+        </p:txBody>
+      </p:sp>
+      <p:sp>
+        <p:nvSpPr>
+          <p:cNvPr id="6" name="TextBox 5"/>
+          <p:cNvSpPr txBox="1"/>
+          <p:nvPr/>
+        </p:nvSpPr>
+        <p:spPr>
+          <a:xfrm>
+            <a:off x="3511973" y="2051102"/>
+            <a:ext cx="2861532" cy="307777"/>
+          </a:xfrm>
+          <a:prstGeom prst="rect">
+            <a:avLst/>
+          </a:prstGeom>
+          <a:noFill/>
+        </p:spPr>
+        <p:txBody>
+          <a:bodyPr wrap="square" rtlCol="0">
+            <a:spAutoFit/>
+          </a:bodyPr>
+          <a:lstStyle/>
+          <a:p>
+            <a:r>
+              <a:rPr lang="en-US" sz="1400" b="1" dirty="0" smtClean="0">
+                <a:latin typeface="Arial" panose="020B0604020202020204" pitchFamily="34" charset="0"/>
+                <a:cs typeface="Arial" panose="020B0604020202020204" pitchFamily="34" charset="0"/>
+              </a:rPr>
+              <a:t>Packages that remain unused</a:t>
+            </a:r>
+            <a:endParaRPr lang="et-EE" sz="1400" b="1" dirty="0">
+              <a:latin typeface="Arial" panose="020B0604020202020204" pitchFamily="34" charset="0"/>
+              <a:cs typeface="Arial" panose="020B0604020202020204" pitchFamily="34" charset="0"/>
+            </a:endParaRPr>
           </a:p>
         </p:txBody>
       </p:sp>
     </p:spTree>
     <p:extLst>
       <p:ext uri="{BB962C8B-B14F-4D97-AF65-F5344CB8AC3E}">
-        <p14:creationId xmlns:p14="http://schemas.microsoft.com/office/powerpoint/2010/main" val="1141711639"/>
+        <p14:creationId xmlns:p14="http://schemas.microsoft.com/office/powerpoint/2010/main" val="4283857054"/>
       </p:ext>
     </p:extLst>
   </p:cSld>
@@ -7934,37 +8535,6 @@
           <a:chExt cx="0" cy="0"/>
         </a:xfrm>
       </p:grpSpPr>
-      <p:sp>
-        <p:nvSpPr>
-          <p:cNvPr id="2" name="Title 1"/>
-          <p:cNvSpPr>
-            <a:spLocks noGrp="1"/>
-          </p:cNvSpPr>
-          <p:nvPr>
-            <p:ph type="title"/>
-          </p:nvPr>
-        </p:nvSpPr>
-        <p:spPr/>
-        <p:txBody>
-          <a:bodyPr>
-            <a:normAutofit/>
-          </a:bodyPr>
-          <a:lstStyle/>
-          <a:p>
-            <a:r>
-              <a:rPr lang="en-US" dirty="0" smtClean="0">
-                <a:latin typeface="Arial" panose="020B0604020202020204" pitchFamily="34" charset="0"/>
-                <a:cs typeface="Arial" panose="020B0604020202020204" pitchFamily="34" charset="0"/>
-              </a:rPr>
-              <a:t>Implementation</a:t>
-            </a:r>
-            <a:endParaRPr lang="et-EE" dirty="0">
-              <a:latin typeface="Arial" panose="020B0604020202020204" pitchFamily="34" charset="0"/>
-              <a:cs typeface="Arial" panose="020B0604020202020204" pitchFamily="34" charset="0"/>
-            </a:endParaRPr>
-          </a:p>
-        </p:txBody>
-      </p:sp>
       <p:pic>
         <p:nvPicPr>
           <p:cNvPr id="4" name="Content Placeholder 3"/>
@@ -7989,21 +8559,21 @@
         </p:blipFill>
         <p:spPr>
           <a:xfrm>
-            <a:off x="1973500" y="3597760"/>
-            <a:ext cx="6233354" cy="2673386"/>
+            <a:off x="672562" y="1201002"/>
+            <a:ext cx="7693516" cy="5656997"/>
           </a:xfrm>
         </p:spPr>
       </p:pic>
       <p:sp>
         <p:nvSpPr>
-          <p:cNvPr id="6" name="TextBox 5"/>
+          <p:cNvPr id="5" name="TextBox 4"/>
           <p:cNvSpPr txBox="1"/>
           <p:nvPr/>
         </p:nvSpPr>
         <p:spPr>
           <a:xfrm>
-            <a:off x="677334" y="1930400"/>
-            <a:ext cx="10745842" cy="1200329"/>
+            <a:off x="3193576" y="2060812"/>
+            <a:ext cx="2593074" cy="307777"/>
           </a:xfrm>
           <a:prstGeom prst="rect">
             <a:avLst/>
@@ -8016,60 +8586,69 @@
           </a:bodyPr>
           <a:lstStyle/>
           <a:p>
-            <a:pPr marL="285750" indent="-285750">
-              <a:buFont typeface="Arial" panose="020B0604020202020204" pitchFamily="34" charset="0"/>
-              <a:buChar char="•"/>
-            </a:pPr>
-            <a:r>
-              <a:rPr lang="en-US" dirty="0" smtClean="0"/>
-              <a:t>Start with an arbitrary solution</a:t>
-            </a:r>
-          </a:p>
-          <a:p>
-            <a:pPr marL="285750" indent="-285750">
-              <a:buFont typeface="Arial" panose="020B0604020202020204" pitchFamily="34" charset="0"/>
-              <a:buChar char="•"/>
-            </a:pPr>
-            <a:r>
-              <a:rPr lang="en-US" dirty="0" smtClean="0"/>
-              <a:t>Create </a:t>
-            </a:r>
-            <a:r>
-              <a:rPr lang="en-US" dirty="0" err="1" smtClean="0"/>
-              <a:t>neighbouring</a:t>
-            </a:r>
-            <a:r>
-              <a:rPr lang="en-US" dirty="0" smtClean="0"/>
-              <a:t> solutions(change random package and fill the remaining empty space)</a:t>
-            </a:r>
-          </a:p>
-          <a:p>
-            <a:pPr marL="285750" indent="-285750">
-              <a:buFont typeface="Arial" panose="020B0604020202020204" pitchFamily="34" charset="0"/>
-              <a:buChar char="•"/>
-            </a:pPr>
-            <a:r>
-              <a:rPr lang="en-US" dirty="0" smtClean="0"/>
-              <a:t>Choose the best next solution based on an objective function (maximizing the value of a packing)</a:t>
-            </a:r>
-          </a:p>
-          <a:p>
-            <a:pPr marL="285750" indent="-285750">
-              <a:buFont typeface="Arial" panose="020B0604020202020204" pitchFamily="34" charset="0"/>
-              <a:buChar char="•"/>
-            </a:pPr>
-            <a:r>
-              <a:rPr lang="en-US" dirty="0" smtClean="0"/>
-              <a:t>Repeat until no further improvements can be made</a:t>
-            </a:r>
-            <a:endParaRPr lang="et-EE" dirty="0"/>
+            <a:r>
+              <a:rPr lang="en-US" sz="1400" b="1" dirty="0" smtClean="0">
+                <a:latin typeface="Arial" panose="020B0604020202020204" pitchFamily="34" charset="0"/>
+                <a:cs typeface="Arial" panose="020B0604020202020204" pitchFamily="34" charset="0"/>
+              </a:rPr>
+              <a:t>Finding the best total value</a:t>
+            </a:r>
+            <a:endParaRPr lang="et-EE" sz="1400" b="1" dirty="0">
+              <a:latin typeface="Arial" panose="020B0604020202020204" pitchFamily="34" charset="0"/>
+              <a:cs typeface="Arial" panose="020B0604020202020204" pitchFamily="34" charset="0"/>
+            </a:endParaRPr>
+          </a:p>
+        </p:txBody>
+      </p:sp>
+      <p:sp>
+        <p:nvSpPr>
+          <p:cNvPr id="6" name="TextBox 5"/>
+          <p:cNvSpPr txBox="1"/>
+          <p:nvPr/>
+        </p:nvSpPr>
+        <p:spPr>
+          <a:xfrm>
+            <a:off x="8366078" y="3383170"/>
+            <a:ext cx="2893325" cy="646331"/>
+          </a:xfrm>
+          <a:prstGeom prst="rect">
+            <a:avLst/>
+          </a:prstGeom>
+          <a:noFill/>
+        </p:spPr>
+        <p:txBody>
+          <a:bodyPr wrap="square" rtlCol="0">
+            <a:spAutoFit/>
+          </a:bodyPr>
+          <a:lstStyle/>
+          <a:p>
+            <a:r>
+              <a:rPr lang="en-US" dirty="0" smtClean="0">
+                <a:latin typeface="Arial" panose="020B0604020202020204" pitchFamily="34" charset="0"/>
+                <a:cs typeface="Arial" panose="020B0604020202020204" pitchFamily="34" charset="0"/>
+              </a:rPr>
+              <a:t>30 packages</a:t>
+            </a:r>
+          </a:p>
+          <a:p>
+            <a:r>
+              <a:rPr lang="en-US" dirty="0" smtClean="0">
+                <a:latin typeface="Arial" panose="020B0604020202020204" pitchFamily="34" charset="0"/>
+                <a:cs typeface="Arial" panose="020B0604020202020204" pitchFamily="34" charset="0"/>
+              </a:rPr>
+              <a:t>1000 runs</a:t>
+            </a:r>
+            <a:endParaRPr lang="et-EE" dirty="0">
+              <a:latin typeface="Arial" panose="020B0604020202020204" pitchFamily="34" charset="0"/>
+              <a:cs typeface="Arial" panose="020B0604020202020204" pitchFamily="34" charset="0"/>
+            </a:endParaRPr>
           </a:p>
         </p:txBody>
       </p:sp>
     </p:spTree>
     <p:extLst>
       <p:ext uri="{BB962C8B-B14F-4D97-AF65-F5344CB8AC3E}">
-        <p14:creationId xmlns:p14="http://schemas.microsoft.com/office/powerpoint/2010/main" val="2958339159"/>
+        <p14:creationId xmlns:p14="http://schemas.microsoft.com/office/powerpoint/2010/main" val="3628074858"/>
       </p:ext>
     </p:extLst>
   </p:cSld>
@@ -8103,52 +8682,120 @@
           <a:chExt cx="0" cy="0"/>
         </a:xfrm>
       </p:grpSpPr>
-      <p:sp>
-        <p:nvSpPr>
-          <p:cNvPr id="2" name="Title 1"/>
-          <p:cNvSpPr>
-            <a:spLocks noGrp="1"/>
-          </p:cNvSpPr>
-          <p:nvPr>
-            <p:ph type="title"/>
-          </p:nvPr>
-        </p:nvSpPr>
-        <p:spPr/>
-        <p:txBody>
-          <a:bodyPr/>
-          <a:lstStyle/>
-          <a:p>
-            <a:r>
-              <a:rPr lang="en-US" dirty="0" smtClean="0"/>
-              <a:t>Experiments and results</a:t>
-            </a:r>
-            <a:endParaRPr lang="et-EE" dirty="0"/>
-          </a:p>
-        </p:txBody>
-      </p:sp>
-      <p:sp>
-        <p:nvSpPr>
-          <p:cNvPr id="3" name="Content Placeholder 2"/>
-          <p:cNvSpPr>
-            <a:spLocks noGrp="1"/>
-          </p:cNvSpPr>
+      <p:pic>
+        <p:nvPicPr>
+          <p:cNvPr id="4" name="Content Placeholder 3"/>
+          <p:cNvPicPr>
+            <a:picLocks noGrp="1" noChangeAspect="1"/>
+          </p:cNvPicPr>
           <p:nvPr>
             <p:ph idx="1"/>
           </p:nvPr>
-        </p:nvSpPr>
-        <p:spPr/>
-        <p:txBody>
-          <a:bodyPr/>
-          <a:lstStyle/>
-          <a:p>
-            <a:endParaRPr lang="et-EE" dirty="0"/>
+        </p:nvPicPr>
+        <p:blipFill>
+          <a:blip r:embed="rId2">
+            <a:extLst>
+              <a:ext uri="{28A0092B-C50C-407E-A947-70E740481C1C}">
+                <a14:useLocalDpi xmlns:a14="http://schemas.microsoft.com/office/drawing/2010/main" val="0"/>
+              </a:ext>
+            </a:extLst>
+          </a:blip>
+          <a:stretch>
+            <a:fillRect/>
+          </a:stretch>
+        </p:blipFill>
+        <p:spPr>
+          <a:xfrm>
+            <a:off x="545909" y="1003726"/>
+            <a:ext cx="7961813" cy="5854274"/>
+          </a:xfrm>
+        </p:spPr>
+      </p:pic>
+      <p:sp>
+        <p:nvSpPr>
+          <p:cNvPr id="5" name="TextBox 4"/>
+          <p:cNvSpPr txBox="1"/>
+          <p:nvPr/>
+        </p:nvSpPr>
+        <p:spPr>
+          <a:xfrm>
+            <a:off x="8412188" y="3284532"/>
+            <a:ext cx="3125337" cy="646331"/>
+          </a:xfrm>
+          <a:prstGeom prst="rect">
+            <a:avLst/>
+          </a:prstGeom>
+          <a:noFill/>
+        </p:spPr>
+        <p:txBody>
+          <a:bodyPr wrap="square" rtlCol="0">
+            <a:spAutoFit/>
+          </a:bodyPr>
+          <a:lstStyle/>
+          <a:p>
+            <a:r>
+              <a:rPr lang="en-US" dirty="0" smtClean="0">
+                <a:latin typeface="Arial" panose="020B0604020202020204" pitchFamily="34" charset="0"/>
+                <a:cs typeface="Arial" panose="020B0604020202020204" pitchFamily="34" charset="0"/>
+              </a:rPr>
+              <a:t>100 packages</a:t>
+            </a:r>
+          </a:p>
+          <a:p>
+            <a:r>
+              <a:rPr lang="en-US" dirty="0" smtClean="0">
+                <a:latin typeface="Arial" panose="020B0604020202020204" pitchFamily="34" charset="0"/>
+                <a:cs typeface="Arial" panose="020B0604020202020204" pitchFamily="34" charset="0"/>
+              </a:rPr>
+              <a:t>1000 runs</a:t>
+            </a:r>
+            <a:endParaRPr lang="et-EE" dirty="0">
+              <a:latin typeface="Arial" panose="020B0604020202020204" pitchFamily="34" charset="0"/>
+              <a:cs typeface="Arial" panose="020B0604020202020204" pitchFamily="34" charset="0"/>
+            </a:endParaRPr>
+          </a:p>
+        </p:txBody>
+      </p:sp>
+      <p:sp>
+        <p:nvSpPr>
+          <p:cNvPr id="6" name="TextBox 5"/>
+          <p:cNvSpPr txBox="1"/>
+          <p:nvPr/>
+        </p:nvSpPr>
+        <p:spPr>
+          <a:xfrm>
+            <a:off x="3312165" y="1776511"/>
+            <a:ext cx="2729553" cy="307777"/>
+          </a:xfrm>
+          <a:prstGeom prst="rect">
+            <a:avLst/>
+          </a:prstGeom>
+          <a:noFill/>
+        </p:spPr>
+        <p:txBody>
+          <a:bodyPr wrap="square" rtlCol="0">
+            <a:spAutoFit/>
+          </a:bodyPr>
+          <a:lstStyle/>
+          <a:p>
+            <a:r>
+              <a:rPr lang="en-US" sz="1400" b="1" dirty="0" smtClean="0">
+                <a:latin typeface="Arial" panose="020B0604020202020204" pitchFamily="34" charset="0"/>
+                <a:cs typeface="Arial" panose="020B0604020202020204" pitchFamily="34" charset="0"/>
+              </a:rPr>
+              <a:t>Finding the best total value</a:t>
+            </a:r>
+            <a:endParaRPr lang="et-EE" sz="1400" b="1" dirty="0">
+              <a:latin typeface="Arial" panose="020B0604020202020204" pitchFamily="34" charset="0"/>
+              <a:cs typeface="Arial" panose="020B0604020202020204" pitchFamily="34" charset="0"/>
+            </a:endParaRPr>
           </a:p>
         </p:txBody>
       </p:sp>
     </p:spTree>
     <p:extLst>
       <p:ext uri="{BB962C8B-B14F-4D97-AF65-F5344CB8AC3E}">
-        <p14:creationId xmlns:p14="http://schemas.microsoft.com/office/powerpoint/2010/main" val="3675406741"/>
+        <p14:creationId xmlns:p14="http://schemas.microsoft.com/office/powerpoint/2010/main" val="3764604283"/>
       </p:ext>
     </p:extLst>
   </p:cSld>

</xml_diff>

<commit_message>
Added something to the fitness function of the GA
</commit_message>
<xml_diff>
--- a/Report, presentation and related stuff/Knapsack_problem.pptx
+++ b/Report, presentation and related stuff/Knapsack_problem.pptx
@@ -894,7 +894,7 @@
           <a:p>
             <a:fld id="{348CCCA5-816C-4E2B-9087-5AA4BDC9BCA4}" type="slidenum">
               <a:rPr lang="et-EE" smtClean="0"/>
-              <a:t>‹#›</a:t>
+              <a:t>‹Nr.›</a:t>
             </a:fld>
             <a:endParaRPr lang="et-EE"/>
           </a:p>
@@ -1145,7 +1145,7 @@
           <a:p>
             <a:fld id="{348CCCA5-816C-4E2B-9087-5AA4BDC9BCA4}" type="slidenum">
               <a:rPr lang="et-EE" smtClean="0"/>
-              <a:t>‹#›</a:t>
+              <a:t>‹Nr.›</a:t>
             </a:fld>
             <a:endParaRPr lang="et-EE"/>
           </a:p>
@@ -1459,7 +1459,7 @@
           <a:p>
             <a:fld id="{348CCCA5-816C-4E2B-9087-5AA4BDC9BCA4}" type="slidenum">
               <a:rPr lang="et-EE" smtClean="0"/>
-              <a:t>‹#›</a:t>
+              <a:t>‹Nr.›</a:t>
             </a:fld>
             <a:endParaRPr lang="et-EE"/>
           </a:p>
@@ -1800,7 +1800,7 @@
           <a:p>
             <a:fld id="{348CCCA5-816C-4E2B-9087-5AA4BDC9BCA4}" type="slidenum">
               <a:rPr lang="et-EE" smtClean="0"/>
-              <a:t>‹#›</a:t>
+              <a:t>‹Nr.›</a:t>
             </a:fld>
             <a:endParaRPr lang="et-EE"/>
           </a:p>
@@ -2114,7 +2114,7 @@
           <a:p>
             <a:fld id="{348CCCA5-816C-4E2B-9087-5AA4BDC9BCA4}" type="slidenum">
               <a:rPr lang="et-EE" smtClean="0"/>
-              <a:t>‹#›</a:t>
+              <a:t>‹Nr.›</a:t>
             </a:fld>
             <a:endParaRPr lang="et-EE"/>
           </a:p>
@@ -2507,7 +2507,7 @@
           <a:p>
             <a:fld id="{348CCCA5-816C-4E2B-9087-5AA4BDC9BCA4}" type="slidenum">
               <a:rPr lang="et-EE" smtClean="0"/>
-              <a:t>‹#›</a:t>
+              <a:t>‹Nr.›</a:t>
             </a:fld>
             <a:endParaRPr lang="et-EE"/>
           </a:p>
@@ -2677,7 +2677,7 @@
           <a:p>
             <a:fld id="{348CCCA5-816C-4E2B-9087-5AA4BDC9BCA4}" type="slidenum">
               <a:rPr lang="et-EE" smtClean="0"/>
-              <a:t>‹#›</a:t>
+              <a:t>‹Nr.›</a:t>
             </a:fld>
             <a:endParaRPr lang="et-EE"/>
           </a:p>
@@ -2857,7 +2857,7 @@
           <a:p>
             <a:fld id="{348CCCA5-816C-4E2B-9087-5AA4BDC9BCA4}" type="slidenum">
               <a:rPr lang="et-EE" smtClean="0"/>
-              <a:t>‹#›</a:t>
+              <a:t>‹Nr.›</a:t>
             </a:fld>
             <a:endParaRPr lang="et-EE"/>
           </a:p>
@@ -3033,7 +3033,7 @@
           <a:p>
             <a:fld id="{348CCCA5-816C-4E2B-9087-5AA4BDC9BCA4}" type="slidenum">
               <a:rPr lang="et-EE" smtClean="0"/>
-              <a:t>‹#›</a:t>
+              <a:t>‹Nr.›</a:t>
             </a:fld>
             <a:endParaRPr lang="et-EE"/>
           </a:p>
@@ -3280,7 +3280,7 @@
           <a:p>
             <a:fld id="{348CCCA5-816C-4E2B-9087-5AA4BDC9BCA4}" type="slidenum">
               <a:rPr lang="et-EE" smtClean="0"/>
-              <a:t>‹#›</a:t>
+              <a:t>‹Nr.›</a:t>
             </a:fld>
             <a:endParaRPr lang="et-EE"/>
           </a:p>
@@ -3512,7 +3512,7 @@
           <a:p>
             <a:fld id="{348CCCA5-816C-4E2B-9087-5AA4BDC9BCA4}" type="slidenum">
               <a:rPr lang="et-EE" smtClean="0"/>
-              <a:t>‹#›</a:t>
+              <a:t>‹Nr.›</a:t>
             </a:fld>
             <a:endParaRPr lang="et-EE"/>
           </a:p>
@@ -3886,7 +3886,7 @@
           <a:p>
             <a:fld id="{348CCCA5-816C-4E2B-9087-5AA4BDC9BCA4}" type="slidenum">
               <a:rPr lang="et-EE" smtClean="0"/>
-              <a:t>‹#›</a:t>
+              <a:t>‹Nr.›</a:t>
             </a:fld>
             <a:endParaRPr lang="et-EE"/>
           </a:p>
@@ -4009,7 +4009,7 @@
           <a:p>
             <a:fld id="{348CCCA5-816C-4E2B-9087-5AA4BDC9BCA4}" type="slidenum">
               <a:rPr lang="et-EE" smtClean="0"/>
-              <a:t>‹#›</a:t>
+              <a:t>‹Nr.›</a:t>
             </a:fld>
             <a:endParaRPr lang="et-EE"/>
           </a:p>
@@ -4104,7 +4104,7 @@
           <a:p>
             <a:fld id="{348CCCA5-816C-4E2B-9087-5AA4BDC9BCA4}" type="slidenum">
               <a:rPr lang="et-EE" smtClean="0"/>
-              <a:t>‹#›</a:t>
+              <a:t>‹Nr.›</a:t>
             </a:fld>
             <a:endParaRPr lang="et-EE"/>
           </a:p>
@@ -4359,7 +4359,7 @@
           <a:p>
             <a:fld id="{348CCCA5-816C-4E2B-9087-5AA4BDC9BCA4}" type="slidenum">
               <a:rPr lang="et-EE" smtClean="0"/>
-              <a:t>‹#›</a:t>
+              <a:t>‹Nr.›</a:t>
             </a:fld>
             <a:endParaRPr lang="et-EE"/>
           </a:p>
@@ -4622,7 +4622,7 @@
           <a:p>
             <a:fld id="{348CCCA5-816C-4E2B-9087-5AA4BDC9BCA4}" type="slidenum">
               <a:rPr lang="et-EE" smtClean="0"/>
-              <a:t>‹#›</a:t>
+              <a:t>‹Nr.›</a:t>
             </a:fld>
             <a:endParaRPr lang="et-EE"/>
           </a:p>
@@ -5399,7 +5399,7 @@
           <a:p>
             <a:fld id="{348CCCA5-816C-4E2B-9087-5AA4BDC9BCA4}" type="slidenum">
               <a:rPr lang="et-EE" smtClean="0"/>
-              <a:t>‹#›</a:t>
+              <a:t>‹Nr.›</a:t>
             </a:fld>
             <a:endParaRPr lang="et-EE"/>
           </a:p>
@@ -5979,8 +5979,35 @@
                 <a:latin typeface="Arial" panose="020B0604020202020204" pitchFamily="34" charset="0"/>
                 <a:cs typeface="Arial" panose="020B0604020202020204" pitchFamily="34" charset="0"/>
               </a:rPr>
-              <a:t>Kästner</a:t>
-            </a:r>
+              <a:t>K</a:t>
+            </a:r>
+            <a:r>
+              <a:rPr lang="de-DE" dirty="0" err="1" smtClean="0">
+                <a:solidFill>
+                  <a:schemeClr val="tx1"/>
+                </a:solidFill>
+                <a:latin typeface="Arial" panose="020B0604020202020204" pitchFamily="34" charset="0"/>
+                <a:cs typeface="Arial" panose="020B0604020202020204" pitchFamily="34" charset="0"/>
+              </a:rPr>
+              <a:t>ae</a:t>
+            </a:r>
+            <a:r>
+              <a:rPr lang="et-EE" dirty="0" smtClean="0">
+                <a:solidFill>
+                  <a:schemeClr val="tx1"/>
+                </a:solidFill>
+                <a:latin typeface="Arial" panose="020B0604020202020204" pitchFamily="34" charset="0"/>
+                <a:cs typeface="Arial" panose="020B0604020202020204" pitchFamily="34" charset="0"/>
+              </a:rPr>
+              <a:t>stner</a:t>
+            </a:r>
+            <a:endParaRPr lang="et-EE" dirty="0" smtClean="0">
+              <a:solidFill>
+                <a:schemeClr val="tx1"/>
+              </a:solidFill>
+              <a:latin typeface="Arial" panose="020B0604020202020204" pitchFamily="34" charset="0"/>
+              <a:cs typeface="Arial" panose="020B0604020202020204" pitchFamily="34" charset="0"/>
+            </a:endParaRPr>
           </a:p>
           <a:p>
             <a:pPr algn="ctr"/>

</xml_diff>

<commit_message>
Hill climbing and presentation latest version
</commit_message>
<xml_diff>
--- a/Report, presentation and related stuff/Knapsack_problem.pptx
+++ b/Report, presentation and related stuff/Knapsack_problem.pptx
@@ -6216,7 +6216,7 @@
         </p:blipFill>
         <p:spPr>
           <a:xfrm>
-            <a:off x="1973500" y="3597760"/>
+            <a:off x="1973500" y="3978760"/>
             <a:ext cx="6233354" cy="2673386"/>
           </a:xfrm>
         </p:spPr>
@@ -6229,8 +6229,8 @@
         </p:nvSpPr>
         <p:spPr>
           <a:xfrm>
-            <a:off x="677334" y="1930400"/>
-            <a:ext cx="10745842" cy="1200329"/>
+            <a:off x="677334" y="1803400"/>
+            <a:ext cx="9419703" cy="1938992"/>
           </a:xfrm>
           <a:prstGeom prst="rect">
             <a:avLst/>
@@ -6248,7 +6248,10 @@
               <a:buChar char="•"/>
             </a:pPr>
             <a:r>
-              <a:rPr lang="en-US" dirty="0" smtClean="0"/>
+              <a:rPr lang="en-US" sz="2000" dirty="0" smtClean="0">
+                <a:latin typeface="Arial" panose="020B0604020202020204" pitchFamily="34" charset="0"/>
+                <a:cs typeface="Arial" panose="020B0604020202020204" pitchFamily="34" charset="0"/>
+              </a:rPr>
               <a:t>Start with an arbitrary solution</a:t>
             </a:r>
           </a:p>
@@ -6258,24 +6261,39 @@
               <a:buChar char="•"/>
             </a:pPr>
             <a:r>
-              <a:rPr lang="en-US" dirty="0" smtClean="0"/>
+              <a:rPr lang="en-US" sz="2000" dirty="0" smtClean="0">
+                <a:latin typeface="Arial" panose="020B0604020202020204" pitchFamily="34" charset="0"/>
+                <a:cs typeface="Arial" panose="020B0604020202020204" pitchFamily="34" charset="0"/>
+              </a:rPr>
               <a:t>Create </a:t>
             </a:r>
             <a:r>
-              <a:rPr lang="en-US" dirty="0" err="1" smtClean="0"/>
+              <a:rPr lang="en-US" sz="2000" dirty="0" err="1" smtClean="0">
+                <a:latin typeface="Arial" panose="020B0604020202020204" pitchFamily="34" charset="0"/>
+                <a:cs typeface="Arial" panose="020B0604020202020204" pitchFamily="34" charset="0"/>
+              </a:rPr>
               <a:t>neighbouring</a:t>
             </a:r>
             <a:r>
-              <a:rPr lang="en-US" dirty="0" smtClean="0"/>
-              <a:t> </a:t>
-            </a:r>
-            <a:r>
-              <a:rPr lang="en-US" dirty="0" smtClean="0"/>
-              <a:t>solutions (change </a:t>
-            </a:r>
-            <a:r>
-              <a:rPr lang="en-US" dirty="0" smtClean="0"/>
-              <a:t>random package and fill the remaining empty space)</a:t>
+              <a:rPr lang="en-US" sz="2000" dirty="0" smtClean="0">
+                <a:latin typeface="Arial" panose="020B0604020202020204" pitchFamily="34" charset="0"/>
+                <a:cs typeface="Arial" panose="020B0604020202020204" pitchFamily="34" charset="0"/>
+              </a:rPr>
+              <a:t> solutions (change </a:t>
+            </a:r>
+            <a:r>
+              <a:rPr lang="en-US" sz="2000" dirty="0" smtClean="0">
+                <a:latin typeface="Arial" panose="020B0604020202020204" pitchFamily="34" charset="0"/>
+                <a:cs typeface="Arial" panose="020B0604020202020204" pitchFamily="34" charset="0"/>
+              </a:rPr>
+              <a:t>n random packages </a:t>
+            </a:r>
+            <a:r>
+              <a:rPr lang="en-US" sz="2000" dirty="0" smtClean="0">
+                <a:latin typeface="Arial" panose="020B0604020202020204" pitchFamily="34" charset="0"/>
+                <a:cs typeface="Arial" panose="020B0604020202020204" pitchFamily="34" charset="0"/>
+              </a:rPr>
+              <a:t>and fill the remaining empty space)</a:t>
             </a:r>
           </a:p>
           <a:p>
@@ -6284,7 +6302,10 @@
               <a:buChar char="•"/>
             </a:pPr>
             <a:r>
-              <a:rPr lang="en-US" dirty="0" smtClean="0"/>
+              <a:rPr lang="en-US" sz="2000" dirty="0" smtClean="0">
+                <a:latin typeface="Arial" panose="020B0604020202020204" pitchFamily="34" charset="0"/>
+                <a:cs typeface="Arial" panose="020B0604020202020204" pitchFamily="34" charset="0"/>
+              </a:rPr>
               <a:t>Choose the best next solution based on an objective function (maximizing the value of a packing)</a:t>
             </a:r>
           </a:p>
@@ -6294,10 +6315,16 @@
               <a:buChar char="•"/>
             </a:pPr>
             <a:r>
-              <a:rPr lang="en-US" dirty="0" smtClean="0"/>
+              <a:rPr lang="en-US" sz="2000" dirty="0" smtClean="0">
+                <a:latin typeface="Arial" panose="020B0604020202020204" pitchFamily="34" charset="0"/>
+                <a:cs typeface="Arial" panose="020B0604020202020204" pitchFamily="34" charset="0"/>
+              </a:rPr>
               <a:t>Repeat until no further improvements can be made</a:t>
             </a:r>
-            <a:endParaRPr lang="et-EE" dirty="0"/>
+            <a:endParaRPr lang="et-EE" sz="2000" dirty="0">
+              <a:latin typeface="Arial" panose="020B0604020202020204" pitchFamily="34" charset="0"/>
+              <a:cs typeface="Arial" panose="020B0604020202020204" pitchFamily="34" charset="0"/>
+            </a:endParaRPr>
           </a:p>
         </p:txBody>
       </p:sp>
@@ -6529,7 +6556,9 @@
         </p:nvSpPr>
         <p:spPr/>
         <p:txBody>
-          <a:bodyPr/>
+          <a:bodyPr>
+            <a:normAutofit/>
+          </a:bodyPr>
           <a:lstStyle/>
           <a:p>
             <a:pPr>
@@ -6540,7 +6569,7 @@
               <a:buChar char="•"/>
             </a:pPr>
             <a:r>
-              <a:rPr lang="en-US" dirty="0" smtClean="0">
+              <a:rPr lang="en-US" sz="2400" dirty="0" smtClean="0">
                 <a:solidFill>
                   <a:schemeClr val="tx1"/>
                 </a:solidFill>
@@ -6550,7 +6579,7 @@
               <a:t>Chromosomes</a:t>
             </a:r>
             <a:r>
-              <a:rPr lang="en-US" dirty="0">
+              <a:rPr lang="en-US" sz="2400" dirty="0">
                 <a:solidFill>
                   <a:schemeClr val="tx1"/>
                 </a:solidFill>
@@ -6560,7 +6589,7 @@
               <a:t> (an array consisting of 0’s and 1’s</a:t>
             </a:r>
             <a:r>
-              <a:rPr lang="en-US" dirty="0" smtClean="0">
+              <a:rPr lang="en-US" sz="2400" dirty="0" smtClean="0">
                 <a:solidFill>
                   <a:schemeClr val="tx1"/>
                 </a:solidFill>
@@ -6579,7 +6608,7 @@
               <a:buChar char="•"/>
             </a:pPr>
             <a:r>
-              <a:rPr lang="en-US" dirty="0" smtClean="0">
+              <a:rPr lang="en-US" sz="2400" dirty="0" smtClean="0">
                 <a:solidFill>
                   <a:schemeClr val="tx1"/>
                 </a:solidFill>
@@ -6598,7 +6627,7 @@
               <a:buChar char="•"/>
             </a:pPr>
             <a:r>
-              <a:rPr lang="en-US" dirty="0" smtClean="0">
+              <a:rPr lang="en-US" sz="2400" dirty="0" smtClean="0">
                 <a:solidFill>
                   <a:schemeClr val="tx1"/>
                 </a:solidFill>
@@ -6616,7 +6645,7 @@
               <a:buFont typeface="Arial" panose="020B0604020202020204" pitchFamily="34" charset="0"/>
               <a:buChar char="•"/>
             </a:pPr>
-            <a:endParaRPr lang="en-US" dirty="0" smtClean="0">
+            <a:endParaRPr lang="en-US" sz="2400" dirty="0" smtClean="0">
               <a:solidFill>
                 <a:schemeClr val="tx1"/>
               </a:solidFill>
@@ -6632,7 +6661,7 @@
               <a:buFont typeface="Arial" panose="020B0604020202020204" pitchFamily="34" charset="0"/>
               <a:buChar char="•"/>
             </a:pPr>
-            <a:endParaRPr lang="et-EE" dirty="0">
+            <a:endParaRPr lang="et-EE" sz="2400" dirty="0">
               <a:solidFill>
                 <a:schemeClr val="tx1"/>
               </a:solidFill>
@@ -6805,7 +6834,9 @@
         </p:nvSpPr>
         <p:spPr/>
         <p:txBody>
-          <a:bodyPr/>
+          <a:bodyPr>
+            <a:normAutofit/>
+          </a:bodyPr>
           <a:lstStyle/>
           <a:p>
             <a:pPr>
@@ -6814,7 +6845,7 @@
               <a:buChar char="•"/>
             </a:pPr>
             <a:r>
-              <a:rPr lang="en-US" dirty="0" smtClean="0">
+              <a:rPr lang="en-US" sz="2400" dirty="0" smtClean="0">
                 <a:solidFill>
                   <a:schemeClr val="tx1"/>
                 </a:solidFill>
@@ -6831,7 +6862,7 @@
               <a:buChar char="•"/>
             </a:pPr>
             <a:r>
-              <a:rPr lang="en-US" dirty="0" smtClean="0">
+              <a:rPr lang="en-US" sz="2400" dirty="0" smtClean="0">
                 <a:solidFill>
                   <a:schemeClr val="tx1"/>
                 </a:solidFill>
@@ -6848,33 +6879,26 @@
               <a:buChar char="•"/>
             </a:pPr>
             <a:r>
-              <a:rPr lang="en-US" dirty="0" smtClean="0">
+              <a:rPr lang="en-US" sz="2400" dirty="0" smtClean="0">
                 <a:solidFill>
                   <a:schemeClr val="tx1"/>
                 </a:solidFill>
                 <a:latin typeface="Arial" panose="020B0604020202020204" pitchFamily="34" charset="0"/>
                 <a:cs typeface="Arial" panose="020B0604020202020204" pitchFamily="34" charset="0"/>
               </a:rPr>
-              <a:t>Genetic algorithm is time consuming and has a lot of parameters that need to be taken into account (difficult to implement) but it is the most likely to find the optimal solution.</a:t>
-            </a:r>
-          </a:p>
-          <a:p>
-            <a:pPr>
-              <a:buClrTx/>
-              <a:buFont typeface="Arial" panose="020B0604020202020204" pitchFamily="34" charset="0"/>
-              <a:buChar char="•"/>
-            </a:pPr>
-            <a:r>
-              <a:rPr lang="en-US" dirty="0" smtClean="0">
+              <a:t>Genetic algorithm is time consuming and has a lot of parameters that need to be taken into account (difficult to implement) but it is the most likely to find the optimal solution</a:t>
+            </a:r>
+            <a:r>
+              <a:rPr lang="en-US" sz="2400" dirty="0" smtClean="0">
                 <a:solidFill>
                   <a:schemeClr val="tx1"/>
                 </a:solidFill>
                 <a:latin typeface="Arial" panose="020B0604020202020204" pitchFamily="34" charset="0"/>
                 <a:cs typeface="Arial" panose="020B0604020202020204" pitchFamily="34" charset="0"/>
               </a:rPr>
-              <a:t>Which one has the best result using the same number of packages?</a:t>
-            </a:r>
-            <a:endParaRPr lang="et-EE" dirty="0">
+              <a:t>.</a:t>
+            </a:r>
+            <a:endParaRPr lang="et-EE" sz="2400" dirty="0">
               <a:solidFill>
                 <a:schemeClr val="tx1"/>
               </a:solidFill>
@@ -7027,7 +7051,9 @@
         </p:nvSpPr>
         <p:spPr/>
         <p:txBody>
-          <a:bodyPr/>
+          <a:bodyPr>
+            <a:normAutofit/>
+          </a:bodyPr>
           <a:lstStyle/>
           <a:p>
             <a:pPr>
@@ -7038,7 +7064,7 @@
               <a:buChar char="•"/>
             </a:pPr>
             <a:r>
-              <a:rPr lang="en-US" dirty="0">
+              <a:rPr lang="en-US" sz="2800" dirty="0">
                 <a:solidFill>
                   <a:schemeClr val="tx1"/>
                 </a:solidFill>
@@ -7048,34 +7074,14 @@
               <a:t>N</a:t>
             </a:r>
             <a:r>
-              <a:rPr lang="en-US" dirty="0" smtClean="0">
+              <a:rPr lang="en-US" sz="2800" dirty="0" smtClean="0">
                 <a:solidFill>
                   <a:schemeClr val="tx1"/>
                 </a:solidFill>
                 <a:latin typeface="Arial" panose="020B0604020202020204" pitchFamily="34" charset="0"/>
                 <a:cs typeface="Arial" panose="020B0604020202020204" pitchFamily="34" charset="0"/>
               </a:rPr>
-              <a:t>o solution to filling the entire </a:t>
-            </a:r>
-            <a:r>
-              <a:rPr lang="en-US" dirty="0" smtClean="0">
-                <a:solidFill>
-                  <a:schemeClr val="tx1"/>
-                </a:solidFill>
-                <a:latin typeface="Arial" panose="020B0604020202020204" pitchFamily="34" charset="0"/>
-                <a:cs typeface="Arial" panose="020B0604020202020204" pitchFamily="34" charset="0"/>
-              </a:rPr>
-              <a:t>cargo space </a:t>
-            </a:r>
-            <a:r>
-              <a:rPr lang="en-US" dirty="0" smtClean="0">
-                <a:solidFill>
-                  <a:schemeClr val="tx1"/>
-                </a:solidFill>
-                <a:latin typeface="Arial" panose="020B0604020202020204" pitchFamily="34" charset="0"/>
-                <a:cs typeface="Arial" panose="020B0604020202020204" pitchFamily="34" charset="0"/>
-              </a:rPr>
-              <a:t>with A,B and/or C packages has been found yet.</a:t>
+              <a:t>o solution to filling the entire cargo space with A,B and/or C packages has been found yet.</a:t>
             </a:r>
           </a:p>
           <a:p>
@@ -7087,35 +7093,18 @@
               <a:buChar char="•"/>
             </a:pPr>
             <a:r>
-              <a:rPr lang="en-US" dirty="0" smtClean="0">
+              <a:rPr lang="en-US" sz="2800" dirty="0" smtClean="0">
                 <a:solidFill>
                   <a:schemeClr val="tx1"/>
                 </a:solidFill>
                 <a:latin typeface="Arial" panose="020B0604020202020204" pitchFamily="34" charset="0"/>
                 <a:cs typeface="Arial" panose="020B0604020202020204" pitchFamily="34" charset="0"/>
               </a:rPr>
-              <a:t>Best result found so far for maximizing a single packing: </a:t>
-            </a:r>
-            <a:r>
-              <a:rPr lang="en-US" dirty="0" smtClean="0">
-                <a:solidFill>
-                  <a:schemeClr val="tx1"/>
-                </a:solidFill>
-                <a:latin typeface="Arial" panose="020B0604020202020204" pitchFamily="34" charset="0"/>
-                <a:cs typeface="Arial" panose="020B0604020202020204" pitchFamily="34" charset="0"/>
-              </a:rPr>
-              <a:t>324</a:t>
-            </a:r>
-            <a:endParaRPr lang="en-US" dirty="0" smtClean="0">
-              <a:solidFill>
-                <a:schemeClr val="tx1"/>
-              </a:solidFill>
-              <a:latin typeface="Arial" panose="020B0604020202020204" pitchFamily="34" charset="0"/>
-              <a:cs typeface="Arial" panose="020B0604020202020204" pitchFamily="34" charset="0"/>
-            </a:endParaRPr>
-          </a:p>
-          <a:p>
-            <a:endParaRPr lang="et-EE" dirty="0"/>
+              <a:t>Best result found so far for maximizing a single packing: 324</a:t>
+            </a:r>
+          </a:p>
+          <a:p>
+            <a:endParaRPr lang="et-EE" sz="2800" dirty="0"/>
           </a:p>
         </p:txBody>
       </p:sp>
@@ -7211,7 +7200,9 @@
         </p:nvSpPr>
         <p:spPr/>
         <p:txBody>
-          <a:bodyPr/>
+          <a:bodyPr>
+            <a:normAutofit/>
+          </a:bodyPr>
           <a:lstStyle/>
           <a:p>
             <a:pPr>
@@ -7222,62 +7213,42 @@
               <a:buChar char="•"/>
             </a:pPr>
             <a:r>
-              <a:rPr lang="en-US" dirty="0" smtClean="0">
+              <a:rPr lang="en-US" sz="2000" dirty="0" smtClean="0">
                 <a:solidFill>
                   <a:schemeClr val="tx1"/>
                 </a:solidFill>
                 <a:latin typeface="Arial" panose="020B0604020202020204" pitchFamily="34" charset="0"/>
                 <a:cs typeface="Arial" panose="020B0604020202020204" pitchFamily="34" charset="0"/>
               </a:rPr>
-              <a:t>It is possible to fill the entire </a:t>
-            </a:r>
-            <a:r>
-              <a:rPr lang="en-US" dirty="0" smtClean="0">
-                <a:solidFill>
-                  <a:schemeClr val="tx1"/>
-                </a:solidFill>
-                <a:latin typeface="Arial" panose="020B0604020202020204" pitchFamily="34" charset="0"/>
-                <a:cs typeface="Arial" panose="020B0604020202020204" pitchFamily="34" charset="0"/>
-              </a:rPr>
-              <a:t>cargo space </a:t>
-            </a:r>
-            <a:r>
-              <a:rPr lang="en-US" dirty="0" smtClean="0">
-                <a:solidFill>
-                  <a:schemeClr val="tx1"/>
-                </a:solidFill>
-                <a:latin typeface="Arial" panose="020B0604020202020204" pitchFamily="34" charset="0"/>
-                <a:cs typeface="Arial" panose="020B0604020202020204" pitchFamily="34" charset="0"/>
-              </a:rPr>
-              <a:t>with L,P and/or T packages.</a:t>
-            </a:r>
-          </a:p>
-          <a:p>
-            <a:endParaRPr lang="en-US" dirty="0" smtClean="0">
+              <a:t>It is possible to fill the entire cargo space with L,P and/or T packages.</a:t>
+            </a:r>
+          </a:p>
+          <a:p>
+            <a:endParaRPr lang="en-US" sz="2000" dirty="0" smtClean="0">
               <a:latin typeface="Arial" panose="020B0604020202020204" pitchFamily="34" charset="0"/>
               <a:cs typeface="Arial" panose="020B0604020202020204" pitchFamily="34" charset="0"/>
             </a:endParaRPr>
           </a:p>
           <a:p>
-            <a:endParaRPr lang="en-US" dirty="0">
+            <a:endParaRPr lang="en-US" sz="2000" dirty="0">
               <a:latin typeface="Arial" panose="020B0604020202020204" pitchFamily="34" charset="0"/>
               <a:cs typeface="Arial" panose="020B0604020202020204" pitchFamily="34" charset="0"/>
             </a:endParaRPr>
           </a:p>
           <a:p>
-            <a:endParaRPr lang="en-US" dirty="0" smtClean="0">
+            <a:endParaRPr lang="en-US" sz="2000" dirty="0" smtClean="0">
               <a:latin typeface="Arial" panose="020B0604020202020204" pitchFamily="34" charset="0"/>
               <a:cs typeface="Arial" panose="020B0604020202020204" pitchFamily="34" charset="0"/>
             </a:endParaRPr>
           </a:p>
           <a:p>
-            <a:endParaRPr lang="en-US" dirty="0">
+            <a:endParaRPr lang="en-US" sz="2000" dirty="0">
               <a:latin typeface="Arial" panose="020B0604020202020204" pitchFamily="34" charset="0"/>
               <a:cs typeface="Arial" panose="020B0604020202020204" pitchFamily="34" charset="0"/>
             </a:endParaRPr>
           </a:p>
           <a:p>
-            <a:endParaRPr lang="en-US" dirty="0" smtClean="0">
+            <a:endParaRPr lang="en-US" sz="2000" dirty="0" smtClean="0">
               <a:latin typeface="Arial" panose="020B0604020202020204" pitchFamily="34" charset="0"/>
               <a:cs typeface="Arial" panose="020B0604020202020204" pitchFamily="34" charset="0"/>
             </a:endParaRPr>
@@ -7286,7 +7257,7 @@
             <a:pPr marL="0" indent="0">
               <a:buNone/>
             </a:pPr>
-            <a:endParaRPr lang="en-US" dirty="0" smtClean="0">
+            <a:endParaRPr lang="en-US" sz="2000" dirty="0" smtClean="0">
               <a:latin typeface="Arial" panose="020B0604020202020204" pitchFamily="34" charset="0"/>
               <a:cs typeface="Arial" panose="020B0604020202020204" pitchFamily="34" charset="0"/>
             </a:endParaRPr>
@@ -7295,7 +7266,7 @@
             <a:pPr marL="0" indent="0">
               <a:buNone/>
             </a:pPr>
-            <a:endParaRPr lang="en-US" dirty="0">
+            <a:endParaRPr lang="en-US" sz="2000" dirty="0">
               <a:latin typeface="Arial" panose="020B0604020202020204" pitchFamily="34" charset="0"/>
               <a:cs typeface="Arial" panose="020B0604020202020204" pitchFamily="34" charset="0"/>
             </a:endParaRPr>
@@ -7309,46 +7280,36 @@
               <a:buChar char="•"/>
             </a:pPr>
             <a:r>
-              <a:rPr lang="en-US" dirty="0" smtClean="0">
+              <a:rPr lang="en-US" sz="2000" dirty="0" smtClean="0">
                 <a:solidFill>
                   <a:schemeClr val="tx1"/>
                 </a:solidFill>
                 <a:latin typeface="Arial" panose="020B0604020202020204" pitchFamily="34" charset="0"/>
                 <a:cs typeface="Arial" panose="020B0604020202020204" pitchFamily="34" charset="0"/>
               </a:rPr>
-              <a:t>Best result found so far for maximizing a single packing</a:t>
-            </a:r>
-            <a:r>
-              <a:rPr lang="en-US" smtClean="0">
+              <a:t>Best result found so far for maximizing a single packing: </a:t>
+            </a:r>
+            <a:r>
+              <a:rPr lang="en-US" sz="2000" b="1" dirty="0" smtClean="0">
                 <a:solidFill>
                   <a:schemeClr val="tx1"/>
                 </a:solidFill>
                 <a:latin typeface="Arial" panose="020B0604020202020204" pitchFamily="34" charset="0"/>
                 <a:cs typeface="Arial" panose="020B0604020202020204" pitchFamily="34" charset="0"/>
               </a:rPr>
-              <a:t>: </a:t>
-            </a:r>
-            <a:r>
-              <a:rPr lang="en-US" b="1" smtClean="0">
+              <a:t>9720</a:t>
+            </a:r>
+            <a:r>
+              <a:rPr lang="en-US" sz="2000" dirty="0" smtClean="0">
                 <a:solidFill>
                   <a:schemeClr val="tx1"/>
                 </a:solidFill>
                 <a:latin typeface="Arial" panose="020B0604020202020204" pitchFamily="34" charset="0"/>
                 <a:cs typeface="Arial" panose="020B0604020202020204" pitchFamily="34" charset="0"/>
               </a:rPr>
-              <a:t>9720</a:t>
-            </a:r>
-            <a:r>
-              <a:rPr lang="en-US" smtClean="0">
-                <a:solidFill>
-                  <a:schemeClr val="tx1"/>
-                </a:solidFill>
-                <a:latin typeface="Arial" panose="020B0604020202020204" pitchFamily="34" charset="0"/>
-                <a:cs typeface="Arial" panose="020B0604020202020204" pitchFamily="34" charset="0"/>
-              </a:rPr>
               <a:t> </a:t>
             </a:r>
-            <a:endParaRPr lang="et-EE" dirty="0">
+            <a:endParaRPr lang="et-EE" sz="2000" dirty="0">
               <a:solidFill>
                 <a:schemeClr val="tx1"/>
               </a:solidFill>
@@ -8108,7 +8069,7 @@
         </p:blipFill>
         <p:spPr>
           <a:xfrm>
-            <a:off x="4549996" y="3163248"/>
+            <a:off x="4549996" y="3417248"/>
             <a:ext cx="5956308" cy="3170195"/>
           </a:xfrm>
         </p:spPr>
@@ -8121,8 +8082,8 @@
         </p:nvSpPr>
         <p:spPr>
           <a:xfrm>
-            <a:off x="464024" y="1842448"/>
-            <a:ext cx="11423176" cy="923330"/>
+            <a:off x="464024" y="1588448"/>
+            <a:ext cx="7920122" cy="1569660"/>
           </a:xfrm>
           <a:prstGeom prst="rect">
             <a:avLst/>
@@ -8140,7 +8101,7 @@
               <a:buChar char="•"/>
             </a:pPr>
             <a:r>
-              <a:rPr lang="en-US" dirty="0" smtClean="0">
+              <a:rPr lang="en-US" sz="2400" dirty="0" smtClean="0">
                 <a:latin typeface="Arial" panose="020B0604020202020204" pitchFamily="34" charset="0"/>
                 <a:cs typeface="Arial" panose="020B0604020202020204" pitchFamily="34" charset="0"/>
               </a:rPr>
@@ -8153,7 +8114,7 @@
               <a:buChar char="•"/>
             </a:pPr>
             <a:r>
-              <a:rPr lang="en-US" dirty="0" smtClean="0">
+              <a:rPr lang="en-US" sz="2400" dirty="0" smtClean="0">
                 <a:latin typeface="Arial" panose="020B0604020202020204" pitchFamily="34" charset="0"/>
                 <a:cs typeface="Arial" panose="020B0604020202020204" pitchFamily="34" charset="0"/>
               </a:rPr>
@@ -8166,7 +8127,7 @@
               <a:buChar char="•"/>
             </a:pPr>
             <a:r>
-              <a:rPr lang="en-US" dirty="0" smtClean="0">
+              <a:rPr lang="en-US" sz="2400" dirty="0" smtClean="0">
                 <a:latin typeface="Arial" panose="020B0604020202020204" pitchFamily="34" charset="0"/>
                 <a:cs typeface="Arial" panose="020B0604020202020204" pitchFamily="34" charset="0"/>
               </a:rPr>

</xml_diff>

<commit_message>
Added a way to have additional package types FOR THE ACTIVE SESSION
</commit_message>
<xml_diff>
--- a/Report, presentation and related stuff/Knapsack_problem.pptx
+++ b/Report, presentation and related stuff/Knapsack_problem.pptx
@@ -2,7 +2,7 @@
 <file path=ppt/presentation.xml><?xml version="1.0" encoding="utf-8"?>
 <p:presentation xmlns:a="http://schemas.openxmlformats.org/drawingml/2006/main" xmlns:r="http://schemas.openxmlformats.org/officeDocument/2006/relationships" xmlns:p="http://schemas.openxmlformats.org/presentationml/2006/main" saveSubsetFonts="1">
   <p:sldMasterIdLst>
-    <p:sldMasterId id="2147483660" r:id="rId1"/>
+    <p:sldMasterId id="2147483728" r:id="rId1"/>
   </p:sldMasterIdLst>
   <p:sldIdLst>
     <p:sldId id="256" r:id="rId2"/>
@@ -16,14 +16,12 @@
     <p:sldId id="276" r:id="rId10"/>
     <p:sldId id="261" r:id="rId11"/>
     <p:sldId id="263" r:id="rId12"/>
-    <p:sldId id="264" r:id="rId13"/>
-    <p:sldId id="265" r:id="rId14"/>
-    <p:sldId id="271" r:id="rId15"/>
-    <p:sldId id="273" r:id="rId16"/>
-    <p:sldId id="267" r:id="rId17"/>
-    <p:sldId id="268" r:id="rId18"/>
-    <p:sldId id="269" r:id="rId19"/>
-    <p:sldId id="270" r:id="rId20"/>
+    <p:sldId id="265" r:id="rId13"/>
+    <p:sldId id="271" r:id="rId14"/>
+    <p:sldId id="267" r:id="rId15"/>
+    <p:sldId id="268" r:id="rId16"/>
+    <p:sldId id="269" r:id="rId17"/>
+    <p:sldId id="270" r:id="rId18"/>
   </p:sldIdLst>
   <p:sldSz cx="12192000" cy="6858000"/>
   <p:notesSz cx="6858000" cy="9144000"/>
@@ -132,7 +130,7 @@
 
 <file path=ppt/slideLayouts/slideLayout1.xml><?xml version="1.0" encoding="utf-8"?>
 <p:sldLayout xmlns:a="http://schemas.openxmlformats.org/drawingml/2006/main" xmlns:r="http://schemas.openxmlformats.org/officeDocument/2006/relationships" xmlns:p="http://schemas.openxmlformats.org/presentationml/2006/main" showMasterSp="0" type="title" preserve="1">
-  <p:cSld name="Title Slide">
+  <p:cSld name="Titelfolie">
     <p:spTree>
       <p:nvGrpSpPr>
         <p:cNvPr id="1" name=""/>
@@ -149,7 +147,7 @@
       </p:grpSpPr>
       <p:grpSp>
         <p:nvGrpSpPr>
-          <p:cNvPr id="7" name="Group 6"/>
+          <p:cNvPr id="16" name="Group 15"/>
           <p:cNvGrpSpPr/>
           <p:nvPr/>
         </p:nvGrpSpPr>
@@ -161,9 +159,72 @@
             <a:chExt cx="12192000" cy="6866467"/>
           </a:xfrm>
         </p:grpSpPr>
+        <p:sp>
+          <p:nvSpPr>
+            <p:cNvPr id="15" name="Freeform 14"/>
+            <p:cNvSpPr/>
+            <p:nvPr/>
+          </p:nvSpPr>
+          <p:spPr>
+            <a:xfrm>
+              <a:off x="0" y="-7862"/>
+              <a:ext cx="863600" cy="5698067"/>
+            </a:xfrm>
+            <a:custGeom>
+              <a:avLst/>
+              <a:gdLst/>
+              <a:ahLst/>
+              <a:cxnLst/>
+              <a:rect l="l" t="t" r="r" b="b"/>
+              <a:pathLst>
+                <a:path w="863600" h="5698067">
+                  <a:moveTo>
+                    <a:pt x="0" y="8467"/>
+                  </a:moveTo>
+                  <a:lnTo>
+                    <a:pt x="863600" y="0"/>
+                  </a:lnTo>
+                  <a:lnTo>
+                    <a:pt x="863600" y="16934"/>
+                  </a:lnTo>
+                  <a:lnTo>
+                    <a:pt x="0" y="5698067"/>
+                  </a:lnTo>
+                  <a:lnTo>
+                    <a:pt x="0" y="8467"/>
+                  </a:lnTo>
+                  <a:close/>
+                </a:path>
+              </a:pathLst>
+            </a:custGeom>
+            <a:solidFill>
+              <a:schemeClr val="accent1">
+                <a:alpha val="70000"/>
+              </a:schemeClr>
+            </a:solidFill>
+            <a:ln>
+              <a:noFill/>
+            </a:ln>
+            <a:effectLst/>
+          </p:spPr>
+          <p:style>
+            <a:lnRef idx="1">
+              <a:schemeClr val="accent1"/>
+            </a:lnRef>
+            <a:fillRef idx="3">
+              <a:schemeClr val="accent1"/>
+            </a:fillRef>
+            <a:effectRef idx="2">
+              <a:schemeClr val="accent1"/>
+            </a:effectRef>
+            <a:fontRef idx="minor">
+              <a:schemeClr val="lt1"/>
+            </a:fontRef>
+          </p:style>
+        </p:sp>
         <p:cxnSp>
           <p:nvCxnSpPr>
-            <p:cNvPr id="32" name="Straight Connector 31"/>
+            <p:cNvPr id="19" name="Straight Connector 18"/>
             <p:cNvCxnSpPr/>
             <p:nvPr/>
           </p:nvCxnSpPr>
@@ -177,8 +238,8 @@
             </a:prstGeom>
             <a:ln w="9525">
               <a:solidFill>
-                <a:schemeClr val="bg1">
-                  <a:lumMod val="75000"/>
+                <a:schemeClr val="accent1">
+                  <a:alpha val="70000"/>
                 </a:schemeClr>
               </a:solidFill>
             </a:ln>
@@ -200,7 +261,7 @@
         </p:cxnSp>
         <p:cxnSp>
           <p:nvCxnSpPr>
-            <p:cNvPr id="21" name="Straight Connector 20"/>
+            <p:cNvPr id="20" name="Straight Connector 19"/>
             <p:cNvCxnSpPr/>
             <p:nvPr/>
           </p:nvCxnSpPr>
@@ -214,8 +275,8 @@
             </a:prstGeom>
             <a:ln w="9525">
               <a:solidFill>
-                <a:schemeClr val="bg1">
-                  <a:lumMod val="85000"/>
+                <a:schemeClr val="accent1">
+                  <a:alpha val="70000"/>
                 </a:schemeClr>
               </a:solidFill>
             </a:ln>
@@ -237,7 +298,7 @@
         </p:cxnSp>
         <p:sp>
           <p:nvSpPr>
-            <p:cNvPr id="24" name="Rectangle 23"/>
+            <p:cNvPr id="21" name="Rectangle 23"/>
             <p:cNvSpPr/>
             <p:nvPr/>
           </p:nvSpPr>
@@ -275,7 +336,7 @@
             </a:custGeom>
             <a:solidFill>
               <a:schemeClr val="accent1">
-                <a:alpha val="30000"/>
+                <a:alpha val="36000"/>
               </a:schemeClr>
             </a:solidFill>
             <a:ln>
@@ -300,7 +361,7 @@
         </p:sp>
         <p:sp>
           <p:nvSpPr>
-            <p:cNvPr id="26" name="Rectangle 25"/>
+            <p:cNvPr id="22" name="Rectangle 25"/>
             <p:cNvSpPr/>
             <p:nvPr/>
           </p:nvSpPr>
@@ -363,7 +424,7 @@
         </p:sp>
         <p:sp>
           <p:nvSpPr>
-            <p:cNvPr id="27" name="Isosceles Triangle 26"/>
+            <p:cNvPr id="23" name="Isosceles Triangle 22"/>
             <p:cNvSpPr/>
             <p:nvPr/>
           </p:nvSpPr>
@@ -378,8 +439,9 @@
               </a:avLst>
             </a:prstGeom>
             <a:solidFill>
-              <a:schemeClr val="accent2">
-                <a:alpha val="72000"/>
+              <a:schemeClr val="accent1">
+                <a:lumMod val="75000"/>
+                <a:alpha val="66000"/>
               </a:schemeClr>
             </a:solidFill>
             <a:ln>
@@ -404,7 +466,7 @@
         </p:sp>
         <p:sp>
           <p:nvSpPr>
-            <p:cNvPr id="28" name="Rectangle 27"/>
+            <p:cNvPr id="24" name="Rectangle 27"/>
             <p:cNvSpPr/>
             <p:nvPr/>
           </p:nvSpPr>
@@ -441,9 +503,9 @@
               </a:pathLst>
             </a:custGeom>
             <a:solidFill>
-              <a:schemeClr val="accent2">
+              <a:schemeClr val="accent1">
                 <a:lumMod val="75000"/>
-                <a:alpha val="70000"/>
+                <a:alpha val="50000"/>
               </a:schemeClr>
             </a:solidFill>
             <a:ln>
@@ -468,7 +530,7 @@
         </p:sp>
         <p:sp>
           <p:nvSpPr>
-            <p:cNvPr id="29" name="Rectangle 28"/>
+            <p:cNvPr id="25" name="Rectangle 28"/>
             <p:cNvSpPr/>
             <p:nvPr/>
           </p:nvSpPr>
@@ -505,9 +567,7 @@
               </a:pathLst>
             </a:custGeom>
             <a:solidFill>
-              <a:schemeClr val="accent1">
-                <a:lumMod val="60000"/>
-                <a:lumOff val="40000"/>
+              <a:schemeClr val="accent2">
                 <a:alpha val="70000"/>
               </a:schemeClr>
             </a:solidFill>
@@ -533,7 +593,7 @@
         </p:sp>
         <p:sp>
           <p:nvSpPr>
-            <p:cNvPr id="30" name="Rectangle 29"/>
+            <p:cNvPr id="26" name="Rectangle 29"/>
             <p:cNvSpPr/>
             <p:nvPr/>
           </p:nvSpPr>
@@ -570,48 +630,8 @@
               </a:pathLst>
             </a:custGeom>
             <a:solidFill>
-              <a:schemeClr val="accent1">
-                <a:alpha val="65000"/>
-              </a:schemeClr>
-            </a:solidFill>
-            <a:ln>
-              <a:noFill/>
-            </a:ln>
-            <a:effectLst/>
-          </p:spPr>
-          <p:style>
-            <a:lnRef idx="1">
-              <a:schemeClr val="accent1"/>
-            </a:lnRef>
-            <a:fillRef idx="3">
-              <a:schemeClr val="accent1"/>
-            </a:fillRef>
-            <a:effectRef idx="2">
-              <a:schemeClr val="accent1"/>
-            </a:effectRef>
-            <a:fontRef idx="minor">
-              <a:schemeClr val="lt1"/>
-            </a:fontRef>
-          </p:style>
-        </p:sp>
-        <p:sp>
-          <p:nvSpPr>
-            <p:cNvPr id="31" name="Isosceles Triangle 30"/>
-            <p:cNvSpPr/>
-            <p:nvPr/>
-          </p:nvSpPr>
-          <p:spPr>
-            <a:xfrm>
-              <a:off x="10371666" y="3589867"/>
-              <a:ext cx="1817159" cy="3268133"/>
-            </a:xfrm>
-            <a:prstGeom prst="triangle">
-              <a:avLst>
-                <a:gd name="adj" fmla="val 100000"/>
-              </a:avLst>
-            </a:prstGeom>
-            <a:solidFill>
-              <a:schemeClr val="accent1">
+              <a:schemeClr val="accent2">
+                <a:lumMod val="75000"/>
                 <a:alpha val="80000"/>
               </a:schemeClr>
             </a:solidFill>
@@ -637,14 +657,14 @@
         </p:sp>
         <p:sp>
           <p:nvSpPr>
-            <p:cNvPr id="19" name="Isosceles Triangle 18"/>
+            <p:cNvPr id="27" name="Isosceles Triangle 26"/>
             <p:cNvSpPr/>
             <p:nvPr/>
           </p:nvSpPr>
           <p:spPr>
-            <a:xfrm rot="10800000">
-              <a:off x="0" y="0"/>
-              <a:ext cx="842596" cy="5666154"/>
+            <a:xfrm>
+              <a:off x="10371666" y="3589867"/>
+              <a:ext cx="1817159" cy="3268133"/>
             </a:xfrm>
             <a:prstGeom prst="triangle">
               <a:avLst>
@@ -653,7 +673,8 @@
             </a:prstGeom>
             <a:solidFill>
               <a:schemeClr val="accent1">
-                <a:alpha val="85000"/>
+                <a:lumMod val="75000"/>
+                <a:alpha val="66000"/>
               </a:schemeClr>
             </a:solidFill>
             <a:ln>
@@ -708,8 +729,8 @@
           </a:lstStyle>
           <a:p>
             <a:r>
-              <a:rPr lang="en-US" smtClean="0"/>
-              <a:t>Click to edit Master title style</a:t>
+              <a:rPr lang="de-DE" smtClean="0"/>
+              <a:t>Titelmasterformat durch Klicken bearbeiten</a:t>
             </a:r>
             <a:endParaRPr lang="en-US" dirty="0"/>
           </a:p>
@@ -828,8 +849,8 @@
           </a:lstStyle>
           <a:p>
             <a:r>
-              <a:rPr lang="en-US" smtClean="0"/>
-              <a:t>Click to edit Master subtitle style</a:t>
+              <a:rPr lang="de-DE" smtClean="0"/>
+              <a:t>Formatvorlage des Untertitelmasters durch Klicken bearbeiten</a:t>
             </a:r>
             <a:endParaRPr lang="en-US" dirty="0"/>
           </a:p>
@@ -903,7 +924,7 @@
     </p:spTree>
     <p:extLst>
       <p:ext uri="{BB962C8B-B14F-4D97-AF65-F5344CB8AC3E}">
-        <p14:creationId xmlns:p14="http://schemas.microsoft.com/office/powerpoint/2010/main" val="2679377424"/>
+        <p14:creationId xmlns:p14="http://schemas.microsoft.com/office/powerpoint/2010/main" val="2301344580"/>
       </p:ext>
     </p:extLst>
   </p:cSld>
@@ -915,7 +936,7 @@
 
 <file path=ppt/slideLayouts/slideLayout10.xml><?xml version="1.0" encoding="utf-8"?>
 <p:sldLayout xmlns:a="http://schemas.openxmlformats.org/drawingml/2006/main" xmlns:r="http://schemas.openxmlformats.org/officeDocument/2006/relationships" xmlns:p="http://schemas.openxmlformats.org/presentationml/2006/main" preserve="1">
-  <p:cSld name="Title and Caption">
+  <p:cSld name="Titel und Beschriftung">
     <p:spTree>
       <p:nvGrpSpPr>
         <p:cNvPr id="1" name=""/>
@@ -957,8 +978,8 @@
           </a:lstStyle>
           <a:p>
             <a:r>
-              <a:rPr lang="en-US" smtClean="0"/>
-              <a:t>Click to edit Master title style</a:t>
+              <a:rPr lang="de-DE" smtClean="0"/>
+              <a:t>Titelmasterformat durch Klicken bearbeiten</a:t>
             </a:r>
             <a:endParaRPr lang="en-US" dirty="0"/>
           </a:p>
@@ -1080,8 +1101,8 @@
           <a:p>
             <a:pPr lvl="0"/>
             <a:r>
-              <a:rPr lang="en-US" smtClean="0"/>
-              <a:t>Click to edit Master text styles</a:t>
+              <a:rPr lang="de-DE" smtClean="0"/>
+              <a:t>Textmasterformat bearbeiten</a:t>
             </a:r>
           </a:p>
         </p:txBody>
@@ -1154,7 +1175,7 @@
     </p:spTree>
     <p:extLst>
       <p:ext uri="{BB962C8B-B14F-4D97-AF65-F5344CB8AC3E}">
-        <p14:creationId xmlns:p14="http://schemas.microsoft.com/office/powerpoint/2010/main" val="514135814"/>
+        <p14:creationId xmlns:p14="http://schemas.microsoft.com/office/powerpoint/2010/main" val="3177055964"/>
       </p:ext>
     </p:extLst>
   </p:cSld>
@@ -1166,7 +1187,7 @@
 
 <file path=ppt/slideLayouts/slideLayout11.xml><?xml version="1.0" encoding="utf-8"?>
 <p:sldLayout xmlns:a="http://schemas.openxmlformats.org/drawingml/2006/main" xmlns:r="http://schemas.openxmlformats.org/officeDocument/2006/relationships" xmlns:p="http://schemas.openxmlformats.org/presentationml/2006/main" preserve="1">
-  <p:cSld name="Quote with Caption">
+  <p:cSld name="Zitat mit Beschriftung">
     <p:spTree>
       <p:nvGrpSpPr>
         <p:cNvPr id="1" name=""/>
@@ -1208,8 +1229,8 @@
           </a:lstStyle>
           <a:p>
             <a:r>
-              <a:rPr lang="en-US" smtClean="0"/>
-              <a:t>Click to edit Master title style</a:t>
+              <a:rPr lang="de-DE" smtClean="0"/>
+              <a:t>Titelmasterformat durch Klicken bearbeiten</a:t>
             </a:r>
             <a:endParaRPr lang="en-US" dirty="0"/>
           </a:p>
@@ -1272,8 +1293,8 @@
           <a:p>
             <a:pPr lvl="0"/>
             <a:r>
-              <a:rPr lang="en-US" smtClean="0"/>
-              <a:t>Click to edit Master text styles</a:t>
+              <a:rPr lang="de-DE" smtClean="0"/>
+              <a:t>Textmasterformat bearbeiten</a:t>
             </a:r>
           </a:p>
         </p:txBody>
@@ -1394,8 +1415,8 @@
           <a:p>
             <a:pPr lvl="0"/>
             <a:r>
-              <a:rPr lang="en-US" smtClean="0"/>
-              <a:t>Click to edit Master text styles</a:t>
+              <a:rPr lang="de-DE" smtClean="0"/>
+              <a:t>Textmasterformat bearbeiten</a:t>
             </a:r>
           </a:p>
         </p:txBody>
@@ -1467,7 +1488,7 @@
       </p:sp>
       <p:sp>
         <p:nvSpPr>
-          <p:cNvPr id="20" name="TextBox 19"/>
+          <p:cNvPr id="24" name="TextBox 23"/>
           <p:cNvSpPr txBox="1"/>
           <p:nvPr/>
         </p:nvSpPr>
@@ -1508,7 +1529,7 @@
       </p:sp>
       <p:sp>
         <p:nvSpPr>
-          <p:cNvPr id="22" name="TextBox 21"/>
+          <p:cNvPr id="25" name="TextBox 24"/>
           <p:cNvSpPr txBox="1"/>
           <p:nvPr/>
         </p:nvSpPr>
@@ -1539,26 +1560,18 @@
                     <a:lumOff val="40000"/>
                   </a:schemeClr>
                 </a:solidFill>
+                <a:effectLst/>
                 <a:latin typeface="Arial"/>
               </a:rPr>
               <a:t>”</a:t>
             </a:r>
-            <a:endParaRPr lang="en-US" dirty="0">
-              <a:solidFill>
-                <a:schemeClr val="accent1">
-                  <a:lumMod val="60000"/>
-                  <a:lumOff val="40000"/>
-                </a:schemeClr>
-              </a:solidFill>
-              <a:latin typeface="Arial"/>
-            </a:endParaRPr>
           </a:p>
         </p:txBody>
       </p:sp>
     </p:spTree>
     <p:extLst>
       <p:ext uri="{BB962C8B-B14F-4D97-AF65-F5344CB8AC3E}">
-        <p14:creationId xmlns:p14="http://schemas.microsoft.com/office/powerpoint/2010/main" val="3986387516"/>
+        <p14:creationId xmlns:p14="http://schemas.microsoft.com/office/powerpoint/2010/main" val="3049790961"/>
       </p:ext>
     </p:extLst>
   </p:cSld>
@@ -1570,7 +1583,7 @@
 
 <file path=ppt/slideLayouts/slideLayout12.xml><?xml version="1.0" encoding="utf-8"?>
 <p:sldLayout xmlns:a="http://schemas.openxmlformats.org/drawingml/2006/main" xmlns:r="http://schemas.openxmlformats.org/officeDocument/2006/relationships" xmlns:p="http://schemas.openxmlformats.org/presentationml/2006/main" preserve="1">
-  <p:cSld name="Name Card">
+  <p:cSld name="Namenskarte">
     <p:spTree>
       <p:nvGrpSpPr>
         <p:cNvPr id="1" name=""/>
@@ -1612,8 +1625,8 @@
           </a:lstStyle>
           <a:p>
             <a:r>
-              <a:rPr lang="en-US" smtClean="0"/>
-              <a:t>Click to edit Master title style</a:t>
+              <a:rPr lang="de-DE" smtClean="0"/>
+              <a:t>Titelmasterformat durch Klicken bearbeiten</a:t>
             </a:r>
             <a:endParaRPr lang="en-US" dirty="0"/>
           </a:p>
@@ -1735,8 +1748,8 @@
           <a:p>
             <a:pPr lvl="0"/>
             <a:r>
-              <a:rPr lang="en-US" smtClean="0"/>
-              <a:t>Click to edit Master text styles</a:t>
+              <a:rPr lang="de-DE" smtClean="0"/>
+              <a:t>Textmasterformat bearbeiten</a:t>
             </a:r>
           </a:p>
         </p:txBody>
@@ -1809,7 +1822,7 @@
     </p:spTree>
     <p:extLst>
       <p:ext uri="{BB962C8B-B14F-4D97-AF65-F5344CB8AC3E}">
-        <p14:creationId xmlns:p14="http://schemas.microsoft.com/office/powerpoint/2010/main" val="349832170"/>
+        <p14:creationId xmlns:p14="http://schemas.microsoft.com/office/powerpoint/2010/main" val="784884513"/>
       </p:ext>
     </p:extLst>
   </p:cSld>
@@ -1821,7 +1834,7 @@
 
 <file path=ppt/slideLayouts/slideLayout13.xml><?xml version="1.0" encoding="utf-8"?>
 <p:sldLayout xmlns:a="http://schemas.openxmlformats.org/drawingml/2006/main" xmlns:r="http://schemas.openxmlformats.org/officeDocument/2006/relationships" xmlns:p="http://schemas.openxmlformats.org/presentationml/2006/main" preserve="1">
-  <p:cSld name="Quote Name Card">
+  <p:cSld name="Namenskarte für Zitat">
     <p:spTree>
       <p:nvGrpSpPr>
         <p:cNvPr id="1" name=""/>
@@ -1863,8 +1876,8 @@
           </a:lstStyle>
           <a:p>
             <a:r>
-              <a:rPr lang="en-US" smtClean="0"/>
-              <a:t>Click to edit Master title style</a:t>
+              <a:rPr lang="de-DE" smtClean="0"/>
+              <a:t>Titelmasterformat durch Klicken bearbeiten</a:t>
             </a:r>
             <a:endParaRPr lang="en-US" dirty="0"/>
           </a:p>
@@ -1927,8 +1940,8 @@
           <a:p>
             <a:pPr lvl="0"/>
             <a:r>
-              <a:rPr lang="en-US" smtClean="0"/>
-              <a:t>Click to edit Master text styles</a:t>
+              <a:rPr lang="de-DE" smtClean="0"/>
+              <a:t>Textmasterformat bearbeiten</a:t>
             </a:r>
           </a:p>
         </p:txBody>
@@ -2049,8 +2062,8 @@
           <a:p>
             <a:pPr lvl="0"/>
             <a:r>
-              <a:rPr lang="en-US" smtClean="0"/>
-              <a:t>Click to edit Master text styles</a:t>
+              <a:rPr lang="de-DE" smtClean="0"/>
+              <a:t>Textmasterformat bearbeiten</a:t>
             </a:r>
           </a:p>
         </p:txBody>
@@ -2205,7 +2218,7 @@
     </p:spTree>
     <p:extLst>
       <p:ext uri="{BB962C8B-B14F-4D97-AF65-F5344CB8AC3E}">
-        <p14:creationId xmlns:p14="http://schemas.microsoft.com/office/powerpoint/2010/main" val="576407632"/>
+        <p14:creationId xmlns:p14="http://schemas.microsoft.com/office/powerpoint/2010/main" val="1481155508"/>
       </p:ext>
     </p:extLst>
   </p:cSld>
@@ -2217,7 +2230,7 @@
 
 <file path=ppt/slideLayouts/slideLayout14.xml><?xml version="1.0" encoding="utf-8"?>
 <p:sldLayout xmlns:a="http://schemas.openxmlformats.org/drawingml/2006/main" xmlns:r="http://schemas.openxmlformats.org/officeDocument/2006/relationships" xmlns:p="http://schemas.openxmlformats.org/presentationml/2006/main" preserve="1">
-  <p:cSld name="True or False">
+  <p:cSld name="Wahr oder Falsch">
     <p:spTree>
       <p:nvGrpSpPr>
         <p:cNvPr id="1" name=""/>
@@ -2259,8 +2272,8 @@
           </a:lstStyle>
           <a:p>
             <a:r>
-              <a:rPr lang="en-US" smtClean="0"/>
-              <a:t>Click to edit Master title style</a:t>
+              <a:rPr lang="de-DE" smtClean="0"/>
+              <a:t>Titelmasterformat durch Klicken bearbeiten</a:t>
             </a:r>
             <a:endParaRPr lang="en-US" dirty="0"/>
           </a:p>
@@ -2320,8 +2333,8 @@
           <a:p>
             <a:pPr lvl="0"/>
             <a:r>
-              <a:rPr lang="en-US" smtClean="0"/>
-              <a:t>Click to edit Master text styles</a:t>
+              <a:rPr lang="de-DE" smtClean="0"/>
+              <a:t>Textmasterformat bearbeiten</a:t>
             </a:r>
           </a:p>
         </p:txBody>
@@ -2442,8 +2455,8 @@
           <a:p>
             <a:pPr lvl="0"/>
             <a:r>
-              <a:rPr lang="en-US" smtClean="0"/>
-              <a:t>Click to edit Master text styles</a:t>
+              <a:rPr lang="de-DE" smtClean="0"/>
+              <a:t>Textmasterformat bearbeiten</a:t>
             </a:r>
           </a:p>
         </p:txBody>
@@ -2516,7 +2529,7 @@
     </p:spTree>
     <p:extLst>
       <p:ext uri="{BB962C8B-B14F-4D97-AF65-F5344CB8AC3E}">
-        <p14:creationId xmlns:p14="http://schemas.microsoft.com/office/powerpoint/2010/main" val="3134462203"/>
+        <p14:creationId xmlns:p14="http://schemas.microsoft.com/office/powerpoint/2010/main" val="1016664252"/>
       </p:ext>
     </p:extLst>
   </p:cSld>
@@ -2528,7 +2541,7 @@
 
 <file path=ppt/slideLayouts/slideLayout15.xml><?xml version="1.0" encoding="utf-8"?>
 <p:sldLayout xmlns:a="http://schemas.openxmlformats.org/drawingml/2006/main" xmlns:r="http://schemas.openxmlformats.org/officeDocument/2006/relationships" xmlns:p="http://schemas.openxmlformats.org/presentationml/2006/main" type="vertTx" preserve="1">
-  <p:cSld name="Title and Vertical Text">
+  <p:cSld name="Titel und vertikaler Text">
     <p:spTree>
       <p:nvGrpSpPr>
         <p:cNvPr id="1" name=""/>
@@ -2559,8 +2572,8 @@
           <a:lstStyle/>
           <a:p>
             <a:r>
-              <a:rPr lang="en-US" smtClean="0"/>
-              <a:t>Click to edit Master title style</a:t>
+              <a:rPr lang="de-DE" smtClean="0"/>
+              <a:t>Titelmasterformat durch Klicken bearbeiten</a:t>
             </a:r>
             <a:endParaRPr lang="en-US" dirty="0"/>
           </a:p>
@@ -2583,36 +2596,36 @@
           <a:p>
             <a:pPr lvl="0"/>
             <a:r>
-              <a:rPr lang="en-US" smtClean="0"/>
-              <a:t>Click to edit Master text styles</a:t>
+              <a:rPr lang="de-DE" smtClean="0"/>
+              <a:t>Textmasterformat bearbeiten</a:t>
             </a:r>
           </a:p>
           <a:p>
             <a:pPr lvl="1"/>
             <a:r>
-              <a:rPr lang="en-US" smtClean="0"/>
-              <a:t>Second level</a:t>
+              <a:rPr lang="de-DE" smtClean="0"/>
+              <a:t>Zweite Ebene</a:t>
             </a:r>
           </a:p>
           <a:p>
             <a:pPr lvl="2"/>
             <a:r>
-              <a:rPr lang="en-US" smtClean="0"/>
-              <a:t>Third level</a:t>
+              <a:rPr lang="de-DE" smtClean="0"/>
+              <a:t>Dritte Ebene</a:t>
             </a:r>
           </a:p>
           <a:p>
             <a:pPr lvl="3"/>
             <a:r>
-              <a:rPr lang="en-US" smtClean="0"/>
-              <a:t>Fourth level</a:t>
+              <a:rPr lang="de-DE" smtClean="0"/>
+              <a:t>Vierte Ebene</a:t>
             </a:r>
           </a:p>
           <a:p>
             <a:pPr lvl="4"/>
             <a:r>
-              <a:rPr lang="en-US" smtClean="0"/>
-              <a:t>Fifth level</a:t>
+              <a:rPr lang="de-DE" smtClean="0"/>
+              <a:t>Fünfte Ebene</a:t>
             </a:r>
             <a:endParaRPr lang="en-US" dirty="0"/>
           </a:p>
@@ -2686,7 +2699,7 @@
     </p:spTree>
     <p:extLst>
       <p:ext uri="{BB962C8B-B14F-4D97-AF65-F5344CB8AC3E}">
-        <p14:creationId xmlns:p14="http://schemas.microsoft.com/office/powerpoint/2010/main" val="3683478588"/>
+        <p14:creationId xmlns:p14="http://schemas.microsoft.com/office/powerpoint/2010/main" val="104202685"/>
       </p:ext>
     </p:extLst>
   </p:cSld>
@@ -2698,7 +2711,7 @@
 
 <file path=ppt/slideLayouts/slideLayout16.xml><?xml version="1.0" encoding="utf-8"?>
 <p:sldLayout xmlns:a="http://schemas.openxmlformats.org/drawingml/2006/main" xmlns:r="http://schemas.openxmlformats.org/officeDocument/2006/relationships" xmlns:p="http://schemas.openxmlformats.org/presentationml/2006/main" type="vertTitleAndTx" preserve="1">
-  <p:cSld name="Vertical Title and Text">
+  <p:cSld name="Vertikaler Titel und Text">
     <p:spTree>
       <p:nvGrpSpPr>
         <p:cNvPr id="1" name=""/>
@@ -2734,8 +2747,8 @@
           <a:lstStyle/>
           <a:p>
             <a:r>
-              <a:rPr lang="en-US" smtClean="0"/>
-              <a:t>Click to edit Master title style</a:t>
+              <a:rPr lang="de-DE" smtClean="0"/>
+              <a:t>Titelmasterformat durch Klicken bearbeiten</a:t>
             </a:r>
             <a:endParaRPr lang="en-US" dirty="0"/>
           </a:p>
@@ -2763,36 +2776,36 @@
           <a:p>
             <a:pPr lvl="0"/>
             <a:r>
-              <a:rPr lang="en-US" smtClean="0"/>
-              <a:t>Click to edit Master text styles</a:t>
+              <a:rPr lang="de-DE" smtClean="0"/>
+              <a:t>Textmasterformat bearbeiten</a:t>
             </a:r>
           </a:p>
           <a:p>
             <a:pPr lvl="1"/>
             <a:r>
-              <a:rPr lang="en-US" smtClean="0"/>
-              <a:t>Second level</a:t>
+              <a:rPr lang="de-DE" smtClean="0"/>
+              <a:t>Zweite Ebene</a:t>
             </a:r>
           </a:p>
           <a:p>
             <a:pPr lvl="2"/>
             <a:r>
-              <a:rPr lang="en-US" smtClean="0"/>
-              <a:t>Third level</a:t>
+              <a:rPr lang="de-DE" smtClean="0"/>
+              <a:t>Dritte Ebene</a:t>
             </a:r>
           </a:p>
           <a:p>
             <a:pPr lvl="3"/>
             <a:r>
-              <a:rPr lang="en-US" smtClean="0"/>
-              <a:t>Fourth level</a:t>
+              <a:rPr lang="de-DE" smtClean="0"/>
+              <a:t>Vierte Ebene</a:t>
             </a:r>
           </a:p>
           <a:p>
             <a:pPr lvl="4"/>
             <a:r>
-              <a:rPr lang="en-US" smtClean="0"/>
-              <a:t>Fifth level</a:t>
+              <a:rPr lang="de-DE" smtClean="0"/>
+              <a:t>Fünfte Ebene</a:t>
             </a:r>
             <a:endParaRPr lang="en-US" dirty="0"/>
           </a:p>
@@ -2866,7 +2879,7 @@
     </p:spTree>
     <p:extLst>
       <p:ext uri="{BB962C8B-B14F-4D97-AF65-F5344CB8AC3E}">
-        <p14:creationId xmlns:p14="http://schemas.microsoft.com/office/powerpoint/2010/main" val="2043481464"/>
+        <p14:creationId xmlns:p14="http://schemas.microsoft.com/office/powerpoint/2010/main" val="1033130726"/>
       </p:ext>
     </p:extLst>
   </p:cSld>
@@ -2878,7 +2891,7 @@
 
 <file path=ppt/slideLayouts/slideLayout2.xml><?xml version="1.0" encoding="utf-8"?>
 <p:sldLayout xmlns:a="http://schemas.openxmlformats.org/drawingml/2006/main" xmlns:r="http://schemas.openxmlformats.org/officeDocument/2006/relationships" xmlns:p="http://schemas.openxmlformats.org/presentationml/2006/main" type="obj" preserve="1">
-  <p:cSld name="Title and Content">
+  <p:cSld name="Titel und Inhalt">
     <p:spTree>
       <p:nvGrpSpPr>
         <p:cNvPr id="1" name=""/>
@@ -2905,18 +2918,12 @@
         </p:nvSpPr>
         <p:spPr/>
         <p:txBody>
-          <a:bodyPr>
-            <a:normAutofit/>
-          </a:bodyPr>
-          <a:lstStyle>
-            <a:lvl1pPr>
-              <a:defRPr sz="3600"/>
-            </a:lvl1pPr>
-          </a:lstStyle>
-          <a:p>
-            <a:r>
-              <a:rPr lang="en-US" smtClean="0"/>
-              <a:t>Click to edit Master title style</a:t>
+          <a:bodyPr/>
+          <a:lstStyle/>
+          <a:p>
+            <a:r>
+              <a:rPr lang="de-DE" smtClean="0"/>
+              <a:t>Titelmasterformat durch Klicken bearbeiten</a:t>
             </a:r>
             <a:endParaRPr lang="en-US" dirty="0"/>
           </a:p>
@@ -2939,36 +2946,36 @@
           <a:p>
             <a:pPr lvl="0"/>
             <a:r>
-              <a:rPr lang="en-US" smtClean="0"/>
-              <a:t>Click to edit Master text styles</a:t>
+              <a:rPr lang="de-DE" smtClean="0"/>
+              <a:t>Textmasterformat bearbeiten</a:t>
             </a:r>
           </a:p>
           <a:p>
             <a:pPr lvl="1"/>
             <a:r>
-              <a:rPr lang="en-US" smtClean="0"/>
-              <a:t>Second level</a:t>
+              <a:rPr lang="de-DE" smtClean="0"/>
+              <a:t>Zweite Ebene</a:t>
             </a:r>
           </a:p>
           <a:p>
             <a:pPr lvl="2"/>
             <a:r>
-              <a:rPr lang="en-US" smtClean="0"/>
-              <a:t>Third level</a:t>
+              <a:rPr lang="de-DE" smtClean="0"/>
+              <a:t>Dritte Ebene</a:t>
             </a:r>
           </a:p>
           <a:p>
             <a:pPr lvl="3"/>
             <a:r>
-              <a:rPr lang="en-US" smtClean="0"/>
-              <a:t>Fourth level</a:t>
+              <a:rPr lang="de-DE" smtClean="0"/>
+              <a:t>Vierte Ebene</a:t>
             </a:r>
           </a:p>
           <a:p>
             <a:pPr lvl="4"/>
             <a:r>
-              <a:rPr lang="en-US" smtClean="0"/>
-              <a:t>Fifth level</a:t>
+              <a:rPr lang="de-DE" smtClean="0"/>
+              <a:t>Fünfte Ebene</a:t>
             </a:r>
             <a:endParaRPr lang="en-US" dirty="0"/>
           </a:p>
@@ -3042,7 +3049,7 @@
     </p:spTree>
     <p:extLst>
       <p:ext uri="{BB962C8B-B14F-4D97-AF65-F5344CB8AC3E}">
-        <p14:creationId xmlns:p14="http://schemas.microsoft.com/office/powerpoint/2010/main" val="255359658"/>
+        <p14:creationId xmlns:p14="http://schemas.microsoft.com/office/powerpoint/2010/main" val="3817401373"/>
       </p:ext>
     </p:extLst>
   </p:cSld>
@@ -3054,7 +3061,7 @@
 
 <file path=ppt/slideLayouts/slideLayout3.xml><?xml version="1.0" encoding="utf-8"?>
 <p:sldLayout xmlns:a="http://schemas.openxmlformats.org/drawingml/2006/main" xmlns:r="http://schemas.openxmlformats.org/officeDocument/2006/relationships" xmlns:p="http://schemas.openxmlformats.org/presentationml/2006/main" type="secHead" preserve="1">
-  <p:cSld name="Section Header">
+  <p:cSld name="Abschnitts-&#10;überschrift">
     <p:spTree>
       <p:nvGrpSpPr>
         <p:cNvPr id="1" name=""/>
@@ -3094,8 +3101,8 @@
           </a:lstStyle>
           <a:p>
             <a:r>
-              <a:rPr lang="en-US" smtClean="0"/>
-              <a:t>Click to edit Master title style</a:t>
+              <a:rPr lang="de-DE" smtClean="0"/>
+              <a:t>Titelmasterformat durch Klicken bearbeiten</a:t>
             </a:r>
             <a:endParaRPr lang="en-US" dirty="0"/>
           </a:p>
@@ -3215,8 +3222,8 @@
           <a:p>
             <a:pPr lvl="0"/>
             <a:r>
-              <a:rPr lang="en-US" smtClean="0"/>
-              <a:t>Click to edit Master text styles</a:t>
+              <a:rPr lang="de-DE" smtClean="0"/>
+              <a:t>Textmasterformat bearbeiten</a:t>
             </a:r>
           </a:p>
         </p:txBody>
@@ -3289,7 +3296,7 @@
     </p:spTree>
     <p:extLst>
       <p:ext uri="{BB962C8B-B14F-4D97-AF65-F5344CB8AC3E}">
-        <p14:creationId xmlns:p14="http://schemas.microsoft.com/office/powerpoint/2010/main" val="3217002102"/>
+        <p14:creationId xmlns:p14="http://schemas.microsoft.com/office/powerpoint/2010/main" val="4137403115"/>
       </p:ext>
     </p:extLst>
   </p:cSld>
@@ -3301,7 +3308,7 @@
 
 <file path=ppt/slideLayouts/slideLayout4.xml><?xml version="1.0" encoding="utf-8"?>
 <p:sldLayout xmlns:a="http://schemas.openxmlformats.org/drawingml/2006/main" xmlns:r="http://schemas.openxmlformats.org/officeDocument/2006/relationships" xmlns:p="http://schemas.openxmlformats.org/presentationml/2006/main" type="twoObj" preserve="1">
-  <p:cSld name="Two Content">
+  <p:cSld name="Zwei Inhalte">
     <p:spTree>
       <p:nvGrpSpPr>
         <p:cNvPr id="1" name=""/>
@@ -3332,8 +3339,8 @@
           <a:lstStyle/>
           <a:p>
             <a:r>
-              <a:rPr lang="en-US" smtClean="0"/>
-              <a:t>Click to edit Master title style</a:t>
+              <a:rPr lang="de-DE" smtClean="0"/>
+              <a:t>Titelmasterformat durch Klicken bearbeiten</a:t>
             </a:r>
             <a:endParaRPr lang="en-US" dirty="0"/>
           </a:p>
@@ -3361,36 +3368,36 @@
           <a:p>
             <a:pPr lvl="0"/>
             <a:r>
-              <a:rPr lang="en-US" smtClean="0"/>
-              <a:t>Click to edit Master text styles</a:t>
+              <a:rPr lang="de-DE" smtClean="0"/>
+              <a:t>Textmasterformat bearbeiten</a:t>
             </a:r>
           </a:p>
           <a:p>
             <a:pPr lvl="1"/>
             <a:r>
-              <a:rPr lang="en-US" smtClean="0"/>
-              <a:t>Second level</a:t>
+              <a:rPr lang="de-DE" smtClean="0"/>
+              <a:t>Zweite Ebene</a:t>
             </a:r>
           </a:p>
           <a:p>
             <a:pPr lvl="2"/>
             <a:r>
-              <a:rPr lang="en-US" smtClean="0"/>
-              <a:t>Third level</a:t>
+              <a:rPr lang="de-DE" smtClean="0"/>
+              <a:t>Dritte Ebene</a:t>
             </a:r>
           </a:p>
           <a:p>
             <a:pPr lvl="3"/>
             <a:r>
-              <a:rPr lang="en-US" smtClean="0"/>
-              <a:t>Fourth level</a:t>
+              <a:rPr lang="de-DE" smtClean="0"/>
+              <a:t>Vierte Ebene</a:t>
             </a:r>
           </a:p>
           <a:p>
             <a:pPr lvl="4"/>
             <a:r>
-              <a:rPr lang="en-US" smtClean="0"/>
-              <a:t>Fifth level</a:t>
+              <a:rPr lang="de-DE" smtClean="0"/>
+              <a:t>Fünfte Ebene</a:t>
             </a:r>
             <a:endParaRPr lang="en-US" dirty="0"/>
           </a:p>
@@ -3418,36 +3425,36 @@
           <a:p>
             <a:pPr lvl="0"/>
             <a:r>
-              <a:rPr lang="en-US" smtClean="0"/>
-              <a:t>Click to edit Master text styles</a:t>
+              <a:rPr lang="de-DE" smtClean="0"/>
+              <a:t>Textmasterformat bearbeiten</a:t>
             </a:r>
           </a:p>
           <a:p>
             <a:pPr lvl="1"/>
             <a:r>
-              <a:rPr lang="en-US" smtClean="0"/>
-              <a:t>Second level</a:t>
+              <a:rPr lang="de-DE" smtClean="0"/>
+              <a:t>Zweite Ebene</a:t>
             </a:r>
           </a:p>
           <a:p>
             <a:pPr lvl="2"/>
             <a:r>
-              <a:rPr lang="en-US" smtClean="0"/>
-              <a:t>Third level</a:t>
+              <a:rPr lang="de-DE" smtClean="0"/>
+              <a:t>Dritte Ebene</a:t>
             </a:r>
           </a:p>
           <a:p>
             <a:pPr lvl="3"/>
             <a:r>
-              <a:rPr lang="en-US" smtClean="0"/>
-              <a:t>Fourth level</a:t>
+              <a:rPr lang="de-DE" smtClean="0"/>
+              <a:t>Vierte Ebene</a:t>
             </a:r>
           </a:p>
           <a:p>
             <a:pPr lvl="4"/>
             <a:r>
-              <a:rPr lang="en-US" smtClean="0"/>
-              <a:t>Fifth level</a:t>
+              <a:rPr lang="de-DE" smtClean="0"/>
+              <a:t>Fünfte Ebene</a:t>
             </a:r>
             <a:endParaRPr lang="en-US" dirty="0"/>
           </a:p>
@@ -3521,7 +3528,7 @@
     </p:spTree>
     <p:extLst>
       <p:ext uri="{BB962C8B-B14F-4D97-AF65-F5344CB8AC3E}">
-        <p14:creationId xmlns:p14="http://schemas.microsoft.com/office/powerpoint/2010/main" val="2693714966"/>
+        <p14:creationId xmlns:p14="http://schemas.microsoft.com/office/powerpoint/2010/main" val="3688491946"/>
       </p:ext>
     </p:extLst>
   </p:cSld>
@@ -3533,7 +3540,7 @@
 
 <file path=ppt/slideLayouts/slideLayout5.xml><?xml version="1.0" encoding="utf-8"?>
 <p:sldLayout xmlns:a="http://schemas.openxmlformats.org/drawingml/2006/main" xmlns:r="http://schemas.openxmlformats.org/officeDocument/2006/relationships" xmlns:p="http://schemas.openxmlformats.org/presentationml/2006/main" type="twoTxTwoObj" preserve="1">
-  <p:cSld name="Comparison">
+  <p:cSld name="Vergleich">
     <p:spTree>
       <p:nvGrpSpPr>
         <p:cNvPr id="1" name=""/>
@@ -3568,8 +3575,8 @@
           </a:lstStyle>
           <a:p>
             <a:r>
-              <a:rPr lang="en-US" smtClean="0"/>
-              <a:t>Click to edit Master title style</a:t>
+              <a:rPr lang="de-DE" smtClean="0"/>
+              <a:t>Titelmasterformat durch Klicken bearbeiten</a:t>
             </a:r>
             <a:endParaRPr lang="en-US" dirty="0"/>
           </a:p>
@@ -3636,8 +3643,8 @@
           <a:p>
             <a:pPr lvl="0"/>
             <a:r>
-              <a:rPr lang="en-US" smtClean="0"/>
-              <a:t>Click to edit Master text styles</a:t>
+              <a:rPr lang="de-DE" smtClean="0"/>
+              <a:t>Textmasterformat bearbeiten</a:t>
             </a:r>
           </a:p>
         </p:txBody>
@@ -3666,36 +3673,36 @@
           <a:p>
             <a:pPr lvl="0"/>
             <a:r>
-              <a:rPr lang="en-US" smtClean="0"/>
-              <a:t>Click to edit Master text styles</a:t>
+              <a:rPr lang="de-DE" smtClean="0"/>
+              <a:t>Textmasterformat bearbeiten</a:t>
             </a:r>
           </a:p>
           <a:p>
             <a:pPr lvl="1"/>
             <a:r>
-              <a:rPr lang="en-US" smtClean="0"/>
-              <a:t>Second level</a:t>
+              <a:rPr lang="de-DE" smtClean="0"/>
+              <a:t>Zweite Ebene</a:t>
             </a:r>
           </a:p>
           <a:p>
             <a:pPr lvl="2"/>
             <a:r>
-              <a:rPr lang="en-US" smtClean="0"/>
-              <a:t>Third level</a:t>
+              <a:rPr lang="de-DE" smtClean="0"/>
+              <a:t>Dritte Ebene</a:t>
             </a:r>
           </a:p>
           <a:p>
             <a:pPr lvl="3"/>
             <a:r>
-              <a:rPr lang="en-US" smtClean="0"/>
-              <a:t>Fourth level</a:t>
+              <a:rPr lang="de-DE" smtClean="0"/>
+              <a:t>Vierte Ebene</a:t>
             </a:r>
           </a:p>
           <a:p>
             <a:pPr lvl="4"/>
             <a:r>
-              <a:rPr lang="en-US" smtClean="0"/>
-              <a:t>Fifth level</a:t>
+              <a:rPr lang="de-DE" smtClean="0"/>
+              <a:t>Fünfte Ebene</a:t>
             </a:r>
             <a:endParaRPr lang="en-US" dirty="0"/>
           </a:p>
@@ -3762,8 +3769,8 @@
           <a:p>
             <a:pPr lvl="0"/>
             <a:r>
-              <a:rPr lang="en-US" smtClean="0"/>
-              <a:t>Click to edit Master text styles</a:t>
+              <a:rPr lang="de-DE" smtClean="0"/>
+              <a:t>Textmasterformat bearbeiten</a:t>
             </a:r>
           </a:p>
         </p:txBody>
@@ -3792,36 +3799,36 @@
           <a:p>
             <a:pPr lvl="0"/>
             <a:r>
-              <a:rPr lang="en-US" smtClean="0"/>
-              <a:t>Click to edit Master text styles</a:t>
+              <a:rPr lang="de-DE" smtClean="0"/>
+              <a:t>Textmasterformat bearbeiten</a:t>
             </a:r>
           </a:p>
           <a:p>
             <a:pPr lvl="1"/>
             <a:r>
-              <a:rPr lang="en-US" smtClean="0"/>
-              <a:t>Second level</a:t>
+              <a:rPr lang="de-DE" smtClean="0"/>
+              <a:t>Zweite Ebene</a:t>
             </a:r>
           </a:p>
           <a:p>
             <a:pPr lvl="2"/>
             <a:r>
-              <a:rPr lang="en-US" smtClean="0"/>
-              <a:t>Third level</a:t>
+              <a:rPr lang="de-DE" smtClean="0"/>
+              <a:t>Dritte Ebene</a:t>
             </a:r>
           </a:p>
           <a:p>
             <a:pPr lvl="3"/>
             <a:r>
-              <a:rPr lang="en-US" smtClean="0"/>
-              <a:t>Fourth level</a:t>
+              <a:rPr lang="de-DE" smtClean="0"/>
+              <a:t>Vierte Ebene</a:t>
             </a:r>
           </a:p>
           <a:p>
             <a:pPr lvl="4"/>
             <a:r>
-              <a:rPr lang="en-US" smtClean="0"/>
-              <a:t>Fifth level</a:t>
+              <a:rPr lang="de-DE" smtClean="0"/>
+              <a:t>Fünfte Ebene</a:t>
             </a:r>
             <a:endParaRPr lang="en-US" dirty="0"/>
           </a:p>
@@ -3895,7 +3902,7 @@
     </p:spTree>
     <p:extLst>
       <p:ext uri="{BB962C8B-B14F-4D97-AF65-F5344CB8AC3E}">
-        <p14:creationId xmlns:p14="http://schemas.microsoft.com/office/powerpoint/2010/main" val="2362077175"/>
+        <p14:creationId xmlns:p14="http://schemas.microsoft.com/office/powerpoint/2010/main" val="987362882"/>
       </p:ext>
     </p:extLst>
   </p:cSld>
@@ -3907,7 +3914,7 @@
 
 <file path=ppt/slideLayouts/slideLayout6.xml><?xml version="1.0" encoding="utf-8"?>
 <p:sldLayout xmlns:a="http://schemas.openxmlformats.org/drawingml/2006/main" xmlns:r="http://schemas.openxmlformats.org/officeDocument/2006/relationships" xmlns:p="http://schemas.openxmlformats.org/presentationml/2006/main" type="titleOnly" preserve="1">
-  <p:cSld name="Title Only">
+  <p:cSld name="Nur Titel">
     <p:spTree>
       <p:nvGrpSpPr>
         <p:cNvPr id="1" name=""/>
@@ -3943,8 +3950,8 @@
           <a:lstStyle/>
           <a:p>
             <a:r>
-              <a:rPr lang="en-US" smtClean="0"/>
-              <a:t>Click to edit Master title style</a:t>
+              <a:rPr lang="de-DE" smtClean="0"/>
+              <a:t>Titelmasterformat durch Klicken bearbeiten</a:t>
             </a:r>
             <a:endParaRPr lang="en-US" dirty="0"/>
           </a:p>
@@ -4018,7 +4025,7 @@
     </p:spTree>
     <p:extLst>
       <p:ext uri="{BB962C8B-B14F-4D97-AF65-F5344CB8AC3E}">
-        <p14:creationId xmlns:p14="http://schemas.microsoft.com/office/powerpoint/2010/main" val="3687165739"/>
+        <p14:creationId xmlns:p14="http://schemas.microsoft.com/office/powerpoint/2010/main" val="615275386"/>
       </p:ext>
     </p:extLst>
   </p:cSld>
@@ -4030,7 +4037,7 @@
 
 <file path=ppt/slideLayouts/slideLayout7.xml><?xml version="1.0" encoding="utf-8"?>
 <p:sldLayout xmlns:a="http://schemas.openxmlformats.org/drawingml/2006/main" xmlns:r="http://schemas.openxmlformats.org/officeDocument/2006/relationships" xmlns:p="http://schemas.openxmlformats.org/presentationml/2006/main" type="blank" preserve="1">
-  <p:cSld name="Blank">
+  <p:cSld name="Leer">
     <p:spTree>
       <p:nvGrpSpPr>
         <p:cNvPr id="1" name=""/>
@@ -4113,7 +4120,7 @@
     </p:spTree>
     <p:extLst>
       <p:ext uri="{BB962C8B-B14F-4D97-AF65-F5344CB8AC3E}">
-        <p14:creationId xmlns:p14="http://schemas.microsoft.com/office/powerpoint/2010/main" val="797816676"/>
+        <p14:creationId xmlns:p14="http://schemas.microsoft.com/office/powerpoint/2010/main" val="3945861378"/>
       </p:ext>
     </p:extLst>
   </p:cSld>
@@ -4125,7 +4132,7 @@
 
 <file path=ppt/slideLayouts/slideLayout8.xml><?xml version="1.0" encoding="utf-8"?>
 <p:sldLayout xmlns:a="http://schemas.openxmlformats.org/drawingml/2006/main" xmlns:r="http://schemas.openxmlformats.org/officeDocument/2006/relationships" xmlns:p="http://schemas.openxmlformats.org/presentationml/2006/main" type="objTx" preserve="1">
-  <p:cSld name="Content with Caption">
+  <p:cSld name="Inhalt mit Überschrift">
     <p:spTree>
       <p:nvGrpSpPr>
         <p:cNvPr id="1" name=""/>
@@ -4167,8 +4174,8 @@
           </a:lstStyle>
           <a:p>
             <a:r>
-              <a:rPr lang="en-US" smtClean="0"/>
-              <a:t>Click to edit Master title style</a:t>
+              <a:rPr lang="de-DE" smtClean="0"/>
+              <a:t>Titelmasterformat durch Klicken bearbeiten</a:t>
             </a:r>
             <a:endParaRPr lang="en-US" dirty="0"/>
           </a:p>
@@ -4198,36 +4205,36 @@
           <a:p>
             <a:pPr lvl="0"/>
             <a:r>
-              <a:rPr lang="en-US" smtClean="0"/>
-              <a:t>Click to edit Master text styles</a:t>
+              <a:rPr lang="de-DE" smtClean="0"/>
+              <a:t>Textmasterformat bearbeiten</a:t>
             </a:r>
           </a:p>
           <a:p>
             <a:pPr lvl="1"/>
             <a:r>
-              <a:rPr lang="en-US" smtClean="0"/>
-              <a:t>Second level</a:t>
+              <a:rPr lang="de-DE" smtClean="0"/>
+              <a:t>Zweite Ebene</a:t>
             </a:r>
           </a:p>
           <a:p>
             <a:pPr lvl="2"/>
             <a:r>
-              <a:rPr lang="en-US" smtClean="0"/>
-              <a:t>Third level</a:t>
+              <a:rPr lang="de-DE" smtClean="0"/>
+              <a:t>Dritte Ebene</a:t>
             </a:r>
           </a:p>
           <a:p>
             <a:pPr lvl="3"/>
             <a:r>
-              <a:rPr lang="en-US" smtClean="0"/>
-              <a:t>Fourth level</a:t>
+              <a:rPr lang="de-DE" smtClean="0"/>
+              <a:t>Vierte Ebene</a:t>
             </a:r>
           </a:p>
           <a:p>
             <a:pPr lvl="4"/>
             <a:r>
-              <a:rPr lang="en-US" smtClean="0"/>
-              <a:t>Fifth level</a:t>
+              <a:rPr lang="de-DE" smtClean="0"/>
+              <a:t>Fünfte Ebene</a:t>
             </a:r>
             <a:endParaRPr lang="en-US" dirty="0"/>
           </a:p>
@@ -4294,8 +4301,8 @@
           <a:p>
             <a:pPr lvl="0"/>
             <a:r>
-              <a:rPr lang="en-US" smtClean="0"/>
-              <a:t>Click to edit Master text styles</a:t>
+              <a:rPr lang="de-DE" smtClean="0"/>
+              <a:t>Textmasterformat bearbeiten</a:t>
             </a:r>
           </a:p>
         </p:txBody>
@@ -4368,7 +4375,7 @@
     </p:spTree>
     <p:extLst>
       <p:ext uri="{BB962C8B-B14F-4D97-AF65-F5344CB8AC3E}">
-        <p14:creationId xmlns:p14="http://schemas.microsoft.com/office/powerpoint/2010/main" val="4067675895"/>
+        <p14:creationId xmlns:p14="http://schemas.microsoft.com/office/powerpoint/2010/main" val="2030153257"/>
       </p:ext>
     </p:extLst>
   </p:cSld>
@@ -4380,7 +4387,7 @@
 
 <file path=ppt/slideLayouts/slideLayout9.xml><?xml version="1.0" encoding="utf-8"?>
 <p:sldLayout xmlns:a="http://schemas.openxmlformats.org/drawingml/2006/main" xmlns:r="http://schemas.openxmlformats.org/officeDocument/2006/relationships" xmlns:p="http://schemas.openxmlformats.org/presentationml/2006/main" type="picTx" preserve="1">
-  <p:cSld name="Picture with Caption">
+  <p:cSld name="Bild mit Überschrift">
     <p:spTree>
       <p:nvGrpSpPr>
         <p:cNvPr id="1" name=""/>
@@ -4422,8 +4429,8 @@
           </a:lstStyle>
           <a:p>
             <a:r>
-              <a:rPr lang="en-US" smtClean="0"/>
-              <a:t>Click to edit Master title style</a:t>
+              <a:rPr lang="de-DE" smtClean="0"/>
+              <a:t>Titelmasterformat durch Klicken bearbeiten</a:t>
             </a:r>
             <a:endParaRPr lang="en-US" dirty="0"/>
           </a:p>
@@ -4489,8 +4496,8 @@
           </a:lstStyle>
           <a:p>
             <a:r>
-              <a:rPr lang="en-US" smtClean="0"/>
-              <a:t>Click icon to add picture</a:t>
+              <a:rPr lang="de-DE" smtClean="0"/>
+              <a:t>Bild durch Klicken auf Symbol hinzufügen</a:t>
             </a:r>
             <a:endParaRPr lang="en-US" dirty="0"/>
           </a:p>
@@ -4557,9 +4564,51 @@
           <a:p>
             <a:pPr lvl="0"/>
             <a:r>
-              <a:rPr lang="en-US" smtClean="0"/>
-              <a:t>Click to edit Master text styles</a:t>
-            </a:r>
+              <a:rPr lang="de-DE" smtClean="0"/>
+              <a:t>Textmasterformat bearbeiten</a:t>
+            </a:r>
+          </a:p>
+        </p:txBody>
+      </p:sp>
+      <p:sp>
+        <p:nvSpPr>
+          <p:cNvPr id="6" name="Footer Placeholder 5"/>
+          <p:cNvSpPr>
+            <a:spLocks noGrp="1"/>
+          </p:cNvSpPr>
+          <p:nvPr>
+            <p:ph type="ftr" sz="quarter" idx="11"/>
+          </p:nvPr>
+        </p:nvSpPr>
+        <p:spPr/>
+        <p:txBody>
+          <a:bodyPr/>
+          <a:lstStyle/>
+          <a:p>
+            <a:endParaRPr lang="et-EE"/>
+          </a:p>
+        </p:txBody>
+      </p:sp>
+      <p:sp>
+        <p:nvSpPr>
+          <p:cNvPr id="7" name="Slide Number Placeholder 6"/>
+          <p:cNvSpPr>
+            <a:spLocks noGrp="1"/>
+          </p:cNvSpPr>
+          <p:nvPr>
+            <p:ph type="sldNum" sz="quarter" idx="12"/>
+          </p:nvPr>
+        </p:nvSpPr>
+        <p:spPr/>
+        <p:txBody>
+          <a:bodyPr/>
+          <a:lstStyle/>
+          <a:p>
+            <a:fld id="{348CCCA5-816C-4E2B-9087-5AA4BDC9BCA4}" type="slidenum">
+              <a:rPr lang="et-EE" smtClean="0"/>
+              <a:t>‹Nr.›</a:t>
+            </a:fld>
+            <a:endParaRPr lang="et-EE"/>
           </a:p>
         </p:txBody>
       </p:sp>
@@ -4586,52 +4635,10 @@
           </a:p>
         </p:txBody>
       </p:sp>
-      <p:sp>
-        <p:nvSpPr>
-          <p:cNvPr id="6" name="Footer Placeholder 5"/>
-          <p:cNvSpPr>
-            <a:spLocks noGrp="1"/>
-          </p:cNvSpPr>
-          <p:nvPr>
-            <p:ph type="ftr" sz="quarter" idx="11"/>
-          </p:nvPr>
-        </p:nvSpPr>
-        <p:spPr/>
-        <p:txBody>
-          <a:bodyPr/>
-          <a:lstStyle/>
-          <a:p>
-            <a:endParaRPr lang="et-EE"/>
-          </a:p>
-        </p:txBody>
-      </p:sp>
-      <p:sp>
-        <p:nvSpPr>
-          <p:cNvPr id="7" name="Slide Number Placeholder 6"/>
-          <p:cNvSpPr>
-            <a:spLocks noGrp="1"/>
-          </p:cNvSpPr>
-          <p:nvPr>
-            <p:ph type="sldNum" sz="quarter" idx="12"/>
-          </p:nvPr>
-        </p:nvSpPr>
-        <p:spPr/>
-        <p:txBody>
-          <a:bodyPr/>
-          <a:lstStyle/>
-          <a:p>
-            <a:fld id="{348CCCA5-816C-4E2B-9087-5AA4BDC9BCA4}" type="slidenum">
-              <a:rPr lang="et-EE" smtClean="0"/>
-              <a:t>‹Nr.›</a:t>
-            </a:fld>
-            <a:endParaRPr lang="et-EE"/>
-          </a:p>
-        </p:txBody>
-      </p:sp>
     </p:spTree>
     <p:extLst>
       <p:ext uri="{BB962C8B-B14F-4D97-AF65-F5344CB8AC3E}">
-        <p14:creationId xmlns:p14="http://schemas.microsoft.com/office/powerpoint/2010/main" val="3195137122"/>
+        <p14:creationId xmlns:p14="http://schemas.microsoft.com/office/powerpoint/2010/main" val="2417477126"/>
       </p:ext>
     </p:extLst>
   </p:cSld>
@@ -4665,7 +4672,7 @@
       </p:grpSpPr>
       <p:grpSp>
         <p:nvGrpSpPr>
-          <p:cNvPr id="7" name="Group 6"/>
+          <p:cNvPr id="44" name="Group 43"/>
           <p:cNvGrpSpPr/>
           <p:nvPr/>
         </p:nvGrpSpPr>
@@ -4693,8 +4700,8 @@
             </a:prstGeom>
             <a:ln w="9525">
               <a:solidFill>
-                <a:schemeClr val="bg1">
-                  <a:lumMod val="75000"/>
+                <a:schemeClr val="accent1">
+                  <a:alpha val="70000"/>
                 </a:schemeClr>
               </a:solidFill>
             </a:ln>
@@ -4730,8 +4737,8 @@
             </a:prstGeom>
             <a:ln w="9525">
               <a:solidFill>
-                <a:schemeClr val="bg1">
-                  <a:lumMod val="85000"/>
+                <a:schemeClr val="accent1">
+                  <a:alpha val="70000"/>
                 </a:schemeClr>
               </a:solidFill>
             </a:ln>
@@ -4791,7 +4798,7 @@
             </a:custGeom>
             <a:solidFill>
               <a:schemeClr val="accent1">
-                <a:alpha val="30000"/>
+                <a:alpha val="36000"/>
               </a:schemeClr>
             </a:solidFill>
             <a:ln>
@@ -4894,8 +4901,9 @@
               </a:avLst>
             </a:prstGeom>
             <a:solidFill>
-              <a:schemeClr val="accent2">
-                <a:alpha val="72000"/>
+              <a:schemeClr val="accent1">
+                <a:lumMod val="75000"/>
+                <a:alpha val="66000"/>
               </a:schemeClr>
             </a:solidFill>
             <a:ln>
@@ -4957,9 +4965,9 @@
               </a:pathLst>
             </a:custGeom>
             <a:solidFill>
-              <a:schemeClr val="accent2">
+              <a:schemeClr val="accent1">
                 <a:lumMod val="75000"/>
-                <a:alpha val="70000"/>
+                <a:alpha val="50000"/>
               </a:schemeClr>
             </a:solidFill>
             <a:ln>
@@ -5021,9 +5029,7 @@
               </a:pathLst>
             </a:custGeom>
             <a:solidFill>
-              <a:schemeClr val="accent1">
-                <a:lumMod val="60000"/>
-                <a:lumOff val="40000"/>
+              <a:schemeClr val="accent2">
                 <a:alpha val="70000"/>
               </a:schemeClr>
             </a:solidFill>
@@ -5086,8 +5092,9 @@
               </a:pathLst>
             </a:custGeom>
             <a:solidFill>
-              <a:schemeClr val="accent1">
-                <a:alpha val="65000"/>
+              <a:schemeClr val="accent2">
+                <a:lumMod val="75000"/>
+                <a:alpha val="80000"/>
               </a:schemeClr>
             </a:solidFill>
             <a:ln>
@@ -5128,7 +5135,8 @@
             </a:prstGeom>
             <a:solidFill>
               <a:schemeClr val="accent1">
-                <a:alpha val="80000"/>
+                <a:lumMod val="75000"/>
+                <a:alpha val="66000"/>
               </a:schemeClr>
             </a:solidFill>
             <a:ln>
@@ -5153,7 +5161,7 @@
         </p:sp>
         <p:sp>
           <p:nvSpPr>
-            <p:cNvPr id="29" name="Isosceles Triangle 28"/>
+            <p:cNvPr id="19" name="Isosceles Triangle 18"/>
             <p:cNvSpPr/>
             <p:nvPr/>
           </p:nvSpPr>
@@ -5169,7 +5177,7 @@
             </a:prstGeom>
             <a:solidFill>
               <a:schemeClr val="accent1">
-                <a:alpha val="85000"/>
+                <a:alpha val="70000"/>
               </a:schemeClr>
             </a:solidFill>
             <a:ln>
@@ -5219,8 +5227,8 @@
           <a:lstStyle/>
           <a:p>
             <a:r>
-              <a:rPr lang="en-US" smtClean="0"/>
-              <a:t>Click to edit Master title style</a:t>
+              <a:rPr lang="de-DE" smtClean="0"/>
+              <a:t>Titelmasterformat durch Klicken bearbeiten</a:t>
             </a:r>
             <a:endParaRPr lang="en-US" dirty="0"/>
           </a:p>
@@ -5253,36 +5261,36 @@
           <a:p>
             <a:pPr lvl="0"/>
             <a:r>
-              <a:rPr lang="en-US" smtClean="0"/>
-              <a:t>Click to edit Master text styles</a:t>
+              <a:rPr lang="de-DE" smtClean="0"/>
+              <a:t>Textmasterformat bearbeiten</a:t>
             </a:r>
           </a:p>
           <a:p>
             <a:pPr lvl="1"/>
             <a:r>
-              <a:rPr lang="en-US" smtClean="0"/>
-              <a:t>Second level</a:t>
+              <a:rPr lang="de-DE" smtClean="0"/>
+              <a:t>Zweite Ebene</a:t>
             </a:r>
           </a:p>
           <a:p>
             <a:pPr lvl="2"/>
             <a:r>
-              <a:rPr lang="en-US" smtClean="0"/>
-              <a:t>Third level</a:t>
+              <a:rPr lang="de-DE" smtClean="0"/>
+              <a:t>Dritte Ebene</a:t>
             </a:r>
           </a:p>
           <a:p>
             <a:pPr lvl="3"/>
             <a:r>
-              <a:rPr lang="en-US" smtClean="0"/>
-              <a:t>Fourth level</a:t>
+              <a:rPr lang="de-DE" smtClean="0"/>
+              <a:t>Vierte Ebene</a:t>
             </a:r>
           </a:p>
           <a:p>
             <a:pPr lvl="4"/>
             <a:r>
-              <a:rPr lang="en-US" smtClean="0"/>
-              <a:t>Fifth level</a:t>
+              <a:rPr lang="de-DE" smtClean="0"/>
+              <a:t>Fünfte Ebene</a:t>
             </a:r>
             <a:endParaRPr lang="en-US" dirty="0"/>
           </a:p>
@@ -5408,28 +5416,28 @@
     </p:spTree>
     <p:extLst>
       <p:ext uri="{BB962C8B-B14F-4D97-AF65-F5344CB8AC3E}">
-        <p14:creationId xmlns:p14="http://schemas.microsoft.com/office/powerpoint/2010/main" val="611670136"/>
+        <p14:creationId xmlns:p14="http://schemas.microsoft.com/office/powerpoint/2010/main" val="2683340600"/>
       </p:ext>
     </p:extLst>
   </p:cSld>
   <p:clrMap bg1="lt1" tx1="dk1" bg2="lt2" tx2="dk2" accent1="accent1" accent2="accent2" accent3="accent3" accent4="accent4" accent5="accent5" accent6="accent6" hlink="hlink" folHlink="folHlink"/>
   <p:sldLayoutIdLst>
-    <p:sldLayoutId id="2147483661" r:id="rId1"/>
-    <p:sldLayoutId id="2147483662" r:id="rId2"/>
-    <p:sldLayoutId id="2147483663" r:id="rId3"/>
-    <p:sldLayoutId id="2147483664" r:id="rId4"/>
-    <p:sldLayoutId id="2147483665" r:id="rId5"/>
-    <p:sldLayoutId id="2147483666" r:id="rId6"/>
-    <p:sldLayoutId id="2147483667" r:id="rId7"/>
-    <p:sldLayoutId id="2147483668" r:id="rId8"/>
-    <p:sldLayoutId id="2147483669" r:id="rId9"/>
-    <p:sldLayoutId id="2147483670" r:id="rId10"/>
-    <p:sldLayoutId id="2147483671" r:id="rId11"/>
-    <p:sldLayoutId id="2147483672" r:id="rId12"/>
-    <p:sldLayoutId id="2147483673" r:id="rId13"/>
-    <p:sldLayoutId id="2147483674" r:id="rId14"/>
-    <p:sldLayoutId id="2147483675" r:id="rId15"/>
-    <p:sldLayoutId id="2147483676" r:id="rId16"/>
+    <p:sldLayoutId id="2147483729" r:id="rId1"/>
+    <p:sldLayoutId id="2147483730" r:id="rId2"/>
+    <p:sldLayoutId id="2147483731" r:id="rId3"/>
+    <p:sldLayoutId id="2147483732" r:id="rId4"/>
+    <p:sldLayoutId id="2147483733" r:id="rId5"/>
+    <p:sldLayoutId id="2147483734" r:id="rId6"/>
+    <p:sldLayoutId id="2147483735" r:id="rId7"/>
+    <p:sldLayoutId id="2147483736" r:id="rId8"/>
+    <p:sldLayoutId id="2147483737" r:id="rId9"/>
+    <p:sldLayoutId id="2147483738" r:id="rId10"/>
+    <p:sldLayoutId id="2147483739" r:id="rId11"/>
+    <p:sldLayoutId id="2147483740" r:id="rId12"/>
+    <p:sldLayoutId id="2147483741" r:id="rId13"/>
+    <p:sldLayoutId id="2147483742" r:id="rId14"/>
+    <p:sldLayoutId id="2147483743" r:id="rId15"/>
+    <p:sldLayoutId id="2147483744" r:id="rId16"/>
   </p:sldLayoutIdLst>
   <p:txStyles>
     <p:titleStyle>
@@ -5859,7 +5867,7 @@
         </p:nvSpPr>
         <p:spPr>
           <a:xfrm>
-            <a:off x="1315998" y="1940510"/>
+            <a:off x="1315998" y="797510"/>
             <a:ext cx="7766936" cy="1646302"/>
           </a:xfrm>
         </p:spPr>
@@ -5907,19 +5915,19 @@
         </p:nvSpPr>
         <p:spPr>
           <a:xfrm>
-            <a:off x="627466" y="4050836"/>
-            <a:ext cx="9144000" cy="2321090"/>
+            <a:off x="627466" y="2987899"/>
+            <a:ext cx="9144000" cy="3384027"/>
           </a:xfrm>
         </p:spPr>
         <p:txBody>
           <a:bodyPr>
-            <a:normAutofit fontScale="77500" lnSpcReduction="20000"/>
+            <a:normAutofit fontScale="85000" lnSpcReduction="20000"/>
           </a:bodyPr>
           <a:lstStyle/>
           <a:p>
             <a:pPr algn="ctr"/>
             <a:r>
-              <a:rPr lang="en-US" sz="3900" dirty="0" smtClean="0">
+              <a:rPr lang="en-US" sz="5700" dirty="0" smtClean="0">
                 <a:solidFill>
                   <a:schemeClr val="tx1"/>
                 </a:solidFill>
@@ -5932,7 +5940,7 @@
           <a:p>
             <a:pPr algn="ctr"/>
             <a:r>
-              <a:rPr lang="en-US" dirty="0" smtClean="0">
+              <a:rPr lang="en-US" sz="2900" dirty="0" smtClean="0">
                 <a:solidFill>
                   <a:schemeClr val="tx1"/>
                 </a:solidFill>
@@ -5942,7 +5950,7 @@
               <a:t>Adam </a:t>
             </a:r>
             <a:r>
-              <a:rPr lang="en-US" dirty="0" err="1" smtClean="0">
+              <a:rPr lang="en-US" sz="2900" dirty="0" err="1" smtClean="0">
                 <a:solidFill>
                   <a:schemeClr val="tx1"/>
                 </a:solidFill>
@@ -5951,7 +5959,7 @@
               </a:rPr>
               <a:t>Eljasiak</a:t>
             </a:r>
-            <a:endParaRPr lang="en-US" dirty="0" smtClean="0">
+            <a:endParaRPr lang="en-US" sz="2900" dirty="0" smtClean="0">
               <a:solidFill>
                 <a:schemeClr val="tx1"/>
               </a:solidFill>
@@ -5962,7 +5970,7 @@
           <a:p>
             <a:pPr algn="ctr"/>
             <a:r>
-              <a:rPr lang="en-US" dirty="0" smtClean="0">
+              <a:rPr lang="en-US" sz="2900" dirty="0" smtClean="0">
                 <a:solidFill>
                   <a:schemeClr val="tx1"/>
                 </a:solidFill>
@@ -5972,7 +5980,7 @@
               <a:t>Daniel </a:t>
             </a:r>
             <a:r>
-              <a:rPr lang="et-EE" dirty="0" smtClean="0">
+              <a:rPr lang="et-EE" sz="2900" dirty="0" smtClean="0">
                 <a:solidFill>
                   <a:schemeClr val="tx1"/>
                 </a:solidFill>
@@ -5982,7 +5990,7 @@
               <a:t>K</a:t>
             </a:r>
             <a:r>
-              <a:rPr lang="de-DE" dirty="0" err="1" smtClean="0">
+              <a:rPr lang="de-DE" sz="2900" dirty="0" err="1" smtClean="0">
                 <a:solidFill>
                   <a:schemeClr val="tx1"/>
                 </a:solidFill>
@@ -5992,7 +6000,7 @@
               <a:t>ae</a:t>
             </a:r>
             <a:r>
-              <a:rPr lang="et-EE" dirty="0" smtClean="0">
+              <a:rPr lang="et-EE" sz="2900" dirty="0" smtClean="0">
                 <a:solidFill>
                   <a:schemeClr val="tx1"/>
                 </a:solidFill>
@@ -6005,7 +6013,7 @@
           <a:p>
             <a:pPr algn="ctr"/>
             <a:r>
-              <a:rPr lang="et-EE" dirty="0" smtClean="0">
+              <a:rPr lang="et-EE" sz="2900" dirty="0" smtClean="0">
                 <a:solidFill>
                   <a:schemeClr val="tx1"/>
                 </a:solidFill>
@@ -6018,7 +6026,7 @@
           <a:p>
             <a:pPr algn="ctr"/>
             <a:r>
-              <a:rPr lang="et-EE" dirty="0" smtClean="0">
+              <a:rPr lang="et-EE" sz="2900" dirty="0" smtClean="0">
                 <a:solidFill>
                   <a:schemeClr val="tx1"/>
                 </a:solidFill>
@@ -6031,7 +6039,7 @@
           <a:p>
             <a:pPr algn="ctr"/>
             <a:r>
-              <a:rPr lang="et-EE" dirty="0" smtClean="0">
+              <a:rPr lang="et-EE" sz="2900" dirty="0" smtClean="0">
                 <a:solidFill>
                   <a:schemeClr val="tx1"/>
                 </a:solidFill>
@@ -6044,7 +6052,7 @@
           <a:p>
             <a:pPr algn="ctr"/>
             <a:r>
-              <a:rPr lang="et-EE" dirty="0" smtClean="0">
+              <a:rPr lang="et-EE" sz="2900" dirty="0" smtClean="0">
                 <a:solidFill>
                   <a:schemeClr val="tx1"/>
                 </a:solidFill>
@@ -6216,8 +6224,8 @@
         </p:blipFill>
         <p:spPr>
           <a:xfrm>
-            <a:off x="1973500" y="3978760"/>
-            <a:ext cx="6233354" cy="2673386"/>
+            <a:off x="1487420" y="4069724"/>
+            <a:ext cx="5793501" cy="2484740"/>
           </a:xfrm>
         </p:spPr>
       </p:pic>
@@ -6279,21 +6287,7 @@
                 <a:latin typeface="Arial" panose="020B0604020202020204" pitchFamily="34" charset="0"/>
                 <a:cs typeface="Arial" panose="020B0604020202020204" pitchFamily="34" charset="0"/>
               </a:rPr>
-              <a:t> solutions (change </a:t>
-            </a:r>
-            <a:r>
-              <a:rPr lang="en-US" sz="2000" dirty="0" smtClean="0">
-                <a:latin typeface="Arial" panose="020B0604020202020204" pitchFamily="34" charset="0"/>
-                <a:cs typeface="Arial" panose="020B0604020202020204" pitchFamily="34" charset="0"/>
-              </a:rPr>
-              <a:t>n random packages </a:t>
-            </a:r>
-            <a:r>
-              <a:rPr lang="en-US" sz="2000" dirty="0" smtClean="0">
-                <a:latin typeface="Arial" panose="020B0604020202020204" pitchFamily="34" charset="0"/>
-                <a:cs typeface="Arial" panose="020B0604020202020204" pitchFamily="34" charset="0"/>
-              </a:rPr>
-              <a:t>and fill the remaining empty space)</a:t>
+              <a:t> solutions (change n random packages and fill the remaining empty space)</a:t>
             </a:r>
           </a:p>
           <a:p>
@@ -6375,42 +6369,34 @@
             <p:ph type="title"/>
           </p:nvPr>
         </p:nvSpPr>
-        <p:spPr/>
+        <p:spPr>
+          <a:xfrm>
+            <a:off x="3024749" y="3011606"/>
+            <a:ext cx="8596668" cy="1320800"/>
+          </a:xfrm>
+        </p:spPr>
         <p:txBody>
           <a:bodyPr/>
           <a:lstStyle/>
           <a:p>
             <a:r>
-              <a:rPr lang="en-US" dirty="0" smtClean="0"/>
-              <a:t>Experiments and results</a:t>
-            </a:r>
-            <a:endParaRPr lang="et-EE" dirty="0"/>
-          </a:p>
-        </p:txBody>
-      </p:sp>
-      <p:sp>
-        <p:nvSpPr>
-          <p:cNvPr id="3" name="Content Placeholder 2"/>
-          <p:cNvSpPr>
-            <a:spLocks noGrp="1"/>
-          </p:cNvSpPr>
-          <p:nvPr>
-            <p:ph idx="1"/>
-          </p:nvPr>
-        </p:nvSpPr>
-        <p:spPr/>
-        <p:txBody>
-          <a:bodyPr/>
-          <a:lstStyle/>
-          <a:p>
-            <a:endParaRPr lang="et-EE" dirty="0"/>
+              <a:rPr lang="en-US" dirty="0" smtClean="0">
+                <a:latin typeface="Arial" panose="020B0604020202020204" pitchFamily="34" charset="0"/>
+                <a:cs typeface="Arial" panose="020B0604020202020204" pitchFamily="34" charset="0"/>
+              </a:rPr>
+              <a:t>GENETIC ALGORITHM</a:t>
+            </a:r>
+            <a:endParaRPr lang="et-EE" dirty="0">
+              <a:latin typeface="Arial" panose="020B0604020202020204" pitchFamily="34" charset="0"/>
+              <a:cs typeface="Arial" panose="020B0604020202020204" pitchFamily="34" charset="0"/>
+            </a:endParaRPr>
           </a:p>
         </p:txBody>
       </p:sp>
     </p:spTree>
     <p:extLst>
       <p:ext uri="{BB962C8B-B14F-4D97-AF65-F5344CB8AC3E}">
-        <p14:creationId xmlns:p14="http://schemas.microsoft.com/office/powerpoint/2010/main" val="3675406741"/>
+        <p14:creationId xmlns:p14="http://schemas.microsoft.com/office/powerpoint/2010/main" val="4268301284"/>
       </p:ext>
     </p:extLst>
   </p:cSld>
@@ -6454,12 +6440,7 @@
             <p:ph type="title"/>
           </p:nvPr>
         </p:nvSpPr>
-        <p:spPr>
-          <a:xfrm>
-            <a:off x="3024749" y="3011606"/>
-            <a:ext cx="8596668" cy="1320800"/>
-          </a:xfrm>
-        </p:spPr>
+        <p:spPr/>
         <p:txBody>
           <a:bodyPr/>
           <a:lstStyle/>
@@ -6469,7 +6450,7 @@
                 <a:latin typeface="Arial" panose="020B0604020202020204" pitchFamily="34" charset="0"/>
                 <a:cs typeface="Arial" panose="020B0604020202020204" pitchFamily="34" charset="0"/>
               </a:rPr>
-              <a:t>GENETIC ALGORITHM</a:t>
+              <a:t>Implementation</a:t>
             </a:r>
             <a:endParaRPr lang="et-EE" dirty="0">
               <a:latin typeface="Arial" panose="020B0604020202020204" pitchFamily="34" charset="0"/>
@@ -6478,10 +6459,137 @@
           </a:p>
         </p:txBody>
       </p:sp>
+      <p:sp>
+        <p:nvSpPr>
+          <p:cNvPr id="3" name="Content Placeholder 2"/>
+          <p:cNvSpPr>
+            <a:spLocks noGrp="1"/>
+          </p:cNvSpPr>
+          <p:nvPr>
+            <p:ph idx="1"/>
+          </p:nvPr>
+        </p:nvSpPr>
+        <p:spPr/>
+        <p:txBody>
+          <a:bodyPr>
+            <a:normAutofit/>
+          </a:bodyPr>
+          <a:lstStyle/>
+          <a:p>
+            <a:pPr>
+              <a:buClr>
+                <a:schemeClr val="tx1"/>
+              </a:buClr>
+              <a:buFont typeface="Arial" panose="020B0604020202020204" pitchFamily="34" charset="0"/>
+              <a:buChar char="•"/>
+            </a:pPr>
+            <a:r>
+              <a:rPr lang="en-US" sz="2400" dirty="0" smtClean="0">
+                <a:solidFill>
+                  <a:schemeClr val="tx1"/>
+                </a:solidFill>
+                <a:latin typeface="Arial" panose="020B0604020202020204" pitchFamily="34" charset="0"/>
+                <a:cs typeface="Arial" panose="020B0604020202020204" pitchFamily="34" charset="0"/>
+              </a:rPr>
+              <a:t>Chromosomes</a:t>
+            </a:r>
+            <a:r>
+              <a:rPr lang="en-US" sz="2400" dirty="0">
+                <a:solidFill>
+                  <a:schemeClr val="tx1"/>
+                </a:solidFill>
+                <a:latin typeface="Arial" panose="020B0604020202020204" pitchFamily="34" charset="0"/>
+                <a:cs typeface="Arial" panose="020B0604020202020204" pitchFamily="34" charset="0"/>
+              </a:rPr>
+              <a:t> (an array consisting of 0’s and 1’s</a:t>
+            </a:r>
+            <a:r>
+              <a:rPr lang="en-US" sz="2400" dirty="0" smtClean="0">
+                <a:solidFill>
+                  <a:schemeClr val="tx1"/>
+                </a:solidFill>
+                <a:latin typeface="Arial" panose="020B0604020202020204" pitchFamily="34" charset="0"/>
+                <a:cs typeface="Arial" panose="020B0604020202020204" pitchFamily="34" charset="0"/>
+              </a:rPr>
+              <a:t>)  of each individual are generated randomly for the initial population.</a:t>
+            </a:r>
+          </a:p>
+          <a:p>
+            <a:pPr>
+              <a:buClr>
+                <a:schemeClr val="tx1"/>
+              </a:buClr>
+              <a:buFont typeface="Arial" panose="020B0604020202020204" pitchFamily="34" charset="0"/>
+              <a:buChar char="•"/>
+            </a:pPr>
+            <a:r>
+              <a:rPr lang="en-US" sz="2400" dirty="0" smtClean="0">
+                <a:solidFill>
+                  <a:schemeClr val="tx1"/>
+                </a:solidFill>
+                <a:latin typeface="Arial" panose="020B0604020202020204" pitchFamily="34" charset="0"/>
+                <a:cs typeface="Arial" panose="020B0604020202020204" pitchFamily="34" charset="0"/>
+              </a:rPr>
+              <a:t>These “genes” decide if a certain package in a certain state is included in the solution.</a:t>
+            </a:r>
+          </a:p>
+          <a:p>
+            <a:pPr>
+              <a:buClr>
+                <a:schemeClr val="tx1"/>
+              </a:buClr>
+              <a:buFont typeface="Arial" panose="020B0604020202020204" pitchFamily="34" charset="0"/>
+              <a:buChar char="•"/>
+            </a:pPr>
+            <a:r>
+              <a:rPr lang="en-US" sz="2400" dirty="0" smtClean="0">
+                <a:solidFill>
+                  <a:schemeClr val="tx1"/>
+                </a:solidFill>
+                <a:latin typeface="Arial" panose="020B0604020202020204" pitchFamily="34" charset="0"/>
+                <a:cs typeface="Arial" panose="020B0604020202020204" pitchFamily="34" charset="0"/>
+              </a:rPr>
+              <a:t>The binary string is converted into a packing to evaluate the fitness of an individual</a:t>
+            </a:r>
+          </a:p>
+          <a:p>
+            <a:pPr>
+              <a:buClr>
+                <a:schemeClr val="tx1"/>
+              </a:buClr>
+              <a:buFont typeface="Arial" panose="020B0604020202020204" pitchFamily="34" charset="0"/>
+              <a:buChar char="•"/>
+            </a:pPr>
+            <a:endParaRPr lang="en-US" sz="2400" dirty="0" smtClean="0">
+              <a:solidFill>
+                <a:schemeClr val="tx1"/>
+              </a:solidFill>
+              <a:latin typeface="Arial" panose="020B0604020202020204" pitchFamily="34" charset="0"/>
+              <a:cs typeface="Arial" panose="020B0604020202020204" pitchFamily="34" charset="0"/>
+            </a:endParaRPr>
+          </a:p>
+          <a:p>
+            <a:pPr>
+              <a:buClr>
+                <a:schemeClr val="tx1"/>
+              </a:buClr>
+              <a:buFont typeface="Arial" panose="020B0604020202020204" pitchFamily="34" charset="0"/>
+              <a:buChar char="•"/>
+            </a:pPr>
+            <a:endParaRPr lang="et-EE" sz="2400" dirty="0">
+              <a:solidFill>
+                <a:schemeClr val="tx1"/>
+              </a:solidFill>
+              <a:latin typeface="Arial" panose="020B0604020202020204" pitchFamily="34" charset="0"/>
+              <a:cs typeface="Arial" panose="020B0604020202020204" pitchFamily="34" charset="0"/>
+            </a:endParaRPr>
+          </a:p>
+        </p:txBody>
+      </p:sp>
     </p:spTree>
     <p:extLst>
       <p:ext uri="{BB962C8B-B14F-4D97-AF65-F5344CB8AC3E}">
-        <p14:creationId xmlns:p14="http://schemas.microsoft.com/office/powerpoint/2010/main" val="4268301284"/>
+        <p14:creationId xmlns:p14="http://schemas.microsoft.com/office/powerpoint/2010/main" val="614935636"/>
       </p:ext>
     </p:extLst>
   </p:cSld>
@@ -6535,7 +6643,7 @@
                 <a:latin typeface="Arial" panose="020B0604020202020204" pitchFamily="34" charset="0"/>
                 <a:cs typeface="Arial" panose="020B0604020202020204" pitchFamily="34" charset="0"/>
               </a:rPr>
-              <a:t>Implementation</a:t>
+              <a:t>Comparison between algorithms</a:t>
             </a:r>
             <a:endParaRPr lang="et-EE" dirty="0">
               <a:latin typeface="Arial" panose="020B0604020202020204" pitchFamily="34" charset="0"/>
@@ -6562,9 +6670,7 @@
           <a:lstStyle/>
           <a:p>
             <a:pPr>
-              <a:buClr>
-                <a:schemeClr val="tx1"/>
-              </a:buClr>
+              <a:buClrTx/>
               <a:buFont typeface="Arial" panose="020B0604020202020204" pitchFamily="34" charset="0"/>
               <a:buChar char="•"/>
             </a:pPr>
@@ -6576,34 +6682,12 @@
                 <a:latin typeface="Arial" panose="020B0604020202020204" pitchFamily="34" charset="0"/>
                 <a:cs typeface="Arial" panose="020B0604020202020204" pitchFamily="34" charset="0"/>
               </a:rPr>
-              <a:t>Chromosomes</a:t>
-            </a:r>
-            <a:r>
-              <a:rPr lang="en-US" sz="2400" dirty="0">
-                <a:solidFill>
-                  <a:schemeClr val="tx1"/>
-                </a:solidFill>
-                <a:latin typeface="Arial" panose="020B0604020202020204" pitchFamily="34" charset="0"/>
-                <a:cs typeface="Arial" panose="020B0604020202020204" pitchFamily="34" charset="0"/>
-              </a:rPr>
-              <a:t> (an array consisting of 0’s and 1’s</a:t>
-            </a:r>
-            <a:r>
-              <a:rPr lang="en-US" sz="2400" dirty="0" smtClean="0">
-                <a:solidFill>
-                  <a:schemeClr val="tx1"/>
-                </a:solidFill>
-                <a:latin typeface="Arial" panose="020B0604020202020204" pitchFamily="34" charset="0"/>
-                <a:cs typeface="Arial" panose="020B0604020202020204" pitchFamily="34" charset="0"/>
-              </a:rPr>
-              <a:t>)  of each individual are generated randomly for the initial population.</a:t>
+              <a:t>Greedy algorithm is the fastest but does not perform as well as other algorithms </a:t>
             </a:r>
           </a:p>
           <a:p>
             <a:pPr>
-              <a:buClr>
-                <a:schemeClr val="tx1"/>
-              </a:buClr>
+              <a:buClrTx/>
               <a:buFont typeface="Arial" panose="020B0604020202020204" pitchFamily="34" charset="0"/>
               <a:buChar char="•"/>
             </a:pPr>
@@ -6615,14 +6699,12 @@
                 <a:latin typeface="Arial" panose="020B0604020202020204" pitchFamily="34" charset="0"/>
                 <a:cs typeface="Arial" panose="020B0604020202020204" pitchFamily="34" charset="0"/>
               </a:rPr>
-              <a:t>These “genes” decide if a certain package in a certain state is included in the solution.</a:t>
+              <a:t>Hill climbing algorithm might get stuck</a:t>
             </a:r>
           </a:p>
           <a:p>
             <a:pPr>
-              <a:buClr>
-                <a:schemeClr val="tx1"/>
-              </a:buClr>
+              <a:buClrTx/>
               <a:buFont typeface="Arial" panose="020B0604020202020204" pitchFamily="34" charset="0"/>
               <a:buChar char="•"/>
             </a:pPr>
@@ -6634,33 +6716,8 @@
                 <a:latin typeface="Arial" panose="020B0604020202020204" pitchFamily="34" charset="0"/>
                 <a:cs typeface="Arial" panose="020B0604020202020204" pitchFamily="34" charset="0"/>
               </a:rPr>
-              <a:t>The binary string is converted into a packing to evaluate the fitness of an individual</a:t>
-            </a:r>
-          </a:p>
-          <a:p>
-            <a:pPr>
-              <a:buClr>
-                <a:schemeClr val="tx1"/>
-              </a:buClr>
-              <a:buFont typeface="Arial" panose="020B0604020202020204" pitchFamily="34" charset="0"/>
-              <a:buChar char="•"/>
-            </a:pPr>
-            <a:endParaRPr lang="en-US" sz="2400" dirty="0" smtClean="0">
-              <a:solidFill>
-                <a:schemeClr val="tx1"/>
-              </a:solidFill>
-              <a:latin typeface="Arial" panose="020B0604020202020204" pitchFamily="34" charset="0"/>
-              <a:cs typeface="Arial" panose="020B0604020202020204" pitchFamily="34" charset="0"/>
-            </a:endParaRPr>
-          </a:p>
-          <a:p>
-            <a:pPr>
-              <a:buClr>
-                <a:schemeClr val="tx1"/>
-              </a:buClr>
-              <a:buFont typeface="Arial" panose="020B0604020202020204" pitchFamily="34" charset="0"/>
-              <a:buChar char="•"/>
-            </a:pPr>
+              <a:t>Genetic algorithm is time consuming and has a lot of parameters that need to be taken into account (difficult to implement) but it is the most likely to find the optimal solution.</a:t>
+            </a:r>
             <a:endParaRPr lang="et-EE" sz="2400" dirty="0">
               <a:solidFill>
                 <a:schemeClr val="tx1"/>
@@ -6674,7 +6731,7 @@
     </p:spTree>
     <p:extLst>
       <p:ext uri="{BB962C8B-B14F-4D97-AF65-F5344CB8AC3E}">
-        <p14:creationId xmlns:p14="http://schemas.microsoft.com/office/powerpoint/2010/main" val="614935636"/>
+        <p14:creationId xmlns:p14="http://schemas.microsoft.com/office/powerpoint/2010/main" val="1840586329"/>
       </p:ext>
     </p:extLst>
   </p:cSld>
@@ -6718,48 +6775,28 @@
             <p:ph type="title"/>
           </p:nvPr>
         </p:nvSpPr>
-        <p:spPr/>
+        <p:spPr>
+          <a:xfrm>
+            <a:off x="3229466" y="2997958"/>
+            <a:ext cx="8596668" cy="1320800"/>
+          </a:xfrm>
+        </p:spPr>
         <p:txBody>
           <a:bodyPr/>
           <a:lstStyle/>
           <a:p>
             <a:r>
-              <a:rPr lang="en-US" dirty="0" smtClean="0">
-                <a:latin typeface="Arial" panose="020B0604020202020204" pitchFamily="34" charset="0"/>
-                <a:cs typeface="Arial" panose="020B0604020202020204" pitchFamily="34" charset="0"/>
-              </a:rPr>
-              <a:t>Experiments and results</a:t>
-            </a:r>
-            <a:endParaRPr lang="et-EE" dirty="0">
-              <a:latin typeface="Arial" panose="020B0604020202020204" pitchFamily="34" charset="0"/>
-              <a:cs typeface="Arial" panose="020B0604020202020204" pitchFamily="34" charset="0"/>
-            </a:endParaRPr>
-          </a:p>
-        </p:txBody>
-      </p:sp>
-      <p:sp>
-        <p:nvSpPr>
-          <p:cNvPr id="3" name="Content Placeholder 2"/>
-          <p:cNvSpPr>
-            <a:spLocks noGrp="1"/>
-          </p:cNvSpPr>
-          <p:nvPr>
-            <p:ph idx="1"/>
-          </p:nvPr>
-        </p:nvSpPr>
-        <p:spPr/>
-        <p:txBody>
-          <a:bodyPr/>
-          <a:lstStyle/>
-          <a:p>
-            <a:endParaRPr lang="et-EE"/>
+              <a:rPr lang="en-US" dirty="0" smtClean="0"/>
+              <a:t>ASSIGNMENT RESULTS</a:t>
+            </a:r>
+            <a:endParaRPr lang="et-EE" dirty="0"/>
           </a:p>
         </p:txBody>
       </p:sp>
     </p:spTree>
     <p:extLst>
       <p:ext uri="{BB962C8B-B14F-4D97-AF65-F5344CB8AC3E}">
-        <p14:creationId xmlns:p14="http://schemas.microsoft.com/office/powerpoint/2010/main" val="2405103384"/>
+        <p14:creationId xmlns:p14="http://schemas.microsoft.com/office/powerpoint/2010/main" val="3788528713"/>
       </p:ext>
     </p:extLst>
   </p:cSld>
@@ -6813,7 +6850,7 @@
                 <a:latin typeface="Arial" panose="020B0604020202020204" pitchFamily="34" charset="0"/>
                 <a:cs typeface="Arial" panose="020B0604020202020204" pitchFamily="34" charset="0"/>
               </a:rPr>
-              <a:t>Comparison between algorithms</a:t>
+              <a:t>Using rectangular packages</a:t>
             </a:r>
             <a:endParaRPr lang="et-EE" dirty="0">
               <a:latin typeface="Arial" panose="020B0604020202020204" pitchFamily="34" charset="0"/>
@@ -6840,78 +6877,61 @@
           <a:lstStyle/>
           <a:p>
             <a:pPr>
-              <a:buClrTx/>
+              <a:buClr>
+                <a:schemeClr val="tx1"/>
+              </a:buClr>
               <a:buFont typeface="Arial" panose="020B0604020202020204" pitchFamily="34" charset="0"/>
               <a:buChar char="•"/>
             </a:pPr>
             <a:r>
-              <a:rPr lang="en-US" sz="2400" dirty="0" smtClean="0">
+              <a:rPr lang="en-US" sz="2800" dirty="0">
                 <a:solidFill>
                   <a:schemeClr val="tx1"/>
                 </a:solidFill>
                 <a:latin typeface="Arial" panose="020B0604020202020204" pitchFamily="34" charset="0"/>
                 <a:cs typeface="Arial" panose="020B0604020202020204" pitchFamily="34" charset="0"/>
               </a:rPr>
-              <a:t>Greedy algorithm is the fastest but does not perform as well as other algorithms </a:t>
+              <a:t>N</a:t>
+            </a:r>
+            <a:r>
+              <a:rPr lang="en-US" sz="2800" dirty="0" smtClean="0">
+                <a:solidFill>
+                  <a:schemeClr val="tx1"/>
+                </a:solidFill>
+                <a:latin typeface="Arial" panose="020B0604020202020204" pitchFamily="34" charset="0"/>
+                <a:cs typeface="Arial" panose="020B0604020202020204" pitchFamily="34" charset="0"/>
+              </a:rPr>
+              <a:t>o solution to filling the entire cargo space with A,B and/or C packages has been found yet.</a:t>
             </a:r>
           </a:p>
           <a:p>
             <a:pPr>
-              <a:buClrTx/>
+              <a:buClr>
+                <a:schemeClr val="tx1"/>
+              </a:buClr>
               <a:buFont typeface="Arial" panose="020B0604020202020204" pitchFamily="34" charset="0"/>
               <a:buChar char="•"/>
             </a:pPr>
             <a:r>
-              <a:rPr lang="en-US" sz="2400" dirty="0" smtClean="0">
+              <a:rPr lang="en-US" sz="2800" dirty="0" smtClean="0">
                 <a:solidFill>
                   <a:schemeClr val="tx1"/>
                 </a:solidFill>
                 <a:latin typeface="Arial" panose="020B0604020202020204" pitchFamily="34" charset="0"/>
                 <a:cs typeface="Arial" panose="020B0604020202020204" pitchFamily="34" charset="0"/>
               </a:rPr>
-              <a:t>Hill climbing algorithm might get stuck</a:t>
-            </a:r>
-          </a:p>
-          <a:p>
-            <a:pPr>
-              <a:buClrTx/>
-              <a:buFont typeface="Arial" panose="020B0604020202020204" pitchFamily="34" charset="0"/>
-              <a:buChar char="•"/>
-            </a:pPr>
-            <a:r>
-              <a:rPr lang="en-US" sz="2400" dirty="0" smtClean="0">
-                <a:solidFill>
-                  <a:schemeClr val="tx1"/>
-                </a:solidFill>
-                <a:latin typeface="Arial" panose="020B0604020202020204" pitchFamily="34" charset="0"/>
-                <a:cs typeface="Arial" panose="020B0604020202020204" pitchFamily="34" charset="0"/>
-              </a:rPr>
-              <a:t>Genetic algorithm is time consuming and has a lot of parameters that need to be taken into account (difficult to implement) but it is the most likely to find the optimal solution</a:t>
-            </a:r>
-            <a:r>
-              <a:rPr lang="en-US" sz="2400" dirty="0" smtClean="0">
-                <a:solidFill>
-                  <a:schemeClr val="tx1"/>
-                </a:solidFill>
-                <a:latin typeface="Arial" panose="020B0604020202020204" pitchFamily="34" charset="0"/>
-                <a:cs typeface="Arial" panose="020B0604020202020204" pitchFamily="34" charset="0"/>
-              </a:rPr>
-              <a:t>.</a:t>
-            </a:r>
-            <a:endParaRPr lang="et-EE" sz="2400" dirty="0">
-              <a:solidFill>
-                <a:schemeClr val="tx1"/>
-              </a:solidFill>
-              <a:latin typeface="Arial" panose="020B0604020202020204" pitchFamily="34" charset="0"/>
-              <a:cs typeface="Arial" panose="020B0604020202020204" pitchFamily="34" charset="0"/>
-            </a:endParaRPr>
+              <a:t>Best result found so far for maximizing a single packing: 324</a:t>
+            </a:r>
+          </a:p>
+          <a:p>
+            <a:endParaRPr lang="et-EE" sz="2800" dirty="0"/>
           </a:p>
         </p:txBody>
       </p:sp>
     </p:spTree>
     <p:extLst>
       <p:ext uri="{BB962C8B-B14F-4D97-AF65-F5344CB8AC3E}">
-        <p14:creationId xmlns:p14="http://schemas.microsoft.com/office/powerpoint/2010/main" val="1840586329"/>
+        <p14:creationId xmlns:p14="http://schemas.microsoft.com/office/powerpoint/2010/main" val="2928455462"/>
       </p:ext>
     </p:extLst>
   </p:cSld>
@@ -6955,71 +6975,6 @@
             <p:ph type="title"/>
           </p:nvPr>
         </p:nvSpPr>
-        <p:spPr>
-          <a:xfrm>
-            <a:off x="3229466" y="2997958"/>
-            <a:ext cx="8596668" cy="1320800"/>
-          </a:xfrm>
-        </p:spPr>
-        <p:txBody>
-          <a:bodyPr/>
-          <a:lstStyle/>
-          <a:p>
-            <a:r>
-              <a:rPr lang="en-US" dirty="0" smtClean="0"/>
-              <a:t>ASSIGNMENT RESULTS</a:t>
-            </a:r>
-            <a:endParaRPr lang="et-EE" dirty="0"/>
-          </a:p>
-        </p:txBody>
-      </p:sp>
-    </p:spTree>
-    <p:extLst>
-      <p:ext uri="{BB962C8B-B14F-4D97-AF65-F5344CB8AC3E}">
-        <p14:creationId xmlns:p14="http://schemas.microsoft.com/office/powerpoint/2010/main" val="3788528713"/>
-      </p:ext>
-    </p:extLst>
-  </p:cSld>
-  <p:clrMapOvr>
-    <a:masterClrMapping/>
-  </p:clrMapOvr>
-  <p:timing>
-    <p:tnLst>
-      <p:par>
-        <p:cTn id="1" dur="indefinite" restart="never" nodeType="tmRoot"/>
-      </p:par>
-    </p:tnLst>
-  </p:timing>
-</p:sld>
-</file>
-
-<file path=ppt/slides/slide18.xml><?xml version="1.0" encoding="utf-8"?>
-<p:sld xmlns:a="http://schemas.openxmlformats.org/drawingml/2006/main" xmlns:r="http://schemas.openxmlformats.org/officeDocument/2006/relationships" xmlns:p="http://schemas.openxmlformats.org/presentationml/2006/main">
-  <p:cSld>
-    <p:spTree>
-      <p:nvGrpSpPr>
-        <p:cNvPr id="1" name=""/>
-        <p:cNvGrpSpPr/>
-        <p:nvPr/>
-      </p:nvGrpSpPr>
-      <p:grpSpPr>
-        <a:xfrm>
-          <a:off x="0" y="0"/>
-          <a:ext cx="0" cy="0"/>
-          <a:chOff x="0" y="0"/>
-          <a:chExt cx="0" cy="0"/>
-        </a:xfrm>
-      </p:grpSpPr>
-      <p:sp>
-        <p:nvSpPr>
-          <p:cNvPr id="2" name="Title 1"/>
-          <p:cNvSpPr>
-            <a:spLocks noGrp="1"/>
-          </p:cNvSpPr>
-          <p:nvPr>
-            <p:ph type="title"/>
-          </p:nvPr>
-        </p:nvSpPr>
         <p:spPr/>
         <p:txBody>
           <a:bodyPr/>
@@ -7030,7 +6985,21 @@
                 <a:latin typeface="Arial" panose="020B0604020202020204" pitchFamily="34" charset="0"/>
                 <a:cs typeface="Arial" panose="020B0604020202020204" pitchFamily="34" charset="0"/>
               </a:rPr>
-              <a:t>Using rectangular packages</a:t>
+              <a:t>Using </a:t>
+            </a:r>
+            <a:r>
+              <a:rPr lang="en-US" dirty="0" err="1" smtClean="0">
+                <a:latin typeface="Arial" panose="020B0604020202020204" pitchFamily="34" charset="0"/>
+                <a:cs typeface="Arial" panose="020B0604020202020204" pitchFamily="34" charset="0"/>
+              </a:rPr>
+              <a:t>pentomino</a:t>
+            </a:r>
+            <a:r>
+              <a:rPr lang="en-US" dirty="0" smtClean="0">
+                <a:latin typeface="Arial" panose="020B0604020202020204" pitchFamily="34" charset="0"/>
+                <a:cs typeface="Arial" panose="020B0604020202020204" pitchFamily="34" charset="0"/>
+              </a:rPr>
+              <a:t>-shaped packages</a:t>
             </a:r>
             <a:endParaRPr lang="et-EE" dirty="0">
               <a:latin typeface="Arial" panose="020B0604020202020204" pitchFamily="34" charset="0"/>
@@ -7064,25 +7033,63 @@
               <a:buChar char="•"/>
             </a:pPr>
             <a:r>
-              <a:rPr lang="en-US" sz="2800" dirty="0">
+              <a:rPr lang="en-US" sz="2000" dirty="0" smtClean="0">
                 <a:solidFill>
                   <a:schemeClr val="tx1"/>
                 </a:solidFill>
                 <a:latin typeface="Arial" panose="020B0604020202020204" pitchFamily="34" charset="0"/>
                 <a:cs typeface="Arial" panose="020B0604020202020204" pitchFamily="34" charset="0"/>
               </a:rPr>
-              <a:t>N</a:t>
-            </a:r>
-            <a:r>
-              <a:rPr lang="en-US" sz="2800" dirty="0" smtClean="0">
-                <a:solidFill>
-                  <a:schemeClr val="tx1"/>
-                </a:solidFill>
-                <a:latin typeface="Arial" panose="020B0604020202020204" pitchFamily="34" charset="0"/>
-                <a:cs typeface="Arial" panose="020B0604020202020204" pitchFamily="34" charset="0"/>
-              </a:rPr>
-              <a:t>o solution to filling the entire cargo space with A,B and/or C packages has been found yet.</a:t>
-            </a:r>
+              <a:t>It is possible to fill the entire cargo space with L,P and/or T packages.</a:t>
+            </a:r>
+          </a:p>
+          <a:p>
+            <a:endParaRPr lang="en-US" sz="2000" dirty="0" smtClean="0">
+              <a:latin typeface="Arial" panose="020B0604020202020204" pitchFamily="34" charset="0"/>
+              <a:cs typeface="Arial" panose="020B0604020202020204" pitchFamily="34" charset="0"/>
+            </a:endParaRPr>
+          </a:p>
+          <a:p>
+            <a:endParaRPr lang="en-US" sz="2000" dirty="0">
+              <a:latin typeface="Arial" panose="020B0604020202020204" pitchFamily="34" charset="0"/>
+              <a:cs typeface="Arial" panose="020B0604020202020204" pitchFamily="34" charset="0"/>
+            </a:endParaRPr>
+          </a:p>
+          <a:p>
+            <a:endParaRPr lang="en-US" sz="2000" dirty="0" smtClean="0">
+              <a:latin typeface="Arial" panose="020B0604020202020204" pitchFamily="34" charset="0"/>
+              <a:cs typeface="Arial" panose="020B0604020202020204" pitchFamily="34" charset="0"/>
+            </a:endParaRPr>
+          </a:p>
+          <a:p>
+            <a:endParaRPr lang="en-US" sz="2000" dirty="0">
+              <a:latin typeface="Arial" panose="020B0604020202020204" pitchFamily="34" charset="0"/>
+              <a:cs typeface="Arial" panose="020B0604020202020204" pitchFamily="34" charset="0"/>
+            </a:endParaRPr>
+          </a:p>
+          <a:p>
+            <a:endParaRPr lang="en-US" sz="2000" dirty="0" smtClean="0">
+              <a:latin typeface="Arial" panose="020B0604020202020204" pitchFamily="34" charset="0"/>
+              <a:cs typeface="Arial" panose="020B0604020202020204" pitchFamily="34" charset="0"/>
+            </a:endParaRPr>
+          </a:p>
+          <a:p>
+            <a:pPr marL="0" indent="0">
+              <a:buNone/>
+            </a:pPr>
+            <a:endParaRPr lang="en-US" sz="2000" dirty="0" smtClean="0">
+              <a:latin typeface="Arial" panose="020B0604020202020204" pitchFamily="34" charset="0"/>
+              <a:cs typeface="Arial" panose="020B0604020202020204" pitchFamily="34" charset="0"/>
+            </a:endParaRPr>
+          </a:p>
+          <a:p>
+            <a:pPr marL="0" indent="0">
+              <a:buNone/>
+            </a:pPr>
+            <a:endParaRPr lang="en-US" sz="2000" dirty="0">
+              <a:latin typeface="Arial" panose="020B0604020202020204" pitchFamily="34" charset="0"/>
+              <a:cs typeface="Arial" panose="020B0604020202020204" pitchFamily="34" charset="0"/>
+            </a:endParaRPr>
           </a:p>
           <a:p>
             <a:pPr>
@@ -7093,221 +7100,24 @@
               <a:buChar char="•"/>
             </a:pPr>
             <a:r>
-              <a:rPr lang="en-US" sz="2800" dirty="0" smtClean="0">
+              <a:rPr lang="en-US" sz="2000" dirty="0" smtClean="0">
                 <a:solidFill>
                   <a:schemeClr val="tx1"/>
                 </a:solidFill>
                 <a:latin typeface="Arial" panose="020B0604020202020204" pitchFamily="34" charset="0"/>
                 <a:cs typeface="Arial" panose="020B0604020202020204" pitchFamily="34" charset="0"/>
               </a:rPr>
-              <a:t>Best result found so far for maximizing a single packing: 324</a:t>
-            </a:r>
-          </a:p>
-          <a:p>
-            <a:endParaRPr lang="et-EE" sz="2800" dirty="0"/>
-          </a:p>
-        </p:txBody>
-      </p:sp>
-    </p:spTree>
-    <p:extLst>
-      <p:ext uri="{BB962C8B-B14F-4D97-AF65-F5344CB8AC3E}">
-        <p14:creationId xmlns:p14="http://schemas.microsoft.com/office/powerpoint/2010/main" val="2928455462"/>
-      </p:ext>
-    </p:extLst>
-  </p:cSld>
-  <p:clrMapOvr>
-    <a:masterClrMapping/>
-  </p:clrMapOvr>
-  <p:timing>
-    <p:tnLst>
-      <p:par>
-        <p:cTn id="1" dur="indefinite" restart="never" nodeType="tmRoot"/>
-      </p:par>
-    </p:tnLst>
-  </p:timing>
-</p:sld>
-</file>
-
-<file path=ppt/slides/slide19.xml><?xml version="1.0" encoding="utf-8"?>
-<p:sld xmlns:a="http://schemas.openxmlformats.org/drawingml/2006/main" xmlns:r="http://schemas.openxmlformats.org/officeDocument/2006/relationships" xmlns:p="http://schemas.openxmlformats.org/presentationml/2006/main">
-  <p:cSld>
-    <p:spTree>
-      <p:nvGrpSpPr>
-        <p:cNvPr id="1" name=""/>
-        <p:cNvGrpSpPr/>
-        <p:nvPr/>
-      </p:nvGrpSpPr>
-      <p:grpSpPr>
-        <a:xfrm>
-          <a:off x="0" y="0"/>
-          <a:ext cx="0" cy="0"/>
-          <a:chOff x="0" y="0"/>
-          <a:chExt cx="0" cy="0"/>
-        </a:xfrm>
-      </p:grpSpPr>
-      <p:sp>
-        <p:nvSpPr>
-          <p:cNvPr id="2" name="Title 1"/>
-          <p:cNvSpPr>
-            <a:spLocks noGrp="1"/>
-          </p:cNvSpPr>
-          <p:nvPr>
-            <p:ph type="title"/>
-          </p:nvPr>
-        </p:nvSpPr>
-        <p:spPr/>
-        <p:txBody>
-          <a:bodyPr/>
-          <a:lstStyle/>
-          <a:p>
-            <a:r>
-              <a:rPr lang="en-US" dirty="0" smtClean="0">
+              <a:t>Best result found so far for maximizing a single packing: </a:t>
+            </a:r>
+            <a:r>
+              <a:rPr lang="en-US" sz="2000" b="1" dirty="0" smtClean="0">
+                <a:solidFill>
+                  <a:schemeClr val="tx1"/>
+                </a:solidFill>
                 <a:latin typeface="Arial" panose="020B0604020202020204" pitchFamily="34" charset="0"/>
                 <a:cs typeface="Arial" panose="020B0604020202020204" pitchFamily="34" charset="0"/>
               </a:rPr>
-              <a:t>Using </a:t>
-            </a:r>
-            <a:r>
-              <a:rPr lang="en-US" dirty="0" err="1" smtClean="0">
-                <a:latin typeface="Arial" panose="020B0604020202020204" pitchFamily="34" charset="0"/>
-                <a:cs typeface="Arial" panose="020B0604020202020204" pitchFamily="34" charset="0"/>
-              </a:rPr>
-              <a:t>pentomino</a:t>
-            </a:r>
-            <a:r>
-              <a:rPr lang="en-US" dirty="0" smtClean="0">
-                <a:latin typeface="Arial" panose="020B0604020202020204" pitchFamily="34" charset="0"/>
-                <a:cs typeface="Arial" panose="020B0604020202020204" pitchFamily="34" charset="0"/>
-              </a:rPr>
-              <a:t>-shaped packages</a:t>
-            </a:r>
-            <a:endParaRPr lang="et-EE" dirty="0">
-              <a:latin typeface="Arial" panose="020B0604020202020204" pitchFamily="34" charset="0"/>
-              <a:cs typeface="Arial" panose="020B0604020202020204" pitchFamily="34" charset="0"/>
-            </a:endParaRPr>
-          </a:p>
-        </p:txBody>
-      </p:sp>
-      <p:sp>
-        <p:nvSpPr>
-          <p:cNvPr id="3" name="Content Placeholder 2"/>
-          <p:cNvSpPr>
-            <a:spLocks noGrp="1"/>
-          </p:cNvSpPr>
-          <p:nvPr>
-            <p:ph idx="1"/>
-          </p:nvPr>
-        </p:nvSpPr>
-        <p:spPr/>
-        <p:txBody>
-          <a:bodyPr>
-            <a:normAutofit/>
-          </a:bodyPr>
-          <a:lstStyle/>
-          <a:p>
-            <a:pPr>
-              <a:buClr>
-                <a:schemeClr val="tx1"/>
-              </a:buClr>
-              <a:buFont typeface="Arial" panose="020B0604020202020204" pitchFamily="34" charset="0"/>
-              <a:buChar char="•"/>
-            </a:pPr>
-            <a:r>
-              <a:rPr lang="en-US" sz="2000" dirty="0" smtClean="0">
-                <a:solidFill>
-                  <a:schemeClr val="tx1"/>
-                </a:solidFill>
-                <a:latin typeface="Arial" panose="020B0604020202020204" pitchFamily="34" charset="0"/>
-                <a:cs typeface="Arial" panose="020B0604020202020204" pitchFamily="34" charset="0"/>
-              </a:rPr>
-              <a:t>It is possible to fill the entire cargo space with L,P and/or T packages.</a:t>
-            </a:r>
-          </a:p>
-          <a:p>
-            <a:endParaRPr lang="en-US" sz="2000" dirty="0" smtClean="0">
-              <a:latin typeface="Arial" panose="020B0604020202020204" pitchFamily="34" charset="0"/>
-              <a:cs typeface="Arial" panose="020B0604020202020204" pitchFamily="34" charset="0"/>
-            </a:endParaRPr>
-          </a:p>
-          <a:p>
-            <a:endParaRPr lang="en-US" sz="2000" dirty="0">
-              <a:latin typeface="Arial" panose="020B0604020202020204" pitchFamily="34" charset="0"/>
-              <a:cs typeface="Arial" panose="020B0604020202020204" pitchFamily="34" charset="0"/>
-            </a:endParaRPr>
-          </a:p>
-          <a:p>
-            <a:endParaRPr lang="en-US" sz="2000" dirty="0" smtClean="0">
-              <a:latin typeface="Arial" panose="020B0604020202020204" pitchFamily="34" charset="0"/>
-              <a:cs typeface="Arial" panose="020B0604020202020204" pitchFamily="34" charset="0"/>
-            </a:endParaRPr>
-          </a:p>
-          <a:p>
-            <a:endParaRPr lang="en-US" sz="2000" dirty="0">
-              <a:latin typeface="Arial" panose="020B0604020202020204" pitchFamily="34" charset="0"/>
-              <a:cs typeface="Arial" panose="020B0604020202020204" pitchFamily="34" charset="0"/>
-            </a:endParaRPr>
-          </a:p>
-          <a:p>
-            <a:endParaRPr lang="en-US" sz="2000" dirty="0" smtClean="0">
-              <a:latin typeface="Arial" panose="020B0604020202020204" pitchFamily="34" charset="0"/>
-              <a:cs typeface="Arial" panose="020B0604020202020204" pitchFamily="34" charset="0"/>
-            </a:endParaRPr>
-          </a:p>
-          <a:p>
-            <a:pPr marL="0" indent="0">
-              <a:buNone/>
-            </a:pPr>
-            <a:endParaRPr lang="en-US" sz="2000" dirty="0" smtClean="0">
-              <a:latin typeface="Arial" panose="020B0604020202020204" pitchFamily="34" charset="0"/>
-              <a:cs typeface="Arial" panose="020B0604020202020204" pitchFamily="34" charset="0"/>
-            </a:endParaRPr>
-          </a:p>
-          <a:p>
-            <a:pPr marL="0" indent="0">
-              <a:buNone/>
-            </a:pPr>
-            <a:endParaRPr lang="en-US" sz="2000" dirty="0">
-              <a:latin typeface="Arial" panose="020B0604020202020204" pitchFamily="34" charset="0"/>
-              <a:cs typeface="Arial" panose="020B0604020202020204" pitchFamily="34" charset="0"/>
-            </a:endParaRPr>
-          </a:p>
-          <a:p>
-            <a:pPr>
-              <a:buClr>
-                <a:schemeClr val="tx1"/>
-              </a:buClr>
-              <a:buFont typeface="Arial" panose="020B0604020202020204" pitchFamily="34" charset="0"/>
-              <a:buChar char="•"/>
-            </a:pPr>
-            <a:r>
-              <a:rPr lang="en-US" sz="2000" dirty="0" smtClean="0">
-                <a:solidFill>
-                  <a:schemeClr val="tx1"/>
-                </a:solidFill>
-                <a:latin typeface="Arial" panose="020B0604020202020204" pitchFamily="34" charset="0"/>
-                <a:cs typeface="Arial" panose="020B0604020202020204" pitchFamily="34" charset="0"/>
-              </a:rPr>
-              <a:t>Best result found so far for maximizing a single packing: </a:t>
-            </a:r>
-            <a:r>
-              <a:rPr lang="en-US" sz="2000" b="1" dirty="0" smtClean="0">
-                <a:solidFill>
-                  <a:schemeClr val="tx1"/>
-                </a:solidFill>
-                <a:latin typeface="Arial" panose="020B0604020202020204" pitchFamily="34" charset="0"/>
-                <a:cs typeface="Arial" panose="020B0604020202020204" pitchFamily="34" charset="0"/>
-              </a:rPr>
-              <a:t>9720</a:t>
-            </a:r>
-            <a:r>
-              <a:rPr lang="en-US" sz="2000" dirty="0" smtClean="0">
-                <a:solidFill>
-                  <a:schemeClr val="tx1"/>
-                </a:solidFill>
-                <a:latin typeface="Arial" panose="020B0604020202020204" pitchFamily="34" charset="0"/>
-                <a:cs typeface="Arial" panose="020B0604020202020204" pitchFamily="34" charset="0"/>
-              </a:rPr>
-              <a:t> </a:t>
+              <a:t>960</a:t>
             </a:r>
             <a:endParaRPr lang="et-EE" sz="2000" dirty="0">
               <a:solidFill>
@@ -7453,7 +7263,37 @@
                 <a:latin typeface="Arial" panose="020B0604020202020204" pitchFamily="34" charset="0"/>
                 <a:cs typeface="Arial" panose="020B0604020202020204" pitchFamily="34" charset="0"/>
               </a:rPr>
-              <a:t>1. Greedy algorithm</a:t>
+              <a:t>1</a:t>
+            </a:r>
+            <a:r>
+              <a:rPr lang="en-US" dirty="0" smtClean="0">
+                <a:solidFill>
+                  <a:schemeClr val="tx1"/>
+                </a:solidFill>
+                <a:latin typeface="Arial" panose="020B0604020202020204" pitchFamily="34" charset="0"/>
+                <a:cs typeface="Arial" panose="020B0604020202020204" pitchFamily="34" charset="0"/>
+              </a:rPr>
+              <a:t>. </a:t>
+            </a:r>
+            <a:r>
+              <a:rPr lang="en-US" dirty="0" smtClean="0">
+                <a:solidFill>
+                  <a:schemeClr val="tx1"/>
+                </a:solidFill>
+                <a:latin typeface="Arial" panose="020B0604020202020204" pitchFamily="34" charset="0"/>
+                <a:cs typeface="Arial" panose="020B0604020202020204" pitchFamily="34" charset="0"/>
+              </a:rPr>
+              <a:t>Greedy </a:t>
+            </a:r>
+            <a:r>
+              <a:rPr lang="en-US" dirty="0" smtClean="0">
+                <a:solidFill>
+                  <a:schemeClr val="tx1"/>
+                </a:solidFill>
+                <a:latin typeface="Arial" panose="020B0604020202020204" pitchFamily="34" charset="0"/>
+                <a:cs typeface="Arial" panose="020B0604020202020204" pitchFamily="34" charset="0"/>
+              </a:rPr>
+              <a:t>algorithm</a:t>
             </a:r>
           </a:p>
           <a:p>
@@ -7827,7 +7667,7 @@
         </p:nvSpPr>
         <p:spPr>
           <a:xfrm>
-            <a:off x="3485865" y="3057868"/>
+            <a:off x="652513" y="2993474"/>
             <a:ext cx="10515600" cy="1325563"/>
           </a:xfrm>
         </p:spPr>
@@ -7835,6 +7675,7 @@
           <a:bodyPr/>
           <a:lstStyle/>
           <a:p>
+            <a:pPr algn="ctr"/>
             <a:r>
               <a:rPr lang="en-US" dirty="0" smtClean="0">
                 <a:latin typeface="Arial" panose="020B0604020202020204" pitchFamily="34" charset="0"/>
@@ -7939,7 +7780,7 @@
         </p:blipFill>
         <p:spPr>
           <a:xfrm>
-            <a:off x="4072388" y="60076"/>
+            <a:off x="3929435" y="203376"/>
             <a:ext cx="5344567" cy="6654624"/>
           </a:xfrm>
           <a:prstGeom prst="rect">
@@ -8069,7 +7910,7 @@
         </p:blipFill>
         <p:spPr>
           <a:xfrm>
-            <a:off x="4549996" y="3417248"/>
+            <a:off x="2427838" y="3443488"/>
             <a:ext cx="5956308" cy="3170195"/>
           </a:xfrm>
         </p:spPr>
@@ -8208,7 +8049,7 @@
         </p:nvSpPr>
         <p:spPr>
           <a:xfrm>
-            <a:off x="677334" y="2283419"/>
+            <a:off x="804334" y="2410419"/>
             <a:ext cx="8596668" cy="3880773"/>
           </a:xfrm>
         </p:spPr>
@@ -8829,9 +8670,9 @@
 </file>
 
 <file path=ppt/theme/theme1.xml><?xml version="1.0" encoding="utf-8"?>
-<a:theme xmlns:a="http://schemas.openxmlformats.org/drawingml/2006/main" name="Facet">
+<a:theme xmlns:a="http://schemas.openxmlformats.org/drawingml/2006/main" name="Facette">
   <a:themeElements>
-    <a:clrScheme name="Facet">
+    <a:clrScheme name="Facette">
       <a:dk1>
         <a:sysClr val="windowText" lastClr="000000"/>
       </a:dk1>
@@ -8845,31 +8686,31 @@
         <a:srgbClr val="EBEBEB"/>
       </a:lt2>
       <a:accent1>
-        <a:srgbClr val="90C226"/>
+        <a:srgbClr val="5FCBEF"/>
       </a:accent1>
       <a:accent2>
-        <a:srgbClr val="54A021"/>
+        <a:srgbClr val="2E83C3"/>
       </a:accent2>
       <a:accent3>
-        <a:srgbClr val="E6B91E"/>
+        <a:srgbClr val="42D0A2"/>
       </a:accent3>
       <a:accent4>
-        <a:srgbClr val="E76618"/>
+        <a:srgbClr val="2E946B"/>
       </a:accent4>
       <a:accent5>
-        <a:srgbClr val="C42F1A"/>
+        <a:srgbClr val="42B051"/>
       </a:accent5>
       <a:accent6>
-        <a:srgbClr val="918655"/>
+        <a:srgbClr val="96D141"/>
       </a:accent6>
       <a:hlink>
-        <a:srgbClr val="99CA3C"/>
+        <a:srgbClr val="3FCDE7"/>
       </a:hlink>
       <a:folHlink>
-        <a:srgbClr val="B9D181"/>
+        <a:srgbClr val="A9D3E1"/>
       </a:folHlink>
     </a:clrScheme>
-    <a:fontScheme name="Facet">
+    <a:fontScheme name="Facette">
       <a:majorFont>
         <a:latin typeface="Trebuchet MS" panose="020B0603020202020204"/>
         <a:ea typeface=""/>
@@ -8941,7 +8782,7 @@
         <a:font script="Geor" typeface="Sylfaen"/>
       </a:minorFont>
     </a:fontScheme>
-    <a:fmtScheme name="Facet">
+    <a:fmtScheme name="Facette">
       <a:fillStyleLst>
         <a:solidFill>
           <a:schemeClr val="phClr"/>
@@ -9079,7 +8920,7 @@
   <a:extraClrSchemeLst/>
   <a:extLst>
     <a:ext uri="{05A4C25C-085E-4340-85A3-A5531E510DB2}">
-      <thm15:themeFamily xmlns:thm15="http://schemas.microsoft.com/office/thememl/2012/main" name="Facet" id="{C0C680CD-088A-49FC-A102-D699147F32B2}" vid="{CFBC31BA-B70F-4F30-BCAA-4F3011E16C4D}"/>
+      <thm15:themeFamily xmlns:thm15="http://schemas.microsoft.com/office/thememl/2012/main" name="Facet" id="{C0C680CD-088A-49FC-A102-D699147F32B2}" vid="{0B5AB586-D108-4FC1-8368-649FE654B894}"/>
     </a:ext>
   </a:extLst>
 </a:theme>

</xml_diff>